<commit_message>
fix: session09 scripts added
</commit_message>
<xml_diff>
--- a/nestjs/nestjs-09.pptx
+++ b/nestjs/nestjs-09.pptx
@@ -5,17 +5,31 @@
     <p:sldMasterId id="2147483705" r:id="rId1"/>
   </p:sldMasterIdLst>
   <p:notesMasterIdLst>
-    <p:notesMasterId r:id="rId10"/>
+    <p:notesMasterId r:id="rId24"/>
   </p:notesMasterIdLst>
   <p:sldIdLst>
     <p:sldId id="259" r:id="rId2"/>
     <p:sldId id="296" r:id="rId3"/>
     <p:sldId id="323" r:id="rId4"/>
-    <p:sldId id="321" r:id="rId5"/>
-    <p:sldId id="322" r:id="rId6"/>
-    <p:sldId id="324" r:id="rId7"/>
-    <p:sldId id="325" r:id="rId8"/>
-    <p:sldId id="320" r:id="rId9"/>
+    <p:sldId id="326" r:id="rId5"/>
+    <p:sldId id="328" r:id="rId6"/>
+    <p:sldId id="327" r:id="rId7"/>
+    <p:sldId id="329" r:id="rId8"/>
+    <p:sldId id="321" r:id="rId9"/>
+    <p:sldId id="322" r:id="rId10"/>
+    <p:sldId id="324" r:id="rId11"/>
+    <p:sldId id="325" r:id="rId12"/>
+    <p:sldId id="330" r:id="rId13"/>
+    <p:sldId id="331" r:id="rId14"/>
+    <p:sldId id="332" r:id="rId15"/>
+    <p:sldId id="333" r:id="rId16"/>
+    <p:sldId id="337" r:id="rId17"/>
+    <p:sldId id="338" r:id="rId18"/>
+    <p:sldId id="339" r:id="rId19"/>
+    <p:sldId id="334" r:id="rId20"/>
+    <p:sldId id="335" r:id="rId21"/>
+    <p:sldId id="336" r:id="rId22"/>
+    <p:sldId id="320" r:id="rId23"/>
   </p:sldIdLst>
   <p:sldSz cx="12192000" cy="6858000"/>
   <p:notesSz cx="6858000" cy="9144000"/>
@@ -204,7 +218,7 @@
           <a:p>
             <a:fld id="{9B9ECB28-6A22-4037-9487-F3F739F744D6}" type="datetimeFigureOut">
               <a:rPr lang="en-US" smtClean="0"/>
-              <a:t>2/1/2022</a:t>
+              <a:t>2/2/2022</a:t>
             </a:fld>
             <a:endParaRPr lang="en-US"/>
           </a:p>
@@ -517,6 +531,348 @@
           <a:p>
             <a:r>
               <a:rPr lang="en-US" dirty="0"/>
+              <a:t>https://virgool.io/Software/bcrypt-sjj46uhqjx88</a:t>
+            </a:r>
+          </a:p>
+        </p:txBody>
+      </p:sp>
+      <p:sp>
+        <p:nvSpPr>
+          <p:cNvPr id="4" name="Slide Number Placeholder 3"/>
+          <p:cNvSpPr>
+            <a:spLocks noGrp="1"/>
+          </p:cNvSpPr>
+          <p:nvPr>
+            <p:ph type="sldNum" sz="quarter" idx="5"/>
+          </p:nvPr>
+        </p:nvSpPr>
+        <p:spPr/>
+        <p:txBody>
+          <a:bodyPr/>
+          <a:lstStyle/>
+          <a:p>
+            <a:fld id="{0FE84E6F-3671-472C-BE6F-A37BC298F4AB}" type="slidenum">
+              <a:rPr lang="en-US" smtClean="0"/>
+              <a:t>6</a:t>
+            </a:fld>
+            <a:endParaRPr lang="en-US"/>
+          </a:p>
+        </p:txBody>
+      </p:sp>
+    </p:spTree>
+    <p:extLst>
+      <p:ext uri="{BB962C8B-B14F-4D97-AF65-F5344CB8AC3E}">
+        <p14:creationId xmlns:p14="http://schemas.microsoft.com/office/powerpoint/2010/main" val="765008149"/>
+      </p:ext>
+    </p:extLst>
+  </p:cSld>
+  <p:clrMapOvr>
+    <a:masterClrMapping/>
+  </p:clrMapOvr>
+</p:notes>
+</file>
+
+<file path=ppt/notesSlides/notesSlide2.xml><?xml version="1.0" encoding="utf-8"?>
+<p:notes xmlns:a="http://schemas.openxmlformats.org/drawingml/2006/main" xmlns:r="http://schemas.openxmlformats.org/officeDocument/2006/relationships" xmlns:p="http://schemas.openxmlformats.org/presentationml/2006/main">
+  <p:cSld>
+    <p:spTree>
+      <p:nvGrpSpPr>
+        <p:cNvPr id="1" name=""/>
+        <p:cNvGrpSpPr/>
+        <p:nvPr/>
+      </p:nvGrpSpPr>
+      <p:grpSpPr>
+        <a:xfrm>
+          <a:off x="0" y="0"/>
+          <a:ext cx="0" cy="0"/>
+          <a:chOff x="0" y="0"/>
+          <a:chExt cx="0" cy="0"/>
+        </a:xfrm>
+      </p:grpSpPr>
+      <p:sp>
+        <p:nvSpPr>
+          <p:cNvPr id="2" name="Slide Image Placeholder 1"/>
+          <p:cNvSpPr>
+            <a:spLocks noGrp="1" noRot="1" noChangeAspect="1"/>
+          </p:cNvSpPr>
+          <p:nvPr>
+            <p:ph type="sldImg"/>
+          </p:nvPr>
+        </p:nvSpPr>
+        <p:spPr/>
+      </p:sp>
+      <p:sp>
+        <p:nvSpPr>
+          <p:cNvPr id="3" name="Notes Placeholder 2"/>
+          <p:cNvSpPr>
+            <a:spLocks noGrp="1"/>
+          </p:cNvSpPr>
+          <p:nvPr>
+            <p:ph type="body" idx="1"/>
+          </p:nvPr>
+        </p:nvSpPr>
+        <p:spPr/>
+        <p:txBody>
+          <a:bodyPr/>
+          <a:lstStyle/>
+          <a:p>
+            <a:r>
+              <a:rPr lang="en-US" dirty="0"/>
+              <a:t>https://en.wikipedia.org/wiki/Bcrypt</a:t>
+            </a:r>
+          </a:p>
+        </p:txBody>
+      </p:sp>
+      <p:sp>
+        <p:nvSpPr>
+          <p:cNvPr id="4" name="Slide Number Placeholder 3"/>
+          <p:cNvSpPr>
+            <a:spLocks noGrp="1"/>
+          </p:cNvSpPr>
+          <p:nvPr>
+            <p:ph type="sldNum" sz="quarter" idx="5"/>
+          </p:nvPr>
+        </p:nvSpPr>
+        <p:spPr/>
+        <p:txBody>
+          <a:bodyPr/>
+          <a:lstStyle/>
+          <a:p>
+            <a:fld id="{0FE84E6F-3671-472C-BE6F-A37BC298F4AB}" type="slidenum">
+              <a:rPr lang="en-US" smtClean="0"/>
+              <a:t>7</a:t>
+            </a:fld>
+            <a:endParaRPr lang="en-US"/>
+          </a:p>
+        </p:txBody>
+      </p:sp>
+    </p:spTree>
+    <p:extLst>
+      <p:ext uri="{BB962C8B-B14F-4D97-AF65-F5344CB8AC3E}">
+        <p14:creationId xmlns:p14="http://schemas.microsoft.com/office/powerpoint/2010/main" val="230485731"/>
+      </p:ext>
+    </p:extLst>
+  </p:cSld>
+  <p:clrMapOvr>
+    <a:masterClrMapping/>
+  </p:clrMapOvr>
+</p:notes>
+</file>
+
+<file path=ppt/notesSlides/notesSlide3.xml><?xml version="1.0" encoding="utf-8"?>
+<p:notes xmlns:a="http://schemas.openxmlformats.org/drawingml/2006/main" xmlns:r="http://schemas.openxmlformats.org/officeDocument/2006/relationships" xmlns:p="http://schemas.openxmlformats.org/presentationml/2006/main">
+  <p:cSld>
+    <p:spTree>
+      <p:nvGrpSpPr>
+        <p:cNvPr id="1" name=""/>
+        <p:cNvGrpSpPr/>
+        <p:nvPr/>
+      </p:nvGrpSpPr>
+      <p:grpSpPr>
+        <a:xfrm>
+          <a:off x="0" y="0"/>
+          <a:ext cx="0" cy="0"/>
+          <a:chOff x="0" y="0"/>
+          <a:chExt cx="0" cy="0"/>
+        </a:xfrm>
+      </p:grpSpPr>
+      <p:sp>
+        <p:nvSpPr>
+          <p:cNvPr id="2" name="Slide Image Placeholder 1"/>
+          <p:cNvSpPr>
+            <a:spLocks noGrp="1" noRot="1" noChangeAspect="1"/>
+          </p:cNvSpPr>
+          <p:nvPr>
+            <p:ph type="sldImg"/>
+          </p:nvPr>
+        </p:nvSpPr>
+        <p:spPr/>
+      </p:sp>
+      <p:sp>
+        <p:nvSpPr>
+          <p:cNvPr id="3" name="Notes Placeholder 2"/>
+          <p:cNvSpPr>
+            <a:spLocks noGrp="1"/>
+          </p:cNvSpPr>
+          <p:nvPr>
+            <p:ph type="body" idx="1"/>
+          </p:nvPr>
+        </p:nvSpPr>
+        <p:spPr/>
+        <p:txBody>
+          <a:bodyPr/>
+          <a:lstStyle/>
+          <a:p>
+            <a:endParaRPr lang="en-US" dirty="0"/>
+          </a:p>
+        </p:txBody>
+      </p:sp>
+      <p:sp>
+        <p:nvSpPr>
+          <p:cNvPr id="4" name="Slide Number Placeholder 3"/>
+          <p:cNvSpPr>
+            <a:spLocks noGrp="1"/>
+          </p:cNvSpPr>
+          <p:nvPr>
+            <p:ph type="sldNum" sz="quarter" idx="5"/>
+          </p:nvPr>
+        </p:nvSpPr>
+        <p:spPr/>
+        <p:txBody>
+          <a:bodyPr/>
+          <a:lstStyle/>
+          <a:p>
+            <a:fld id="{0FE84E6F-3671-472C-BE6F-A37BC298F4AB}" type="slidenum">
+              <a:rPr lang="en-US" smtClean="0"/>
+              <a:t>14</a:t>
+            </a:fld>
+            <a:endParaRPr lang="en-US"/>
+          </a:p>
+        </p:txBody>
+      </p:sp>
+    </p:spTree>
+    <p:extLst>
+      <p:ext uri="{BB962C8B-B14F-4D97-AF65-F5344CB8AC3E}">
+        <p14:creationId xmlns:p14="http://schemas.microsoft.com/office/powerpoint/2010/main" val="4043579101"/>
+      </p:ext>
+    </p:extLst>
+  </p:cSld>
+  <p:clrMapOvr>
+    <a:masterClrMapping/>
+  </p:clrMapOvr>
+</p:notes>
+</file>
+
+<file path=ppt/notesSlides/notesSlide4.xml><?xml version="1.0" encoding="utf-8"?>
+<p:notes xmlns:a="http://schemas.openxmlformats.org/drawingml/2006/main" xmlns:r="http://schemas.openxmlformats.org/officeDocument/2006/relationships" xmlns:p="http://schemas.openxmlformats.org/presentationml/2006/main">
+  <p:cSld>
+    <p:spTree>
+      <p:nvGrpSpPr>
+        <p:cNvPr id="1" name=""/>
+        <p:cNvGrpSpPr/>
+        <p:nvPr/>
+      </p:nvGrpSpPr>
+      <p:grpSpPr>
+        <a:xfrm>
+          <a:off x="0" y="0"/>
+          <a:ext cx="0" cy="0"/>
+          <a:chOff x="0" y="0"/>
+          <a:chExt cx="0" cy="0"/>
+        </a:xfrm>
+      </p:grpSpPr>
+      <p:sp>
+        <p:nvSpPr>
+          <p:cNvPr id="2" name="Slide Image Placeholder 1"/>
+          <p:cNvSpPr>
+            <a:spLocks noGrp="1" noRot="1" noChangeAspect="1"/>
+          </p:cNvSpPr>
+          <p:nvPr>
+            <p:ph type="sldImg"/>
+          </p:nvPr>
+        </p:nvSpPr>
+        <p:spPr/>
+      </p:sp>
+      <p:sp>
+        <p:nvSpPr>
+          <p:cNvPr id="3" name="Notes Placeholder 2"/>
+          <p:cNvSpPr>
+            <a:spLocks noGrp="1"/>
+          </p:cNvSpPr>
+          <p:nvPr>
+            <p:ph type="body" idx="1"/>
+          </p:nvPr>
+        </p:nvSpPr>
+        <p:spPr/>
+        <p:txBody>
+          <a:bodyPr/>
+          <a:lstStyle/>
+          <a:p>
+            <a:endParaRPr lang="en-US" dirty="0"/>
+          </a:p>
+        </p:txBody>
+      </p:sp>
+      <p:sp>
+        <p:nvSpPr>
+          <p:cNvPr id="4" name="Slide Number Placeholder 3"/>
+          <p:cNvSpPr>
+            <a:spLocks noGrp="1"/>
+          </p:cNvSpPr>
+          <p:nvPr>
+            <p:ph type="sldNum" sz="quarter" idx="5"/>
+          </p:nvPr>
+        </p:nvSpPr>
+        <p:spPr/>
+        <p:txBody>
+          <a:bodyPr/>
+          <a:lstStyle/>
+          <a:p>
+            <a:fld id="{0FE84E6F-3671-472C-BE6F-A37BC298F4AB}" type="slidenum">
+              <a:rPr lang="en-US" smtClean="0"/>
+              <a:t>15</a:t>
+            </a:fld>
+            <a:endParaRPr lang="en-US"/>
+          </a:p>
+        </p:txBody>
+      </p:sp>
+    </p:spTree>
+    <p:extLst>
+      <p:ext uri="{BB962C8B-B14F-4D97-AF65-F5344CB8AC3E}">
+        <p14:creationId xmlns:p14="http://schemas.microsoft.com/office/powerpoint/2010/main" val="1538203455"/>
+      </p:ext>
+    </p:extLst>
+  </p:cSld>
+  <p:clrMapOvr>
+    <a:masterClrMapping/>
+  </p:clrMapOvr>
+</p:notes>
+</file>
+
+<file path=ppt/notesSlides/notesSlide5.xml><?xml version="1.0" encoding="utf-8"?>
+<p:notes xmlns:a="http://schemas.openxmlformats.org/drawingml/2006/main" xmlns:r="http://schemas.openxmlformats.org/officeDocument/2006/relationships" xmlns:p="http://schemas.openxmlformats.org/presentationml/2006/main">
+  <p:cSld>
+    <p:spTree>
+      <p:nvGrpSpPr>
+        <p:cNvPr id="1" name=""/>
+        <p:cNvGrpSpPr/>
+        <p:nvPr/>
+      </p:nvGrpSpPr>
+      <p:grpSpPr>
+        <a:xfrm>
+          <a:off x="0" y="0"/>
+          <a:ext cx="0" cy="0"/>
+          <a:chOff x="0" y="0"/>
+          <a:chExt cx="0" cy="0"/>
+        </a:xfrm>
+      </p:grpSpPr>
+      <p:sp>
+        <p:nvSpPr>
+          <p:cNvPr id="2" name="Slide Image Placeholder 1"/>
+          <p:cNvSpPr>
+            <a:spLocks noGrp="1" noRot="1" noChangeAspect="1"/>
+          </p:cNvSpPr>
+          <p:nvPr>
+            <p:ph type="sldImg"/>
+          </p:nvPr>
+        </p:nvSpPr>
+        <p:spPr/>
+      </p:sp>
+      <p:sp>
+        <p:nvSpPr>
+          <p:cNvPr id="3" name="Notes Placeholder 2"/>
+          <p:cNvSpPr>
+            <a:spLocks noGrp="1"/>
+          </p:cNvSpPr>
+          <p:nvPr>
+            <p:ph type="body" idx="1"/>
+          </p:nvPr>
+        </p:nvSpPr>
+        <p:spPr/>
+        <p:txBody>
+          <a:bodyPr/>
+          <a:lstStyle/>
+          <a:p>
+            <a:r>
+              <a:rPr lang="en-US" dirty="0"/>
               <a:t>Hint: </a:t>
             </a:r>
             <a:r>
@@ -595,7 +951,7 @@
           <a:p>
             <a:fld id="{0FE84E6F-3671-472C-BE6F-A37BC298F4AB}" type="slidenum">
               <a:rPr lang="en-US" smtClean="0"/>
-              <a:t>8</a:t>
+              <a:t>22</a:t>
             </a:fld>
             <a:endParaRPr lang="en-US"/>
           </a:p>
@@ -798,7 +1154,7 @@
           <a:p>
             <a:fld id="{19B6F524-99F3-4BEA-ACD7-976EF4D36657}" type="datetime1">
               <a:rPr lang="en-US" smtClean="0"/>
-              <a:t>2/1/2022</a:t>
+              <a:t>2/2/2022</a:t>
             </a:fld>
             <a:endParaRPr lang="en-US" dirty="0"/>
           </a:p>
@@ -1107,7 +1463,7 @@
           <a:p>
             <a:fld id="{2145C3A9-05D9-428D-9788-A7F14838F6F9}" type="datetime1">
               <a:rPr lang="en-US" smtClean="0"/>
-              <a:t>2/1/2022</a:t>
+              <a:t>2/2/2022</a:t>
             </a:fld>
             <a:endParaRPr lang="en-US" dirty="0"/>
           </a:p>
@@ -1305,7 +1661,7 @@
           <a:p>
             <a:fld id="{82C701FB-B03E-4981-A9F8-99B474DD173A}" type="datetime1">
               <a:rPr lang="en-US" smtClean="0"/>
-              <a:t>2/1/2022</a:t>
+              <a:t>2/2/2022</a:t>
             </a:fld>
             <a:endParaRPr lang="en-US" dirty="0"/>
           </a:p>
@@ -1572,7 +1928,7 @@
           <a:p>
             <a:fld id="{7A7E8EF3-CBF7-4EB9-B6E5-3754574E3433}" type="datetime1">
               <a:rPr lang="en-US" smtClean="0"/>
-              <a:t>2/1/2022</a:t>
+              <a:t>2/2/2022</a:t>
             </a:fld>
             <a:endParaRPr lang="en-US" dirty="0"/>
           </a:p>
@@ -2012,7 +2368,7 @@
           <a:p>
             <a:fld id="{DA8A4A96-31AC-487C-9F15-1822D58542B7}" type="datetime1">
               <a:rPr lang="en-US" smtClean="0"/>
-              <a:t>2/1/2022</a:t>
+              <a:t>2/2/2022</a:t>
             </a:fld>
             <a:endParaRPr lang="en-US" dirty="0"/>
           </a:p>
@@ -2553,7 +2909,7 @@
           <a:p>
             <a:fld id="{FBBF9546-09C4-4F24-A284-5B81FF8659B4}" type="datetime1">
               <a:rPr lang="en-US" smtClean="0"/>
-              <a:t>2/1/2022</a:t>
+              <a:t>2/2/2022</a:t>
             </a:fld>
             <a:endParaRPr lang="en-US" dirty="0"/>
           </a:p>
@@ -3439,7 +3795,7 @@
           <a:p>
             <a:fld id="{5BF4405D-15A5-450B-B053-484859B9C8F7}" type="datetime1">
               <a:rPr lang="en-US" smtClean="0"/>
-              <a:t>2/1/2022</a:t>
+              <a:t>2/2/2022</a:t>
             </a:fld>
             <a:endParaRPr lang="en-US" dirty="0"/>
           </a:p>
@@ -3613,7 +3969,7 @@
           <a:p>
             <a:fld id="{E0366559-EC21-40C1-8A65-9A3B4EA78391}" type="datetime1">
               <a:rPr lang="en-US" smtClean="0"/>
-              <a:t>2/1/2022</a:t>
+              <a:t>2/2/2022</a:t>
             </a:fld>
             <a:endParaRPr lang="en-US" dirty="0"/>
           </a:p>
@@ -3801,7 +4157,7 @@
           <a:p>
             <a:fld id="{4F09CA92-695C-4FFA-8E37-4D2C288BCC04}" type="datetime1">
               <a:rPr lang="en-US" smtClean="0"/>
-              <a:t>2/1/2022</a:t>
+              <a:t>2/2/2022</a:t>
             </a:fld>
             <a:endParaRPr lang="en-US" dirty="0"/>
           </a:p>
@@ -3975,7 +4331,7 @@
           <a:p>
             <a:fld id="{CA551262-FC07-4FE4-9221-F72F7D4F209A}" type="datetime1">
               <a:rPr lang="en-US" smtClean="0"/>
-              <a:t>2/1/2022</a:t>
+              <a:t>2/2/2022</a:t>
             </a:fld>
             <a:endParaRPr lang="en-US" dirty="0"/>
           </a:p>
@@ -4223,7 +4579,7 @@
           <a:p>
             <a:fld id="{46A321E4-8899-4F7D-BEB1-BD52626ABD8D}" type="datetime1">
               <a:rPr lang="en-US" smtClean="0"/>
-              <a:t>2/1/2022</a:t>
+              <a:t>2/2/2022</a:t>
             </a:fld>
             <a:endParaRPr lang="en-US" dirty="0"/>
           </a:p>
@@ -4469,7 +4825,7 @@
           <a:p>
             <a:fld id="{B53F6DFA-8A0E-4513-867D-18B9AA66B23C}" type="datetime1">
               <a:rPr lang="en-US" smtClean="0"/>
-              <a:t>2/1/2022</a:t>
+              <a:t>2/2/2022</a:t>
             </a:fld>
             <a:endParaRPr lang="en-US" dirty="0"/>
           </a:p>
@@ -4956,7 +5312,7 @@
           <a:p>
             <a:fld id="{154283A7-B9AC-454B-A468-44B75A398B49}" type="datetime1">
               <a:rPr lang="en-US" smtClean="0"/>
-              <a:t>2/1/2022</a:t>
+              <a:t>2/2/2022</a:t>
             </a:fld>
             <a:endParaRPr lang="en-US" dirty="0"/>
           </a:p>
@@ -5078,7 +5434,7 @@
           <a:p>
             <a:fld id="{A3F8184D-DEDD-48A0-9ACA-5F6ED9EFE5B8}" type="datetime1">
               <a:rPr lang="en-US" smtClean="0"/>
-              <a:t>2/1/2022</a:t>
+              <a:t>2/2/2022</a:t>
             </a:fld>
             <a:endParaRPr lang="en-US" dirty="0"/>
           </a:p>
@@ -5177,7 +5533,7 @@
           <a:p>
             <a:fld id="{BF38AC0E-F520-48F3-BA14-8BAB82D735FB}" type="datetime1">
               <a:rPr lang="en-US" smtClean="0"/>
-              <a:t>2/1/2022</a:t>
+              <a:t>2/2/2022</a:t>
             </a:fld>
             <a:endParaRPr lang="en-US" dirty="0"/>
           </a:p>
@@ -5436,7 +5792,7 @@
           <a:p>
             <a:fld id="{317D0F2A-2724-4AD4-BF4C-A7B1910D9412}" type="datetime1">
               <a:rPr lang="en-US" smtClean="0"/>
-              <a:t>2/1/2022</a:t>
+              <a:t>2/2/2022</a:t>
             </a:fld>
             <a:endParaRPr lang="en-US" dirty="0"/>
           </a:p>
@@ -5747,7 +6103,7 @@
           <a:p>
             <a:fld id="{9A0B82A5-4A21-4F82-91DB-989CE997E82E}" type="datetime1">
               <a:rPr lang="en-US" smtClean="0"/>
-              <a:t>2/1/2022</a:t>
+              <a:t>2/2/2022</a:t>
             </a:fld>
             <a:endParaRPr lang="en-US" dirty="0"/>
           </a:p>
@@ -5984,7 +6340,7 @@
           <a:p>
             <a:fld id="{01BFEF8A-AE08-4951-B923-589F814B0C31}" type="datetime1">
               <a:rPr lang="en-US" smtClean="0"/>
-              <a:t>2/1/2022</a:t>
+              <a:t>2/2/2022</a:t>
             </a:fld>
             <a:endParaRPr lang="en-US" dirty="0"/>
           </a:p>
@@ -6820,6 +7176,2148 @@
 </p:sld>
 </file>
 
+<file path=ppt/slides/slide10.xml><?xml version="1.0" encoding="utf-8"?>
+<p:sld xmlns:a="http://schemas.openxmlformats.org/drawingml/2006/main" xmlns:r="http://schemas.openxmlformats.org/officeDocument/2006/relationships" xmlns:p="http://schemas.openxmlformats.org/presentationml/2006/main">
+  <p:cSld>
+    <p:spTree>
+      <p:nvGrpSpPr>
+        <p:cNvPr id="1" name=""/>
+        <p:cNvGrpSpPr/>
+        <p:nvPr/>
+      </p:nvGrpSpPr>
+      <p:grpSpPr>
+        <a:xfrm>
+          <a:off x="0" y="0"/>
+          <a:ext cx="0" cy="0"/>
+          <a:chOff x="0" y="0"/>
+          <a:chExt cx="0" cy="0"/>
+        </a:xfrm>
+      </p:grpSpPr>
+      <p:sp>
+        <p:nvSpPr>
+          <p:cNvPr id="2" name="Title 1">
+            <a:extLst>
+              <a:ext uri="{FF2B5EF4-FFF2-40B4-BE49-F238E27FC236}">
+                <a16:creationId xmlns:a16="http://schemas.microsoft.com/office/drawing/2014/main" id="{C43D1E7E-C96D-4F5E-ADAE-FD37B6D77466}"/>
+              </a:ext>
+            </a:extLst>
+          </p:cNvPr>
+          <p:cNvSpPr>
+            <a:spLocks noGrp="1"/>
+          </p:cNvSpPr>
+          <p:nvPr>
+            <p:ph type="title"/>
+          </p:nvPr>
+        </p:nvSpPr>
+        <p:spPr/>
+        <p:txBody>
+          <a:bodyPr/>
+          <a:lstStyle/>
+          <a:p>
+            <a:r>
+              <a:rPr lang="en-US" dirty="0"/>
+              <a:t>Demo</a:t>
+            </a:r>
+            <a:endParaRPr lang="fa-IR" dirty="0"/>
+          </a:p>
+        </p:txBody>
+      </p:sp>
+      <p:sp>
+        <p:nvSpPr>
+          <p:cNvPr id="3" name="Content Placeholder 2">
+            <a:extLst>
+              <a:ext uri="{FF2B5EF4-FFF2-40B4-BE49-F238E27FC236}">
+                <a16:creationId xmlns:a16="http://schemas.microsoft.com/office/drawing/2014/main" id="{BD2CFF4C-1F6F-4D55-B4C1-0E85200EC38F}"/>
+              </a:ext>
+            </a:extLst>
+          </p:cNvPr>
+          <p:cNvSpPr>
+            <a:spLocks noGrp="1"/>
+          </p:cNvSpPr>
+          <p:nvPr>
+            <p:ph idx="1"/>
+          </p:nvPr>
+        </p:nvSpPr>
+        <p:spPr/>
+        <p:txBody>
+          <a:bodyPr/>
+          <a:lstStyle/>
+          <a:p>
+            <a:r>
+              <a:rPr lang="en-US" dirty="0"/>
+              <a:t>Create an auth module for our authentication purposes</a:t>
+            </a:r>
+          </a:p>
+          <a:p>
+            <a:r>
+              <a:rPr lang="en-US" dirty="0"/>
+              <a:t>Auth service:</a:t>
+            </a:r>
+          </a:p>
+          <a:p>
+            <a:pPr lvl="1"/>
+            <a:r>
+              <a:rPr lang="en-US" dirty="0"/>
+              <a:t>It will inject User Service</a:t>
+            </a:r>
+          </a:p>
+          <a:p>
+            <a:pPr lvl="1"/>
+            <a:r>
+              <a:rPr lang="en-US" dirty="0" err="1"/>
+              <a:t>validateUser</a:t>
+            </a:r>
+            <a:r>
+              <a:rPr lang="en-US" dirty="0"/>
+              <a:t>()</a:t>
+            </a:r>
+          </a:p>
+          <a:p>
+            <a:pPr lvl="2"/>
+            <a:r>
+              <a:rPr lang="en-US" dirty="0"/>
+              <a:t>If user exists and password correct?</a:t>
+            </a:r>
+          </a:p>
+          <a:p>
+            <a:pPr lvl="2"/>
+            <a:r>
+              <a:rPr lang="en-US" dirty="0"/>
+              <a:t>Find use by username</a:t>
+            </a:r>
+          </a:p>
+          <a:p>
+            <a:pPr lvl="2"/>
+            <a:r>
+              <a:rPr lang="en-US" dirty="0"/>
+              <a:t>Check if the given password matches the real one in </a:t>
+            </a:r>
+            <a:r>
+              <a:rPr lang="en-US" dirty="0" err="1"/>
+              <a:t>db</a:t>
+            </a:r>
+            <a:r>
+              <a:rPr lang="en-US" dirty="0"/>
+              <a:t> (don’t forget to hash it)</a:t>
+            </a:r>
+          </a:p>
+          <a:p>
+            <a:pPr lvl="2"/>
+            <a:r>
+              <a:rPr lang="en-US" dirty="0"/>
+              <a:t>If user validated return it</a:t>
+            </a:r>
+          </a:p>
+          <a:p>
+            <a:pPr lvl="3"/>
+            <a:r>
+              <a:rPr lang="en-US" dirty="0"/>
+              <a:t>DON’T FORGET to remove password field!</a:t>
+            </a:r>
+          </a:p>
+          <a:p>
+            <a:pPr lvl="3"/>
+            <a:r>
+              <a:rPr lang="en-US" dirty="0"/>
+              <a:t>@exclude() is your friend in these situations</a:t>
+            </a:r>
+          </a:p>
+          <a:p>
+            <a:pPr lvl="2"/>
+            <a:endParaRPr lang="en-US" dirty="0"/>
+          </a:p>
+          <a:p>
+            <a:pPr lvl="1"/>
+            <a:endParaRPr lang="en-US" dirty="0"/>
+          </a:p>
+        </p:txBody>
+      </p:sp>
+      <p:sp>
+        <p:nvSpPr>
+          <p:cNvPr id="4" name="Footer Placeholder 3">
+            <a:extLst>
+              <a:ext uri="{FF2B5EF4-FFF2-40B4-BE49-F238E27FC236}">
+                <a16:creationId xmlns:a16="http://schemas.microsoft.com/office/drawing/2014/main" id="{314AE733-17FC-4978-8946-25E688CAA525}"/>
+              </a:ext>
+            </a:extLst>
+          </p:cNvPr>
+          <p:cNvSpPr>
+            <a:spLocks noGrp="1"/>
+          </p:cNvSpPr>
+          <p:nvPr>
+            <p:ph type="ftr" sz="quarter" idx="11"/>
+          </p:nvPr>
+        </p:nvSpPr>
+        <p:spPr/>
+        <p:txBody>
+          <a:bodyPr/>
+          <a:lstStyle/>
+          <a:p>
+            <a:r>
+              <a:rPr lang="en-US"/>
+              <a:t>Nodejs Basics</a:t>
+            </a:r>
+            <a:endParaRPr lang="en-US" dirty="0"/>
+          </a:p>
+        </p:txBody>
+      </p:sp>
+      <p:sp>
+        <p:nvSpPr>
+          <p:cNvPr id="5" name="Slide Number Placeholder 4">
+            <a:extLst>
+              <a:ext uri="{FF2B5EF4-FFF2-40B4-BE49-F238E27FC236}">
+                <a16:creationId xmlns:a16="http://schemas.microsoft.com/office/drawing/2014/main" id="{A9C1E0AE-5C8B-4B64-9B72-9F410FF006A6}"/>
+              </a:ext>
+            </a:extLst>
+          </p:cNvPr>
+          <p:cNvSpPr>
+            <a:spLocks noGrp="1"/>
+          </p:cNvSpPr>
+          <p:nvPr>
+            <p:ph type="sldNum" sz="quarter" idx="12"/>
+          </p:nvPr>
+        </p:nvSpPr>
+        <p:spPr/>
+        <p:txBody>
+          <a:bodyPr/>
+          <a:lstStyle/>
+          <a:p>
+            <a:fld id="{3A98EE3D-8CD1-4C3F-BD1C-C98C9596463C}" type="slidenum">
+              <a:rPr lang="en-US" smtClean="0"/>
+              <a:t>10</a:t>
+            </a:fld>
+            <a:endParaRPr lang="en-US" dirty="0"/>
+          </a:p>
+        </p:txBody>
+      </p:sp>
+    </p:spTree>
+    <p:extLst>
+      <p:ext uri="{BB962C8B-B14F-4D97-AF65-F5344CB8AC3E}">
+        <p14:creationId xmlns:p14="http://schemas.microsoft.com/office/powerpoint/2010/main" val="399422306"/>
+      </p:ext>
+    </p:extLst>
+  </p:cSld>
+  <p:clrMapOvr>
+    <a:masterClrMapping/>
+  </p:clrMapOvr>
+</p:sld>
+</file>
+
+<file path=ppt/slides/slide11.xml><?xml version="1.0" encoding="utf-8"?>
+<p:sld xmlns:a="http://schemas.openxmlformats.org/drawingml/2006/main" xmlns:r="http://schemas.openxmlformats.org/officeDocument/2006/relationships" xmlns:p="http://schemas.openxmlformats.org/presentationml/2006/main">
+  <p:cSld>
+    <p:spTree>
+      <p:nvGrpSpPr>
+        <p:cNvPr id="1" name=""/>
+        <p:cNvGrpSpPr/>
+        <p:nvPr/>
+      </p:nvGrpSpPr>
+      <p:grpSpPr>
+        <a:xfrm>
+          <a:off x="0" y="0"/>
+          <a:ext cx="0" cy="0"/>
+          <a:chOff x="0" y="0"/>
+          <a:chExt cx="0" cy="0"/>
+        </a:xfrm>
+      </p:grpSpPr>
+      <p:sp>
+        <p:nvSpPr>
+          <p:cNvPr id="2" name="Title 1">
+            <a:extLst>
+              <a:ext uri="{FF2B5EF4-FFF2-40B4-BE49-F238E27FC236}">
+                <a16:creationId xmlns:a16="http://schemas.microsoft.com/office/drawing/2014/main" id="{89BA0F43-79AE-49ED-814B-D3934273FFD8}"/>
+              </a:ext>
+            </a:extLst>
+          </p:cNvPr>
+          <p:cNvSpPr>
+            <a:spLocks noGrp="1"/>
+          </p:cNvSpPr>
+          <p:nvPr>
+            <p:ph type="title"/>
+          </p:nvPr>
+        </p:nvSpPr>
+        <p:spPr/>
+        <p:txBody>
+          <a:bodyPr/>
+          <a:lstStyle/>
+          <a:p>
+            <a:r>
+              <a:rPr lang="en-US" dirty="0"/>
+              <a:t>Demo</a:t>
+            </a:r>
+            <a:endParaRPr lang="fa-IR" dirty="0"/>
+          </a:p>
+        </p:txBody>
+      </p:sp>
+      <p:sp>
+        <p:nvSpPr>
+          <p:cNvPr id="3" name="Content Placeholder 2">
+            <a:extLst>
+              <a:ext uri="{FF2B5EF4-FFF2-40B4-BE49-F238E27FC236}">
+                <a16:creationId xmlns:a16="http://schemas.microsoft.com/office/drawing/2014/main" id="{87656D3F-3293-4178-8192-ACE63DCBF579}"/>
+              </a:ext>
+            </a:extLst>
+          </p:cNvPr>
+          <p:cNvSpPr>
+            <a:spLocks noGrp="1"/>
+          </p:cNvSpPr>
+          <p:nvPr>
+            <p:ph idx="1"/>
+          </p:nvPr>
+        </p:nvSpPr>
+        <p:spPr/>
+        <p:txBody>
+          <a:bodyPr>
+            <a:normAutofit lnSpcReduction="10000"/>
+          </a:bodyPr>
+          <a:lstStyle/>
+          <a:p>
+            <a:r>
+              <a:rPr lang="en-US" dirty="0"/>
+              <a:t>Next step, create our first strategy, local strategy</a:t>
+            </a:r>
+          </a:p>
+          <a:p>
+            <a:pPr lvl="1"/>
+            <a:r>
+              <a:rPr lang="en-US" dirty="0"/>
+              <a:t>Extends </a:t>
+            </a:r>
+            <a:r>
+              <a:rPr lang="en-US" dirty="0" err="1"/>
+              <a:t>PassportStrategy</a:t>
+            </a:r>
+            <a:r>
+              <a:rPr lang="en-US" dirty="0"/>
+              <a:t>(Strategy)</a:t>
+            </a:r>
+          </a:p>
+          <a:p>
+            <a:pPr lvl="2"/>
+            <a:r>
+              <a:rPr lang="en-US" dirty="0"/>
+              <a:t>The one that exists in passport-local package (you installed it before)</a:t>
+            </a:r>
+          </a:p>
+          <a:p>
+            <a:pPr lvl="1"/>
+            <a:r>
+              <a:rPr lang="en-US" dirty="0"/>
+              <a:t>Each strategy has two main thing:</a:t>
+            </a:r>
+          </a:p>
+          <a:p>
+            <a:pPr lvl="2"/>
+            <a:r>
+              <a:rPr lang="en-US" dirty="0"/>
+              <a:t>Configuration (through super method in constructor)</a:t>
+            </a:r>
+          </a:p>
+          <a:p>
+            <a:pPr lvl="2"/>
+            <a:r>
+              <a:rPr lang="en-US" dirty="0"/>
+              <a:t>Validate (if user validated or not, using our </a:t>
+            </a:r>
+            <a:r>
+              <a:rPr lang="en-US" dirty="0" err="1"/>
+              <a:t>authService</a:t>
+            </a:r>
+            <a:r>
+              <a:rPr lang="en-US" dirty="0"/>
+              <a:t> which has been injected)</a:t>
+            </a:r>
+          </a:p>
+          <a:p>
+            <a:pPr lvl="3"/>
+            <a:r>
+              <a:rPr lang="en-US" dirty="0"/>
+              <a:t>This method should return user</a:t>
+            </a:r>
+          </a:p>
+          <a:p>
+            <a:pPr lvl="3"/>
+            <a:r>
+              <a:rPr lang="en-US" dirty="0"/>
+              <a:t>Remember to throw </a:t>
+            </a:r>
+            <a:r>
+              <a:rPr lang="en-US" dirty="0" err="1"/>
+              <a:t>UnauthorizedException</a:t>
+            </a:r>
+            <a:r>
+              <a:rPr lang="en-US" dirty="0"/>
+              <a:t> if user does not exist</a:t>
+            </a:r>
+          </a:p>
+          <a:p>
+            <a:pPr lvl="3"/>
+            <a:r>
+              <a:rPr lang="en-US" dirty="0"/>
+              <a:t>This validate method will map to the Verify callback in passport</a:t>
+            </a:r>
+          </a:p>
+          <a:p>
+            <a:pPr lvl="3"/>
+            <a:r>
+              <a:rPr lang="en-US" dirty="0"/>
+              <a:t>Remember: this function input data may vary from strategy to another strategy, for local strategy, inputs are: username and password</a:t>
+            </a:r>
+          </a:p>
+          <a:p>
+            <a:pPr lvl="1"/>
+            <a:r>
+              <a:rPr lang="en-US" dirty="0">
+                <a:solidFill>
+                  <a:srgbClr val="FF0000"/>
+                </a:solidFill>
+              </a:rPr>
+              <a:t>NOTE: It is important to </a:t>
+            </a:r>
+            <a:r>
+              <a:rPr lang="en-US" dirty="0" err="1">
+                <a:solidFill>
+                  <a:srgbClr val="FF0000"/>
+                </a:solidFill>
+              </a:rPr>
+              <a:t>PassportModule</a:t>
+            </a:r>
+            <a:r>
+              <a:rPr lang="en-US" dirty="0">
+                <a:solidFill>
+                  <a:srgbClr val="FF0000"/>
+                </a:solidFill>
+              </a:rPr>
+              <a:t> and provide </a:t>
+            </a:r>
+            <a:r>
+              <a:rPr lang="en-US" dirty="0" err="1">
+                <a:solidFill>
+                  <a:srgbClr val="FF0000"/>
+                </a:solidFill>
+              </a:rPr>
+              <a:t>LocalStrategy</a:t>
+            </a:r>
+            <a:endParaRPr lang="fa-IR" dirty="0">
+              <a:solidFill>
+                <a:srgbClr val="FF0000"/>
+              </a:solidFill>
+            </a:endParaRPr>
+          </a:p>
+        </p:txBody>
+      </p:sp>
+      <p:sp>
+        <p:nvSpPr>
+          <p:cNvPr id="4" name="Footer Placeholder 3">
+            <a:extLst>
+              <a:ext uri="{FF2B5EF4-FFF2-40B4-BE49-F238E27FC236}">
+                <a16:creationId xmlns:a16="http://schemas.microsoft.com/office/drawing/2014/main" id="{9466BED1-545F-422F-9DCE-D7BAC7239B43}"/>
+              </a:ext>
+            </a:extLst>
+          </p:cNvPr>
+          <p:cNvSpPr>
+            <a:spLocks noGrp="1"/>
+          </p:cNvSpPr>
+          <p:nvPr>
+            <p:ph type="ftr" sz="quarter" idx="11"/>
+          </p:nvPr>
+        </p:nvSpPr>
+        <p:spPr/>
+        <p:txBody>
+          <a:bodyPr/>
+          <a:lstStyle/>
+          <a:p>
+            <a:r>
+              <a:rPr lang="en-US"/>
+              <a:t>Nodejs Basics</a:t>
+            </a:r>
+            <a:endParaRPr lang="en-US" dirty="0"/>
+          </a:p>
+        </p:txBody>
+      </p:sp>
+      <p:sp>
+        <p:nvSpPr>
+          <p:cNvPr id="5" name="Slide Number Placeholder 4">
+            <a:extLst>
+              <a:ext uri="{FF2B5EF4-FFF2-40B4-BE49-F238E27FC236}">
+                <a16:creationId xmlns:a16="http://schemas.microsoft.com/office/drawing/2014/main" id="{C11601FE-0069-4395-B6AD-980CB7921848}"/>
+              </a:ext>
+            </a:extLst>
+          </p:cNvPr>
+          <p:cNvSpPr>
+            <a:spLocks noGrp="1"/>
+          </p:cNvSpPr>
+          <p:nvPr>
+            <p:ph type="sldNum" sz="quarter" idx="12"/>
+          </p:nvPr>
+        </p:nvSpPr>
+        <p:spPr/>
+        <p:txBody>
+          <a:bodyPr/>
+          <a:lstStyle/>
+          <a:p>
+            <a:fld id="{3A98EE3D-8CD1-4C3F-BD1C-C98C9596463C}" type="slidenum">
+              <a:rPr lang="en-US" smtClean="0"/>
+              <a:t>11</a:t>
+            </a:fld>
+            <a:endParaRPr lang="en-US" dirty="0"/>
+          </a:p>
+        </p:txBody>
+      </p:sp>
+    </p:spTree>
+    <p:extLst>
+      <p:ext uri="{BB962C8B-B14F-4D97-AF65-F5344CB8AC3E}">
+        <p14:creationId xmlns:p14="http://schemas.microsoft.com/office/powerpoint/2010/main" val="1380841284"/>
+      </p:ext>
+    </p:extLst>
+  </p:cSld>
+  <p:clrMapOvr>
+    <a:masterClrMapping/>
+  </p:clrMapOvr>
+</p:sld>
+</file>
+
+<file path=ppt/slides/slide12.xml><?xml version="1.0" encoding="utf-8"?>
+<p:sld xmlns:a="http://schemas.openxmlformats.org/drawingml/2006/main" xmlns:r="http://schemas.openxmlformats.org/officeDocument/2006/relationships" xmlns:p="http://schemas.openxmlformats.org/presentationml/2006/main">
+  <p:cSld>
+    <p:spTree>
+      <p:nvGrpSpPr>
+        <p:cNvPr id="1" name=""/>
+        <p:cNvGrpSpPr/>
+        <p:nvPr/>
+      </p:nvGrpSpPr>
+      <p:grpSpPr>
+        <a:xfrm>
+          <a:off x="0" y="0"/>
+          <a:ext cx="0" cy="0"/>
+          <a:chOff x="0" y="0"/>
+          <a:chExt cx="0" cy="0"/>
+        </a:xfrm>
+      </p:grpSpPr>
+      <p:sp>
+        <p:nvSpPr>
+          <p:cNvPr id="2" name="Title 1">
+            <a:extLst>
+              <a:ext uri="{FF2B5EF4-FFF2-40B4-BE49-F238E27FC236}">
+                <a16:creationId xmlns:a16="http://schemas.microsoft.com/office/drawing/2014/main" id="{ED017DD1-9D8B-4A23-A0FF-20CC21BA5878}"/>
+              </a:ext>
+            </a:extLst>
+          </p:cNvPr>
+          <p:cNvSpPr>
+            <a:spLocks noGrp="1"/>
+          </p:cNvSpPr>
+          <p:nvPr>
+            <p:ph type="title"/>
+          </p:nvPr>
+        </p:nvSpPr>
+        <p:spPr/>
+        <p:txBody>
+          <a:bodyPr/>
+          <a:lstStyle/>
+          <a:p>
+            <a:r>
+              <a:rPr lang="en-US" dirty="0"/>
+              <a:t>Demo</a:t>
+            </a:r>
+          </a:p>
+        </p:txBody>
+      </p:sp>
+      <p:sp>
+        <p:nvSpPr>
+          <p:cNvPr id="3" name="Content Placeholder 2">
+            <a:extLst>
+              <a:ext uri="{FF2B5EF4-FFF2-40B4-BE49-F238E27FC236}">
+                <a16:creationId xmlns:a16="http://schemas.microsoft.com/office/drawing/2014/main" id="{C27B49A7-8084-42B7-8F39-6FF987C5CC5B}"/>
+              </a:ext>
+            </a:extLst>
+          </p:cNvPr>
+          <p:cNvSpPr>
+            <a:spLocks noGrp="1"/>
+          </p:cNvSpPr>
+          <p:nvPr>
+            <p:ph idx="1"/>
+          </p:nvPr>
+        </p:nvSpPr>
+        <p:spPr/>
+        <p:txBody>
+          <a:bodyPr/>
+          <a:lstStyle/>
+          <a:p>
+            <a:r>
+              <a:rPr lang="en-US" dirty="0"/>
+              <a:t>How to use this newly created guard?</a:t>
+            </a:r>
+          </a:p>
+          <a:p>
+            <a:pPr lvl="1"/>
+            <a:r>
+              <a:rPr lang="en-US" dirty="0"/>
+              <a:t>@UseGuard(AuthGuard(‘local’))</a:t>
+            </a:r>
+          </a:p>
+          <a:p>
+            <a:pPr lvl="2"/>
+            <a:r>
+              <a:rPr lang="en-US" dirty="0"/>
+              <a:t>Like old times </a:t>
+            </a:r>
+            <a:r>
+              <a:rPr lang="en-US" dirty="0">
+                <a:sym typeface="Wingdings" panose="05000000000000000000" pitchFamily="2" charset="2"/>
+              </a:rPr>
+              <a:t> </a:t>
+            </a:r>
+            <a:r>
+              <a:rPr lang="en-US" dirty="0" err="1"/>
+              <a:t>passport.authenticate</a:t>
+            </a:r>
+            <a:r>
+              <a:rPr lang="en-US" dirty="0"/>
+              <a:t>(‘local’)</a:t>
+            </a:r>
+          </a:p>
+          <a:p>
+            <a:pPr lvl="1"/>
+            <a:r>
+              <a:rPr lang="en-US" dirty="0"/>
+              <a:t>Once the use validated, then the request object has a new object called: </a:t>
+            </a:r>
+            <a:r>
+              <a:rPr lang="en-US" dirty="0">
+                <a:solidFill>
+                  <a:srgbClr val="00B050"/>
+                </a:solidFill>
+              </a:rPr>
+              <a:t>user</a:t>
+            </a:r>
+          </a:p>
+          <a:p>
+            <a:pPr lvl="2"/>
+            <a:r>
+              <a:rPr lang="en-US" dirty="0"/>
+              <a:t>return </a:t>
+            </a:r>
+            <a:r>
+              <a:rPr lang="en-US" dirty="0" err="1"/>
+              <a:t>req.user</a:t>
+            </a:r>
+            <a:r>
+              <a:rPr lang="en-US" dirty="0"/>
+              <a:t>;</a:t>
+            </a:r>
+          </a:p>
+          <a:p>
+            <a:pPr lvl="1"/>
+            <a:r>
+              <a:rPr lang="en-US" dirty="0"/>
+              <a:t>Don’t forget to pass the { username, password } body</a:t>
+            </a:r>
+          </a:p>
+        </p:txBody>
+      </p:sp>
+      <p:sp>
+        <p:nvSpPr>
+          <p:cNvPr id="4" name="Footer Placeholder 3">
+            <a:extLst>
+              <a:ext uri="{FF2B5EF4-FFF2-40B4-BE49-F238E27FC236}">
+                <a16:creationId xmlns:a16="http://schemas.microsoft.com/office/drawing/2014/main" id="{00A5F9B3-84F1-4955-B967-86B3D83D92D2}"/>
+              </a:ext>
+            </a:extLst>
+          </p:cNvPr>
+          <p:cNvSpPr>
+            <a:spLocks noGrp="1"/>
+          </p:cNvSpPr>
+          <p:nvPr>
+            <p:ph type="ftr" sz="quarter" idx="11"/>
+          </p:nvPr>
+        </p:nvSpPr>
+        <p:spPr/>
+        <p:txBody>
+          <a:bodyPr/>
+          <a:lstStyle/>
+          <a:p>
+            <a:r>
+              <a:rPr lang="en-US"/>
+              <a:t>Nodejs Basics</a:t>
+            </a:r>
+            <a:endParaRPr lang="en-US" dirty="0"/>
+          </a:p>
+        </p:txBody>
+      </p:sp>
+      <p:sp>
+        <p:nvSpPr>
+          <p:cNvPr id="5" name="Slide Number Placeholder 4">
+            <a:extLst>
+              <a:ext uri="{FF2B5EF4-FFF2-40B4-BE49-F238E27FC236}">
+                <a16:creationId xmlns:a16="http://schemas.microsoft.com/office/drawing/2014/main" id="{2278B70D-37CB-4B48-8AE8-C7280813A877}"/>
+              </a:ext>
+            </a:extLst>
+          </p:cNvPr>
+          <p:cNvSpPr>
+            <a:spLocks noGrp="1"/>
+          </p:cNvSpPr>
+          <p:nvPr>
+            <p:ph type="sldNum" sz="quarter" idx="12"/>
+          </p:nvPr>
+        </p:nvSpPr>
+        <p:spPr/>
+        <p:txBody>
+          <a:bodyPr/>
+          <a:lstStyle/>
+          <a:p>
+            <a:fld id="{3A98EE3D-8CD1-4C3F-BD1C-C98C9596463C}" type="slidenum">
+              <a:rPr lang="en-US" smtClean="0"/>
+              <a:t>12</a:t>
+            </a:fld>
+            <a:endParaRPr lang="en-US" dirty="0"/>
+          </a:p>
+        </p:txBody>
+      </p:sp>
+    </p:spTree>
+    <p:extLst>
+      <p:ext uri="{BB962C8B-B14F-4D97-AF65-F5344CB8AC3E}">
+        <p14:creationId xmlns:p14="http://schemas.microsoft.com/office/powerpoint/2010/main" val="1772769577"/>
+      </p:ext>
+    </p:extLst>
+  </p:cSld>
+  <p:clrMapOvr>
+    <a:masterClrMapping/>
+  </p:clrMapOvr>
+</p:sld>
+</file>
+
+<file path=ppt/slides/slide13.xml><?xml version="1.0" encoding="utf-8"?>
+<p:sld xmlns:a="http://schemas.openxmlformats.org/drawingml/2006/main" xmlns:r="http://schemas.openxmlformats.org/officeDocument/2006/relationships" xmlns:p="http://schemas.openxmlformats.org/presentationml/2006/main">
+  <p:cSld>
+    <p:spTree>
+      <p:nvGrpSpPr>
+        <p:cNvPr id="1" name=""/>
+        <p:cNvGrpSpPr/>
+        <p:nvPr/>
+      </p:nvGrpSpPr>
+      <p:grpSpPr>
+        <a:xfrm>
+          <a:off x="0" y="0"/>
+          <a:ext cx="0" cy="0"/>
+          <a:chOff x="0" y="0"/>
+          <a:chExt cx="0" cy="0"/>
+        </a:xfrm>
+      </p:grpSpPr>
+      <p:sp>
+        <p:nvSpPr>
+          <p:cNvPr id="2" name="Title 1">
+            <a:extLst>
+              <a:ext uri="{FF2B5EF4-FFF2-40B4-BE49-F238E27FC236}">
+                <a16:creationId xmlns:a16="http://schemas.microsoft.com/office/drawing/2014/main" id="{AC385EE2-B82F-4F5C-9FA7-D7FCDB8D560D}"/>
+              </a:ext>
+            </a:extLst>
+          </p:cNvPr>
+          <p:cNvSpPr>
+            <a:spLocks noGrp="1"/>
+          </p:cNvSpPr>
+          <p:nvPr>
+            <p:ph type="title"/>
+          </p:nvPr>
+        </p:nvSpPr>
+        <p:spPr/>
+        <p:txBody>
+          <a:bodyPr/>
+          <a:lstStyle/>
+          <a:p>
+            <a:r>
+              <a:rPr lang="en-US" dirty="0"/>
+              <a:t>Demo</a:t>
+            </a:r>
+          </a:p>
+        </p:txBody>
+      </p:sp>
+      <p:sp>
+        <p:nvSpPr>
+          <p:cNvPr id="3" name="Content Placeholder 2">
+            <a:extLst>
+              <a:ext uri="{FF2B5EF4-FFF2-40B4-BE49-F238E27FC236}">
+                <a16:creationId xmlns:a16="http://schemas.microsoft.com/office/drawing/2014/main" id="{731FCB6C-5080-49E2-81E8-E7B4AFACF6AC}"/>
+              </a:ext>
+            </a:extLst>
+          </p:cNvPr>
+          <p:cNvSpPr>
+            <a:spLocks noGrp="1"/>
+          </p:cNvSpPr>
+          <p:nvPr>
+            <p:ph idx="1"/>
+          </p:nvPr>
+        </p:nvSpPr>
+        <p:spPr/>
+        <p:txBody>
+          <a:bodyPr/>
+          <a:lstStyle/>
+          <a:p>
+            <a:r>
+              <a:rPr lang="en-US" dirty="0"/>
+              <a:t>How about other protected route?</a:t>
+            </a:r>
+          </a:p>
+          <a:p>
+            <a:pPr lvl="1"/>
+            <a:r>
+              <a:rPr lang="en-US" dirty="0"/>
+              <a:t>We can’t pass the username, password of the user in each request, IT ISN’T SECURE!!!!!!!!</a:t>
+            </a:r>
+          </a:p>
+          <a:p>
+            <a:pPr lvl="1"/>
+            <a:r>
+              <a:rPr lang="en-US" dirty="0"/>
+              <a:t>There it comes some ways to store user logins</a:t>
+            </a:r>
+          </a:p>
+          <a:p>
+            <a:pPr lvl="2"/>
+            <a:r>
+              <a:rPr lang="en-US" dirty="0"/>
+              <a:t>Session, stores user session inside server</a:t>
+            </a:r>
+          </a:p>
+          <a:p>
+            <a:pPr lvl="3"/>
+            <a:r>
+              <a:rPr lang="en-US" dirty="0"/>
+              <a:t>Introduce states, we have to store that in server side (</a:t>
+            </a:r>
+            <a:r>
+              <a:rPr lang="en-US" dirty="0" err="1"/>
+              <a:t>db</a:t>
+            </a:r>
+            <a:r>
+              <a:rPr lang="en-US" dirty="0"/>
+              <a:t>, </a:t>
+            </a:r>
+            <a:r>
+              <a:rPr lang="en-US" dirty="0" err="1"/>
+              <a:t>redis</a:t>
+            </a:r>
+            <a:r>
+              <a:rPr lang="en-US" dirty="0"/>
+              <a:t>, …)</a:t>
+            </a:r>
+          </a:p>
+          <a:p>
+            <a:pPr lvl="3"/>
+            <a:r>
+              <a:rPr lang="en-US" dirty="0"/>
+              <a:t>Cloud services don’t have any states </a:t>
+            </a:r>
+            <a:r>
+              <a:rPr lang="en-US" dirty="0">
+                <a:sym typeface="Wingdings" panose="05000000000000000000" pitchFamily="2" charset="2"/>
+              </a:rPr>
+              <a:t></a:t>
+            </a:r>
+          </a:p>
+          <a:p>
+            <a:pPr lvl="2"/>
+            <a:r>
+              <a:rPr lang="en-US" dirty="0">
+                <a:sym typeface="Wingdings" panose="05000000000000000000" pitchFamily="2" charset="2"/>
+              </a:rPr>
+              <a:t>Tokens, JWT tokens are stored in client side</a:t>
+            </a:r>
+          </a:p>
+          <a:p>
+            <a:pPr lvl="3"/>
+            <a:r>
+              <a:rPr lang="en-US" dirty="0">
+                <a:sym typeface="Wingdings" panose="05000000000000000000" pitchFamily="2" charset="2"/>
+              </a:rPr>
+              <a:t>They are validating server side</a:t>
+            </a:r>
+          </a:p>
+          <a:p>
+            <a:pPr lvl="3"/>
+            <a:r>
+              <a:rPr lang="en-US" dirty="0">
+                <a:sym typeface="Wingdings" panose="05000000000000000000" pitchFamily="2" charset="2"/>
+              </a:rPr>
+              <a:t>There isn’t any state, and cloud are welcome us </a:t>
+            </a:r>
+          </a:p>
+          <a:p>
+            <a:pPr lvl="2"/>
+            <a:endParaRPr lang="en-US" dirty="0"/>
+          </a:p>
+        </p:txBody>
+      </p:sp>
+      <p:sp>
+        <p:nvSpPr>
+          <p:cNvPr id="4" name="Footer Placeholder 3">
+            <a:extLst>
+              <a:ext uri="{FF2B5EF4-FFF2-40B4-BE49-F238E27FC236}">
+                <a16:creationId xmlns:a16="http://schemas.microsoft.com/office/drawing/2014/main" id="{EA05D638-DDFA-4F94-97B7-9241B4BF2B42}"/>
+              </a:ext>
+            </a:extLst>
+          </p:cNvPr>
+          <p:cNvSpPr>
+            <a:spLocks noGrp="1"/>
+          </p:cNvSpPr>
+          <p:nvPr>
+            <p:ph type="ftr" sz="quarter" idx="11"/>
+          </p:nvPr>
+        </p:nvSpPr>
+        <p:spPr/>
+        <p:txBody>
+          <a:bodyPr/>
+          <a:lstStyle/>
+          <a:p>
+            <a:r>
+              <a:rPr lang="en-US"/>
+              <a:t>Nodejs Basics</a:t>
+            </a:r>
+            <a:endParaRPr lang="en-US" dirty="0"/>
+          </a:p>
+        </p:txBody>
+      </p:sp>
+      <p:sp>
+        <p:nvSpPr>
+          <p:cNvPr id="5" name="Slide Number Placeholder 4">
+            <a:extLst>
+              <a:ext uri="{FF2B5EF4-FFF2-40B4-BE49-F238E27FC236}">
+                <a16:creationId xmlns:a16="http://schemas.microsoft.com/office/drawing/2014/main" id="{73168644-470F-4B44-88FD-5A7440E0CBF6}"/>
+              </a:ext>
+            </a:extLst>
+          </p:cNvPr>
+          <p:cNvSpPr>
+            <a:spLocks noGrp="1"/>
+          </p:cNvSpPr>
+          <p:nvPr>
+            <p:ph type="sldNum" sz="quarter" idx="12"/>
+          </p:nvPr>
+        </p:nvSpPr>
+        <p:spPr/>
+        <p:txBody>
+          <a:bodyPr/>
+          <a:lstStyle/>
+          <a:p>
+            <a:fld id="{3A98EE3D-8CD1-4C3F-BD1C-C98C9596463C}" type="slidenum">
+              <a:rPr lang="en-US" smtClean="0"/>
+              <a:t>13</a:t>
+            </a:fld>
+            <a:endParaRPr lang="en-US" dirty="0"/>
+          </a:p>
+        </p:txBody>
+      </p:sp>
+    </p:spTree>
+    <p:extLst>
+      <p:ext uri="{BB962C8B-B14F-4D97-AF65-F5344CB8AC3E}">
+        <p14:creationId xmlns:p14="http://schemas.microsoft.com/office/powerpoint/2010/main" val="514267776"/>
+      </p:ext>
+    </p:extLst>
+  </p:cSld>
+  <p:clrMapOvr>
+    <a:masterClrMapping/>
+  </p:clrMapOvr>
+</p:sld>
+</file>
+
+<file path=ppt/slides/slide14.xml><?xml version="1.0" encoding="utf-8"?>
+<p:sld xmlns:a="http://schemas.openxmlformats.org/drawingml/2006/main" xmlns:r="http://schemas.openxmlformats.org/officeDocument/2006/relationships" xmlns:p="http://schemas.openxmlformats.org/presentationml/2006/main">
+  <p:cSld>
+    <p:spTree>
+      <p:nvGrpSpPr>
+        <p:cNvPr id="1" name=""/>
+        <p:cNvGrpSpPr/>
+        <p:nvPr/>
+      </p:nvGrpSpPr>
+      <p:grpSpPr>
+        <a:xfrm>
+          <a:off x="0" y="0"/>
+          <a:ext cx="0" cy="0"/>
+          <a:chOff x="0" y="0"/>
+          <a:chExt cx="0" cy="0"/>
+        </a:xfrm>
+      </p:grpSpPr>
+      <p:sp>
+        <p:nvSpPr>
+          <p:cNvPr id="2" name="Title 1">
+            <a:extLst>
+              <a:ext uri="{FF2B5EF4-FFF2-40B4-BE49-F238E27FC236}">
+                <a16:creationId xmlns:a16="http://schemas.microsoft.com/office/drawing/2014/main" id="{A984C9FB-F5BB-41C3-895D-22D9C195CDFC}"/>
+              </a:ext>
+            </a:extLst>
+          </p:cNvPr>
+          <p:cNvSpPr>
+            <a:spLocks noGrp="1"/>
+          </p:cNvSpPr>
+          <p:nvPr>
+            <p:ph type="title"/>
+          </p:nvPr>
+        </p:nvSpPr>
+        <p:spPr/>
+        <p:txBody>
+          <a:bodyPr/>
+          <a:lstStyle/>
+          <a:p>
+            <a:r>
+              <a:rPr lang="en-US" dirty="0"/>
+              <a:t>Demo</a:t>
+            </a:r>
+          </a:p>
+        </p:txBody>
+      </p:sp>
+      <p:sp>
+        <p:nvSpPr>
+          <p:cNvPr id="3" name="Content Placeholder 2">
+            <a:extLst>
+              <a:ext uri="{FF2B5EF4-FFF2-40B4-BE49-F238E27FC236}">
+                <a16:creationId xmlns:a16="http://schemas.microsoft.com/office/drawing/2014/main" id="{C9980433-F1BF-4EA6-8D2F-14E0A72FC3A8}"/>
+              </a:ext>
+            </a:extLst>
+          </p:cNvPr>
+          <p:cNvSpPr>
+            <a:spLocks noGrp="1"/>
+          </p:cNvSpPr>
+          <p:nvPr>
+            <p:ph idx="1"/>
+          </p:nvPr>
+        </p:nvSpPr>
+        <p:spPr>
+          <a:xfrm>
+            <a:off x="913795" y="1620982"/>
+            <a:ext cx="10353762" cy="4596938"/>
+          </a:xfrm>
+        </p:spPr>
+        <p:txBody>
+          <a:bodyPr>
+            <a:normAutofit fontScale="92500"/>
+          </a:bodyPr>
+          <a:lstStyle/>
+          <a:p>
+            <a:r>
+              <a:rPr lang="en-US" dirty="0"/>
+              <a:t>Sessions</a:t>
+            </a:r>
+          </a:p>
+          <a:p>
+            <a:pPr lvl="1"/>
+            <a:r>
+              <a:rPr lang="en-US" dirty="0"/>
+              <a:t>With session, we just store the key of storage client side (in cookies), but the real user information are stored back server side (</a:t>
+            </a:r>
+            <a:r>
+              <a:rPr lang="en-US" dirty="0" err="1"/>
+              <a:t>redis</a:t>
+            </a:r>
+            <a:r>
+              <a:rPr lang="en-US" dirty="0"/>
+              <a:t>, </a:t>
+            </a:r>
+            <a:r>
+              <a:rPr lang="en-US" dirty="0" err="1"/>
+              <a:t>db</a:t>
+            </a:r>
+            <a:r>
+              <a:rPr lang="en-US" dirty="0"/>
+              <a:t>, in-memory, …)</a:t>
+            </a:r>
+            <a:endParaRPr lang="fa-IR" dirty="0"/>
+          </a:p>
+          <a:p>
+            <a:pPr lvl="1"/>
+            <a:r>
+              <a:rPr lang="en-US" dirty="0" err="1"/>
+              <a:t>npm</a:t>
+            </a:r>
+            <a:r>
+              <a:rPr lang="en-US" dirty="0"/>
+              <a:t> install express-session</a:t>
+            </a:r>
+          </a:p>
+          <a:p>
+            <a:pPr lvl="1"/>
+            <a:r>
+              <a:rPr lang="en-US" dirty="0"/>
+              <a:t>Create a simple guard for our purpose, return </a:t>
+            </a:r>
+            <a:r>
+              <a:rPr lang="en-US" dirty="0" err="1"/>
+              <a:t>request.isAuthenticated</a:t>
+            </a:r>
+            <a:r>
+              <a:rPr lang="en-US" dirty="0"/>
+              <a:t>()</a:t>
+            </a:r>
+          </a:p>
+          <a:p>
+            <a:pPr lvl="1"/>
+            <a:r>
+              <a:rPr lang="en-US" dirty="0"/>
+              <a:t>main.ts</a:t>
+            </a:r>
+          </a:p>
+          <a:p>
+            <a:pPr lvl="2"/>
+            <a:r>
+              <a:rPr lang="en-US" dirty="0" err="1"/>
+              <a:t>app.use</a:t>
+            </a:r>
+            <a:r>
+              <a:rPr lang="en-US" dirty="0"/>
+              <a:t>(session({</a:t>
+            </a:r>
+            <a:endParaRPr lang="fa-IR" dirty="0"/>
+          </a:p>
+          <a:p>
+            <a:pPr lvl="3"/>
+            <a:r>
+              <a:rPr lang="en-US" dirty="0"/>
+              <a:t>secret, resave, </a:t>
+            </a:r>
+            <a:r>
+              <a:rPr lang="en-US" dirty="0" err="1"/>
+              <a:t>saveUninitialized</a:t>
+            </a:r>
+            <a:r>
+              <a:rPr lang="en-US" dirty="0"/>
+              <a:t>, cookie :{}</a:t>
+            </a:r>
+            <a:endParaRPr lang="fa-IR" dirty="0"/>
+          </a:p>
+          <a:p>
+            <a:pPr lvl="2"/>
+            <a:r>
+              <a:rPr lang="en-US" dirty="0"/>
+              <a:t>}));</a:t>
+            </a:r>
+          </a:p>
+          <a:p>
+            <a:pPr lvl="2"/>
+            <a:r>
+              <a:rPr lang="en-US" dirty="0" err="1"/>
+              <a:t>app.use</a:t>
+            </a:r>
+            <a:r>
+              <a:rPr lang="en-US" dirty="0"/>
+              <a:t>(</a:t>
+            </a:r>
+            <a:r>
+              <a:rPr lang="en-US" dirty="0" err="1"/>
+              <a:t>passport.initialize</a:t>
+            </a:r>
+            <a:r>
+              <a:rPr lang="en-US" dirty="0"/>
+              <a:t>());</a:t>
+            </a:r>
+          </a:p>
+          <a:p>
+            <a:pPr lvl="2"/>
+            <a:r>
+              <a:rPr lang="en-US" dirty="0" err="1"/>
+              <a:t>app.use</a:t>
+            </a:r>
+            <a:r>
+              <a:rPr lang="en-US" dirty="0"/>
+              <a:t>(</a:t>
+            </a:r>
+            <a:r>
+              <a:rPr lang="en-US" dirty="0" err="1"/>
+              <a:t>passport.session</a:t>
+            </a:r>
+            <a:r>
+              <a:rPr lang="en-US" dirty="0"/>
+              <a:t>());</a:t>
+            </a:r>
+            <a:endParaRPr lang="fa-IR" dirty="0"/>
+          </a:p>
+          <a:p>
+            <a:pPr lvl="1"/>
+            <a:endParaRPr lang="en-US" dirty="0"/>
+          </a:p>
+        </p:txBody>
+      </p:sp>
+      <p:sp>
+        <p:nvSpPr>
+          <p:cNvPr id="4" name="Footer Placeholder 3">
+            <a:extLst>
+              <a:ext uri="{FF2B5EF4-FFF2-40B4-BE49-F238E27FC236}">
+                <a16:creationId xmlns:a16="http://schemas.microsoft.com/office/drawing/2014/main" id="{D1432776-DCB9-4528-BF27-D4A37FFDBDC6}"/>
+              </a:ext>
+            </a:extLst>
+          </p:cNvPr>
+          <p:cNvSpPr>
+            <a:spLocks noGrp="1"/>
+          </p:cNvSpPr>
+          <p:nvPr>
+            <p:ph type="ftr" sz="quarter" idx="11"/>
+          </p:nvPr>
+        </p:nvSpPr>
+        <p:spPr/>
+        <p:txBody>
+          <a:bodyPr/>
+          <a:lstStyle/>
+          <a:p>
+            <a:r>
+              <a:rPr lang="en-US"/>
+              <a:t>Nodejs Basics</a:t>
+            </a:r>
+            <a:endParaRPr lang="en-US" dirty="0"/>
+          </a:p>
+        </p:txBody>
+      </p:sp>
+      <p:sp>
+        <p:nvSpPr>
+          <p:cNvPr id="5" name="Slide Number Placeholder 4">
+            <a:extLst>
+              <a:ext uri="{FF2B5EF4-FFF2-40B4-BE49-F238E27FC236}">
+                <a16:creationId xmlns:a16="http://schemas.microsoft.com/office/drawing/2014/main" id="{C2030382-B752-489C-816F-5A73F387B4F8}"/>
+              </a:ext>
+            </a:extLst>
+          </p:cNvPr>
+          <p:cNvSpPr>
+            <a:spLocks noGrp="1"/>
+          </p:cNvSpPr>
+          <p:nvPr>
+            <p:ph type="sldNum" sz="quarter" idx="12"/>
+          </p:nvPr>
+        </p:nvSpPr>
+        <p:spPr/>
+        <p:txBody>
+          <a:bodyPr/>
+          <a:lstStyle/>
+          <a:p>
+            <a:fld id="{3A98EE3D-8CD1-4C3F-BD1C-C98C9596463C}" type="slidenum">
+              <a:rPr lang="en-US" smtClean="0"/>
+              <a:t>14</a:t>
+            </a:fld>
+            <a:endParaRPr lang="en-US" dirty="0"/>
+          </a:p>
+        </p:txBody>
+      </p:sp>
+    </p:spTree>
+    <p:extLst>
+      <p:ext uri="{BB962C8B-B14F-4D97-AF65-F5344CB8AC3E}">
+        <p14:creationId xmlns:p14="http://schemas.microsoft.com/office/powerpoint/2010/main" val="4254438249"/>
+      </p:ext>
+    </p:extLst>
+  </p:cSld>
+  <p:clrMapOvr>
+    <a:masterClrMapping/>
+  </p:clrMapOvr>
+</p:sld>
+</file>
+
+<file path=ppt/slides/slide15.xml><?xml version="1.0" encoding="utf-8"?>
+<p:sld xmlns:a="http://schemas.openxmlformats.org/drawingml/2006/main" xmlns:r="http://schemas.openxmlformats.org/officeDocument/2006/relationships" xmlns:p="http://schemas.openxmlformats.org/presentationml/2006/main">
+  <p:cSld>
+    <p:spTree>
+      <p:nvGrpSpPr>
+        <p:cNvPr id="1" name=""/>
+        <p:cNvGrpSpPr/>
+        <p:nvPr/>
+      </p:nvGrpSpPr>
+      <p:grpSpPr>
+        <a:xfrm>
+          <a:off x="0" y="0"/>
+          <a:ext cx="0" cy="0"/>
+          <a:chOff x="0" y="0"/>
+          <a:chExt cx="0" cy="0"/>
+        </a:xfrm>
+      </p:grpSpPr>
+      <p:sp>
+        <p:nvSpPr>
+          <p:cNvPr id="2" name="Title 1">
+            <a:extLst>
+              <a:ext uri="{FF2B5EF4-FFF2-40B4-BE49-F238E27FC236}">
+                <a16:creationId xmlns:a16="http://schemas.microsoft.com/office/drawing/2014/main" id="{E38EAF18-1F68-488C-B7FB-3A29FE8EB282}"/>
+              </a:ext>
+            </a:extLst>
+          </p:cNvPr>
+          <p:cNvSpPr>
+            <a:spLocks noGrp="1"/>
+          </p:cNvSpPr>
+          <p:nvPr>
+            <p:ph type="title"/>
+          </p:nvPr>
+        </p:nvSpPr>
+        <p:spPr/>
+        <p:txBody>
+          <a:bodyPr/>
+          <a:lstStyle/>
+          <a:p>
+            <a:r>
+              <a:rPr lang="en-US" dirty="0"/>
+              <a:t>Demo</a:t>
+            </a:r>
+          </a:p>
+        </p:txBody>
+      </p:sp>
+      <p:sp>
+        <p:nvSpPr>
+          <p:cNvPr id="3" name="Content Placeholder 2">
+            <a:extLst>
+              <a:ext uri="{FF2B5EF4-FFF2-40B4-BE49-F238E27FC236}">
+                <a16:creationId xmlns:a16="http://schemas.microsoft.com/office/drawing/2014/main" id="{DE51941B-6543-40E4-8DAE-8AF22DDFE054}"/>
+              </a:ext>
+            </a:extLst>
+          </p:cNvPr>
+          <p:cNvSpPr>
+            <a:spLocks noGrp="1"/>
+          </p:cNvSpPr>
+          <p:nvPr>
+            <p:ph idx="1"/>
+          </p:nvPr>
+        </p:nvSpPr>
+        <p:spPr/>
+        <p:txBody>
+          <a:bodyPr/>
+          <a:lstStyle/>
+          <a:p>
+            <a:r>
+              <a:rPr lang="en-US" dirty="0"/>
+              <a:t>Sessions</a:t>
+            </a:r>
+          </a:p>
+          <a:p>
+            <a:pPr lvl="1"/>
+            <a:r>
+              <a:rPr lang="en-US" dirty="0"/>
+              <a:t>Create a session serializer</a:t>
+            </a:r>
+          </a:p>
+          <a:p>
+            <a:pPr lvl="1"/>
+            <a:r>
+              <a:rPr lang="en-US" dirty="0"/>
+              <a:t>Extends </a:t>
+            </a:r>
+            <a:r>
+              <a:rPr lang="en-US" dirty="0" err="1"/>
+              <a:t>PassportSerializer</a:t>
+            </a:r>
+            <a:endParaRPr lang="en-US" dirty="0"/>
+          </a:p>
+          <a:p>
+            <a:pPr lvl="2"/>
+            <a:r>
+              <a:rPr lang="en-US" dirty="0" err="1"/>
+              <a:t>serializeUser</a:t>
+            </a:r>
+            <a:r>
+              <a:rPr lang="en-US" dirty="0"/>
+              <a:t>()</a:t>
+            </a:r>
+          </a:p>
+          <a:p>
+            <a:pPr lvl="2"/>
+            <a:r>
+              <a:rPr lang="en-US" dirty="0" err="1"/>
+              <a:t>deserializeUser</a:t>
+            </a:r>
+            <a:r>
+              <a:rPr lang="en-US" dirty="0"/>
+              <a:t>()</a:t>
+            </a:r>
+          </a:p>
+          <a:p>
+            <a:pPr lvl="2"/>
+            <a:r>
+              <a:rPr lang="en-US" dirty="0"/>
+              <a:t>Implementation of this two method is up to you</a:t>
+            </a:r>
+          </a:p>
+          <a:p>
+            <a:pPr lvl="1"/>
+            <a:r>
+              <a:rPr lang="en-US" dirty="0"/>
+              <a:t>Provide the serializer</a:t>
+            </a:r>
+          </a:p>
+          <a:p>
+            <a:pPr lvl="1"/>
+            <a:r>
+              <a:rPr lang="en-US" dirty="0" err="1"/>
+              <a:t>PassportModule.register</a:t>
+            </a:r>
+            <a:r>
+              <a:rPr lang="en-US" dirty="0"/>
+              <a:t>({ session: true })</a:t>
+            </a:r>
+          </a:p>
+          <a:p>
+            <a:pPr lvl="1"/>
+            <a:r>
+              <a:rPr lang="en-US" dirty="0"/>
+              <a:t>In </a:t>
+            </a:r>
+            <a:r>
+              <a:rPr lang="en-US" dirty="0" err="1"/>
+              <a:t>LocalAuthGuard</a:t>
+            </a:r>
+            <a:r>
+              <a:rPr lang="en-US" dirty="0"/>
+              <a:t> add some custom </a:t>
+            </a:r>
+            <a:r>
+              <a:rPr lang="en-US" dirty="0" err="1"/>
+              <a:t>canActivate</a:t>
+            </a:r>
+            <a:r>
+              <a:rPr lang="en-US" dirty="0"/>
+              <a:t> function that </a:t>
+            </a:r>
+          </a:p>
+          <a:p>
+            <a:pPr lvl="1"/>
+            <a:r>
+              <a:rPr lang="en-US" dirty="0" err="1"/>
+              <a:t>Super.canActivate</a:t>
+            </a:r>
+            <a:r>
+              <a:rPr lang="en-US" dirty="0"/>
+              <a:t>, </a:t>
+            </a:r>
+            <a:r>
+              <a:rPr lang="en-US" dirty="0" err="1"/>
+              <a:t>super.login</a:t>
+            </a:r>
+            <a:r>
+              <a:rPr lang="en-US" dirty="0"/>
+              <a:t>()</a:t>
+            </a:r>
+          </a:p>
+        </p:txBody>
+      </p:sp>
+      <p:sp>
+        <p:nvSpPr>
+          <p:cNvPr id="4" name="Footer Placeholder 3">
+            <a:extLst>
+              <a:ext uri="{FF2B5EF4-FFF2-40B4-BE49-F238E27FC236}">
+                <a16:creationId xmlns:a16="http://schemas.microsoft.com/office/drawing/2014/main" id="{4417B8A5-F655-44C4-A83A-7A45E14569C0}"/>
+              </a:ext>
+            </a:extLst>
+          </p:cNvPr>
+          <p:cNvSpPr>
+            <a:spLocks noGrp="1"/>
+          </p:cNvSpPr>
+          <p:nvPr>
+            <p:ph type="ftr" sz="quarter" idx="11"/>
+          </p:nvPr>
+        </p:nvSpPr>
+        <p:spPr/>
+        <p:txBody>
+          <a:bodyPr/>
+          <a:lstStyle/>
+          <a:p>
+            <a:r>
+              <a:rPr lang="en-US"/>
+              <a:t>Nodejs Basics</a:t>
+            </a:r>
+            <a:endParaRPr lang="en-US" dirty="0"/>
+          </a:p>
+        </p:txBody>
+      </p:sp>
+      <p:sp>
+        <p:nvSpPr>
+          <p:cNvPr id="5" name="Slide Number Placeholder 4">
+            <a:extLst>
+              <a:ext uri="{FF2B5EF4-FFF2-40B4-BE49-F238E27FC236}">
+                <a16:creationId xmlns:a16="http://schemas.microsoft.com/office/drawing/2014/main" id="{C91512F3-C3B7-4FC9-8C3D-0A87E9F3556C}"/>
+              </a:ext>
+            </a:extLst>
+          </p:cNvPr>
+          <p:cNvSpPr>
+            <a:spLocks noGrp="1"/>
+          </p:cNvSpPr>
+          <p:nvPr>
+            <p:ph type="sldNum" sz="quarter" idx="12"/>
+          </p:nvPr>
+        </p:nvSpPr>
+        <p:spPr/>
+        <p:txBody>
+          <a:bodyPr/>
+          <a:lstStyle/>
+          <a:p>
+            <a:fld id="{3A98EE3D-8CD1-4C3F-BD1C-C98C9596463C}" type="slidenum">
+              <a:rPr lang="en-US" smtClean="0"/>
+              <a:t>15</a:t>
+            </a:fld>
+            <a:endParaRPr lang="en-US" dirty="0"/>
+          </a:p>
+        </p:txBody>
+      </p:sp>
+    </p:spTree>
+    <p:extLst>
+      <p:ext uri="{BB962C8B-B14F-4D97-AF65-F5344CB8AC3E}">
+        <p14:creationId xmlns:p14="http://schemas.microsoft.com/office/powerpoint/2010/main" val="1344406732"/>
+      </p:ext>
+    </p:extLst>
+  </p:cSld>
+  <p:clrMapOvr>
+    <a:masterClrMapping/>
+  </p:clrMapOvr>
+</p:sld>
+</file>
+
+<file path=ppt/slides/slide16.xml><?xml version="1.0" encoding="utf-8"?>
+<p:sld xmlns:a="http://schemas.openxmlformats.org/drawingml/2006/main" xmlns:r="http://schemas.openxmlformats.org/officeDocument/2006/relationships" xmlns:p="http://schemas.openxmlformats.org/presentationml/2006/main">
+  <p:cSld>
+    <p:spTree>
+      <p:nvGrpSpPr>
+        <p:cNvPr id="1" name=""/>
+        <p:cNvGrpSpPr/>
+        <p:nvPr/>
+      </p:nvGrpSpPr>
+      <p:grpSpPr>
+        <a:xfrm>
+          <a:off x="0" y="0"/>
+          <a:ext cx="0" cy="0"/>
+          <a:chOff x="0" y="0"/>
+          <a:chExt cx="0" cy="0"/>
+        </a:xfrm>
+      </p:grpSpPr>
+      <p:sp>
+        <p:nvSpPr>
+          <p:cNvPr id="2" name="Title 1">
+            <a:extLst>
+              <a:ext uri="{FF2B5EF4-FFF2-40B4-BE49-F238E27FC236}">
+                <a16:creationId xmlns:a16="http://schemas.microsoft.com/office/drawing/2014/main" id="{72147EBF-7BF7-4D92-ADCD-F23AD2EDC977}"/>
+              </a:ext>
+            </a:extLst>
+          </p:cNvPr>
+          <p:cNvSpPr>
+            <a:spLocks noGrp="1"/>
+          </p:cNvSpPr>
+          <p:nvPr>
+            <p:ph type="title"/>
+          </p:nvPr>
+        </p:nvSpPr>
+        <p:spPr/>
+        <p:txBody>
+          <a:bodyPr/>
+          <a:lstStyle/>
+          <a:p>
+            <a:r>
+              <a:rPr lang="en-US" dirty="0"/>
+              <a:t>serializer</a:t>
+            </a:r>
+          </a:p>
+        </p:txBody>
+      </p:sp>
+      <p:sp>
+        <p:nvSpPr>
+          <p:cNvPr id="4" name="Footer Placeholder 3">
+            <a:extLst>
+              <a:ext uri="{FF2B5EF4-FFF2-40B4-BE49-F238E27FC236}">
+                <a16:creationId xmlns:a16="http://schemas.microsoft.com/office/drawing/2014/main" id="{47B350E6-DB24-48B1-AC10-2582BFCB81DF}"/>
+              </a:ext>
+            </a:extLst>
+          </p:cNvPr>
+          <p:cNvSpPr>
+            <a:spLocks noGrp="1"/>
+          </p:cNvSpPr>
+          <p:nvPr>
+            <p:ph type="ftr" sz="quarter" idx="11"/>
+          </p:nvPr>
+        </p:nvSpPr>
+        <p:spPr/>
+        <p:txBody>
+          <a:bodyPr/>
+          <a:lstStyle/>
+          <a:p>
+            <a:r>
+              <a:rPr lang="en-US"/>
+              <a:t>Nodejs Basics</a:t>
+            </a:r>
+            <a:endParaRPr lang="en-US" dirty="0"/>
+          </a:p>
+        </p:txBody>
+      </p:sp>
+      <p:sp>
+        <p:nvSpPr>
+          <p:cNvPr id="5" name="Slide Number Placeholder 4">
+            <a:extLst>
+              <a:ext uri="{FF2B5EF4-FFF2-40B4-BE49-F238E27FC236}">
+                <a16:creationId xmlns:a16="http://schemas.microsoft.com/office/drawing/2014/main" id="{5478CB29-6F02-45FD-A001-E3763BA64874}"/>
+              </a:ext>
+            </a:extLst>
+          </p:cNvPr>
+          <p:cNvSpPr>
+            <a:spLocks noGrp="1"/>
+          </p:cNvSpPr>
+          <p:nvPr>
+            <p:ph type="sldNum" sz="quarter" idx="12"/>
+          </p:nvPr>
+        </p:nvSpPr>
+        <p:spPr/>
+        <p:txBody>
+          <a:bodyPr/>
+          <a:lstStyle/>
+          <a:p>
+            <a:fld id="{3A98EE3D-8CD1-4C3F-BD1C-C98C9596463C}" type="slidenum">
+              <a:rPr lang="en-US" smtClean="0"/>
+              <a:t>16</a:t>
+            </a:fld>
+            <a:endParaRPr lang="en-US" dirty="0"/>
+          </a:p>
+        </p:txBody>
+      </p:sp>
+      <p:pic>
+        <p:nvPicPr>
+          <p:cNvPr id="6" name="Content Placeholder 5">
+            <a:extLst>
+              <a:ext uri="{FF2B5EF4-FFF2-40B4-BE49-F238E27FC236}">
+                <a16:creationId xmlns:a16="http://schemas.microsoft.com/office/drawing/2014/main" id="{21E545B4-A94A-4514-8790-1784CD2C1DE4}"/>
+              </a:ext>
+            </a:extLst>
+          </p:cNvPr>
+          <p:cNvPicPr>
+            <a:picLocks noGrp="1" noChangeAspect="1"/>
+          </p:cNvPicPr>
+          <p:nvPr>
+            <p:ph idx="1"/>
+          </p:nvPr>
+        </p:nvPicPr>
+        <p:blipFill>
+          <a:blip r:embed="rId2"/>
+          <a:stretch>
+            <a:fillRect/>
+          </a:stretch>
+        </p:blipFill>
+        <p:spPr>
+          <a:xfrm>
+            <a:off x="735725" y="1763821"/>
+            <a:ext cx="10711026" cy="4311434"/>
+          </a:xfrm>
+          <a:prstGeom prst="rect">
+            <a:avLst/>
+          </a:prstGeom>
+        </p:spPr>
+      </p:pic>
+    </p:spTree>
+    <p:extLst>
+      <p:ext uri="{BB962C8B-B14F-4D97-AF65-F5344CB8AC3E}">
+        <p14:creationId xmlns:p14="http://schemas.microsoft.com/office/powerpoint/2010/main" val="2325859491"/>
+      </p:ext>
+    </p:extLst>
+  </p:cSld>
+  <p:clrMapOvr>
+    <a:masterClrMapping/>
+  </p:clrMapOvr>
+</p:sld>
+</file>
+
+<file path=ppt/slides/slide17.xml><?xml version="1.0" encoding="utf-8"?>
+<p:sld xmlns:a="http://schemas.openxmlformats.org/drawingml/2006/main" xmlns:r="http://schemas.openxmlformats.org/officeDocument/2006/relationships" xmlns:p="http://schemas.openxmlformats.org/presentationml/2006/main">
+  <p:cSld>
+    <p:spTree>
+      <p:nvGrpSpPr>
+        <p:cNvPr id="1" name=""/>
+        <p:cNvGrpSpPr/>
+        <p:nvPr/>
+      </p:nvGrpSpPr>
+      <p:grpSpPr>
+        <a:xfrm>
+          <a:off x="0" y="0"/>
+          <a:ext cx="0" cy="0"/>
+          <a:chOff x="0" y="0"/>
+          <a:chExt cx="0" cy="0"/>
+        </a:xfrm>
+      </p:grpSpPr>
+      <p:sp>
+        <p:nvSpPr>
+          <p:cNvPr id="2" name="Title 1">
+            <a:extLst>
+              <a:ext uri="{FF2B5EF4-FFF2-40B4-BE49-F238E27FC236}">
+                <a16:creationId xmlns:a16="http://schemas.microsoft.com/office/drawing/2014/main" id="{59B50895-3E15-4A00-A86B-6581FA5F1239}"/>
+              </a:ext>
+            </a:extLst>
+          </p:cNvPr>
+          <p:cNvSpPr>
+            <a:spLocks noGrp="1"/>
+          </p:cNvSpPr>
+          <p:nvPr>
+            <p:ph type="title"/>
+          </p:nvPr>
+        </p:nvSpPr>
+        <p:spPr/>
+        <p:txBody>
+          <a:bodyPr/>
+          <a:lstStyle/>
+          <a:p>
+            <a:r>
+              <a:rPr lang="en-US" dirty="0"/>
+              <a:t>Change in </a:t>
+            </a:r>
+            <a:r>
+              <a:rPr lang="en-US" dirty="0" err="1"/>
+              <a:t>LocalAuthGuard</a:t>
+            </a:r>
+            <a:endParaRPr lang="en-US" dirty="0"/>
+          </a:p>
+        </p:txBody>
+      </p:sp>
+      <p:pic>
+        <p:nvPicPr>
+          <p:cNvPr id="7" name="Content Placeholder 6">
+            <a:extLst>
+              <a:ext uri="{FF2B5EF4-FFF2-40B4-BE49-F238E27FC236}">
+                <a16:creationId xmlns:a16="http://schemas.microsoft.com/office/drawing/2014/main" id="{868173FC-D5D3-4082-8C92-F7CB4F9B2AD0}"/>
+              </a:ext>
+            </a:extLst>
+          </p:cNvPr>
+          <p:cNvPicPr>
+            <a:picLocks noGrp="1" noChangeAspect="1"/>
+          </p:cNvPicPr>
+          <p:nvPr>
+            <p:ph idx="1"/>
+          </p:nvPr>
+        </p:nvPicPr>
+        <p:blipFill>
+          <a:blip r:embed="rId2"/>
+          <a:stretch>
+            <a:fillRect/>
+          </a:stretch>
+        </p:blipFill>
+        <p:spPr>
+          <a:xfrm>
+            <a:off x="1439918" y="1659982"/>
+            <a:ext cx="9302640" cy="4519112"/>
+          </a:xfrm>
+        </p:spPr>
+      </p:pic>
+      <p:sp>
+        <p:nvSpPr>
+          <p:cNvPr id="4" name="Footer Placeholder 3">
+            <a:extLst>
+              <a:ext uri="{FF2B5EF4-FFF2-40B4-BE49-F238E27FC236}">
+                <a16:creationId xmlns:a16="http://schemas.microsoft.com/office/drawing/2014/main" id="{58849F05-C43C-4463-A9B1-5999C9969C96}"/>
+              </a:ext>
+            </a:extLst>
+          </p:cNvPr>
+          <p:cNvSpPr>
+            <a:spLocks noGrp="1"/>
+          </p:cNvSpPr>
+          <p:nvPr>
+            <p:ph type="ftr" sz="quarter" idx="11"/>
+          </p:nvPr>
+        </p:nvSpPr>
+        <p:spPr/>
+        <p:txBody>
+          <a:bodyPr/>
+          <a:lstStyle/>
+          <a:p>
+            <a:r>
+              <a:rPr lang="en-US"/>
+              <a:t>Nodejs Basics</a:t>
+            </a:r>
+            <a:endParaRPr lang="en-US" dirty="0"/>
+          </a:p>
+        </p:txBody>
+      </p:sp>
+      <p:sp>
+        <p:nvSpPr>
+          <p:cNvPr id="5" name="Slide Number Placeholder 4">
+            <a:extLst>
+              <a:ext uri="{FF2B5EF4-FFF2-40B4-BE49-F238E27FC236}">
+                <a16:creationId xmlns:a16="http://schemas.microsoft.com/office/drawing/2014/main" id="{4027AB59-B512-4C65-8B22-81A0B7163B98}"/>
+              </a:ext>
+            </a:extLst>
+          </p:cNvPr>
+          <p:cNvSpPr>
+            <a:spLocks noGrp="1"/>
+          </p:cNvSpPr>
+          <p:nvPr>
+            <p:ph type="sldNum" sz="quarter" idx="12"/>
+          </p:nvPr>
+        </p:nvSpPr>
+        <p:spPr/>
+        <p:txBody>
+          <a:bodyPr/>
+          <a:lstStyle/>
+          <a:p>
+            <a:fld id="{3A98EE3D-8CD1-4C3F-BD1C-C98C9596463C}" type="slidenum">
+              <a:rPr lang="en-US" smtClean="0"/>
+              <a:t>17</a:t>
+            </a:fld>
+            <a:endParaRPr lang="en-US" dirty="0"/>
+          </a:p>
+        </p:txBody>
+      </p:sp>
+    </p:spTree>
+    <p:extLst>
+      <p:ext uri="{BB962C8B-B14F-4D97-AF65-F5344CB8AC3E}">
+        <p14:creationId xmlns:p14="http://schemas.microsoft.com/office/powerpoint/2010/main" val="1098065566"/>
+      </p:ext>
+    </p:extLst>
+  </p:cSld>
+  <p:clrMapOvr>
+    <a:masterClrMapping/>
+  </p:clrMapOvr>
+</p:sld>
+</file>
+
+<file path=ppt/slides/slide18.xml><?xml version="1.0" encoding="utf-8"?>
+<p:sld xmlns:a="http://schemas.openxmlformats.org/drawingml/2006/main" xmlns:r="http://schemas.openxmlformats.org/officeDocument/2006/relationships" xmlns:p="http://schemas.openxmlformats.org/presentationml/2006/main">
+  <p:cSld>
+    <p:spTree>
+      <p:nvGrpSpPr>
+        <p:cNvPr id="1" name=""/>
+        <p:cNvGrpSpPr/>
+        <p:nvPr/>
+      </p:nvGrpSpPr>
+      <p:grpSpPr>
+        <a:xfrm>
+          <a:off x="0" y="0"/>
+          <a:ext cx="0" cy="0"/>
+          <a:chOff x="0" y="0"/>
+          <a:chExt cx="0" cy="0"/>
+        </a:xfrm>
+      </p:grpSpPr>
+      <p:sp>
+        <p:nvSpPr>
+          <p:cNvPr id="2" name="Title 1">
+            <a:extLst>
+              <a:ext uri="{FF2B5EF4-FFF2-40B4-BE49-F238E27FC236}">
+                <a16:creationId xmlns:a16="http://schemas.microsoft.com/office/drawing/2014/main" id="{C6FD76E2-F920-4ABB-90AA-4064377CB672}"/>
+              </a:ext>
+            </a:extLst>
+          </p:cNvPr>
+          <p:cNvSpPr>
+            <a:spLocks noGrp="1"/>
+          </p:cNvSpPr>
+          <p:nvPr>
+            <p:ph type="title"/>
+          </p:nvPr>
+        </p:nvSpPr>
+        <p:spPr/>
+        <p:txBody>
+          <a:bodyPr/>
+          <a:lstStyle/>
+          <a:p>
+            <a:r>
+              <a:rPr lang="en-US" dirty="0" err="1"/>
+              <a:t>SessionAuthenticatedGuard</a:t>
+            </a:r>
+            <a:endParaRPr lang="en-US" dirty="0"/>
+          </a:p>
+        </p:txBody>
+      </p:sp>
+      <p:pic>
+        <p:nvPicPr>
+          <p:cNvPr id="7" name="Content Placeholder 6">
+            <a:extLst>
+              <a:ext uri="{FF2B5EF4-FFF2-40B4-BE49-F238E27FC236}">
+                <a16:creationId xmlns:a16="http://schemas.microsoft.com/office/drawing/2014/main" id="{4F804EDA-7DCB-4A70-82A6-5D51733C23F2}"/>
+              </a:ext>
+            </a:extLst>
+          </p:cNvPr>
+          <p:cNvPicPr>
+            <a:picLocks noGrp="1" noChangeAspect="1"/>
+          </p:cNvPicPr>
+          <p:nvPr>
+            <p:ph idx="1"/>
+          </p:nvPr>
+        </p:nvPicPr>
+        <p:blipFill>
+          <a:blip r:embed="rId2"/>
+          <a:stretch>
+            <a:fillRect/>
+          </a:stretch>
+        </p:blipFill>
+        <p:spPr>
+          <a:xfrm>
+            <a:off x="295415" y="1942772"/>
+            <a:ext cx="11591644" cy="3953532"/>
+          </a:xfrm>
+        </p:spPr>
+      </p:pic>
+      <p:sp>
+        <p:nvSpPr>
+          <p:cNvPr id="4" name="Footer Placeholder 3">
+            <a:extLst>
+              <a:ext uri="{FF2B5EF4-FFF2-40B4-BE49-F238E27FC236}">
+                <a16:creationId xmlns:a16="http://schemas.microsoft.com/office/drawing/2014/main" id="{A749C94A-6387-4D87-8CDD-7756044D1DFD}"/>
+              </a:ext>
+            </a:extLst>
+          </p:cNvPr>
+          <p:cNvSpPr>
+            <a:spLocks noGrp="1"/>
+          </p:cNvSpPr>
+          <p:nvPr>
+            <p:ph type="ftr" sz="quarter" idx="11"/>
+          </p:nvPr>
+        </p:nvSpPr>
+        <p:spPr/>
+        <p:txBody>
+          <a:bodyPr/>
+          <a:lstStyle/>
+          <a:p>
+            <a:r>
+              <a:rPr lang="en-US"/>
+              <a:t>Nodejs Basics</a:t>
+            </a:r>
+            <a:endParaRPr lang="en-US" dirty="0"/>
+          </a:p>
+        </p:txBody>
+      </p:sp>
+      <p:sp>
+        <p:nvSpPr>
+          <p:cNvPr id="5" name="Slide Number Placeholder 4">
+            <a:extLst>
+              <a:ext uri="{FF2B5EF4-FFF2-40B4-BE49-F238E27FC236}">
+                <a16:creationId xmlns:a16="http://schemas.microsoft.com/office/drawing/2014/main" id="{6D143B41-02D4-4B2A-8D1C-DE27CA1C800A}"/>
+              </a:ext>
+            </a:extLst>
+          </p:cNvPr>
+          <p:cNvSpPr>
+            <a:spLocks noGrp="1"/>
+          </p:cNvSpPr>
+          <p:nvPr>
+            <p:ph type="sldNum" sz="quarter" idx="12"/>
+          </p:nvPr>
+        </p:nvSpPr>
+        <p:spPr/>
+        <p:txBody>
+          <a:bodyPr/>
+          <a:lstStyle/>
+          <a:p>
+            <a:fld id="{3A98EE3D-8CD1-4C3F-BD1C-C98C9596463C}" type="slidenum">
+              <a:rPr lang="en-US" smtClean="0"/>
+              <a:t>18</a:t>
+            </a:fld>
+            <a:endParaRPr lang="en-US" dirty="0"/>
+          </a:p>
+        </p:txBody>
+      </p:sp>
+    </p:spTree>
+    <p:extLst>
+      <p:ext uri="{BB962C8B-B14F-4D97-AF65-F5344CB8AC3E}">
+        <p14:creationId xmlns:p14="http://schemas.microsoft.com/office/powerpoint/2010/main" val="3609177395"/>
+      </p:ext>
+    </p:extLst>
+  </p:cSld>
+  <p:clrMapOvr>
+    <a:masterClrMapping/>
+  </p:clrMapOvr>
+</p:sld>
+</file>
+
+<file path=ppt/slides/slide19.xml><?xml version="1.0" encoding="utf-8"?>
+<p:sld xmlns:a="http://schemas.openxmlformats.org/drawingml/2006/main" xmlns:r="http://schemas.openxmlformats.org/officeDocument/2006/relationships" xmlns:p="http://schemas.openxmlformats.org/presentationml/2006/main">
+  <p:cSld>
+    <p:spTree>
+      <p:nvGrpSpPr>
+        <p:cNvPr id="1" name=""/>
+        <p:cNvGrpSpPr/>
+        <p:nvPr/>
+      </p:nvGrpSpPr>
+      <p:grpSpPr>
+        <a:xfrm>
+          <a:off x="0" y="0"/>
+          <a:ext cx="0" cy="0"/>
+          <a:chOff x="0" y="0"/>
+          <a:chExt cx="0" cy="0"/>
+        </a:xfrm>
+      </p:grpSpPr>
+      <p:sp>
+        <p:nvSpPr>
+          <p:cNvPr id="2" name="Title 1">
+            <a:extLst>
+              <a:ext uri="{FF2B5EF4-FFF2-40B4-BE49-F238E27FC236}">
+                <a16:creationId xmlns:a16="http://schemas.microsoft.com/office/drawing/2014/main" id="{A1F22EEF-11EF-4AB9-B4B3-D4063CFADBF0}"/>
+              </a:ext>
+            </a:extLst>
+          </p:cNvPr>
+          <p:cNvSpPr>
+            <a:spLocks noGrp="1"/>
+          </p:cNvSpPr>
+          <p:nvPr>
+            <p:ph type="title"/>
+          </p:nvPr>
+        </p:nvSpPr>
+        <p:spPr/>
+        <p:txBody>
+          <a:bodyPr/>
+          <a:lstStyle/>
+          <a:p>
+            <a:r>
+              <a:rPr lang="en-US" dirty="0"/>
+              <a:t>Demo</a:t>
+            </a:r>
+          </a:p>
+        </p:txBody>
+      </p:sp>
+      <p:sp>
+        <p:nvSpPr>
+          <p:cNvPr id="3" name="Content Placeholder 2">
+            <a:extLst>
+              <a:ext uri="{FF2B5EF4-FFF2-40B4-BE49-F238E27FC236}">
+                <a16:creationId xmlns:a16="http://schemas.microsoft.com/office/drawing/2014/main" id="{2EBE3083-1E1D-4FBE-8E8A-1B032CAD20B3}"/>
+              </a:ext>
+            </a:extLst>
+          </p:cNvPr>
+          <p:cNvSpPr>
+            <a:spLocks noGrp="1"/>
+          </p:cNvSpPr>
+          <p:nvPr>
+            <p:ph idx="1"/>
+          </p:nvPr>
+        </p:nvSpPr>
+        <p:spPr/>
+        <p:txBody>
+          <a:bodyPr>
+            <a:normAutofit lnSpcReduction="10000"/>
+          </a:bodyPr>
+          <a:lstStyle/>
+          <a:p>
+            <a:r>
+              <a:rPr lang="en-US" dirty="0"/>
+              <a:t>Create a simple guard for our purpose, return </a:t>
+            </a:r>
+            <a:r>
+              <a:rPr lang="en-US" dirty="0" err="1"/>
+              <a:t>request.isAuthenticated</a:t>
+            </a:r>
+            <a:r>
+              <a:rPr lang="en-US" dirty="0"/>
+              <a:t>()</a:t>
+            </a:r>
+          </a:p>
+          <a:p>
+            <a:pPr lvl="1"/>
+            <a:r>
+              <a:rPr lang="en-US" dirty="0"/>
+              <a:t>It will check if user authenticated.</a:t>
+            </a:r>
+          </a:p>
+          <a:p>
+            <a:pPr lvl="2"/>
+            <a:r>
+              <a:rPr lang="en-US" dirty="0"/>
+              <a:t>Has cookie with </a:t>
+            </a:r>
+            <a:r>
+              <a:rPr lang="en-US" dirty="0" err="1"/>
+              <a:t>sessionId</a:t>
+            </a:r>
+            <a:endParaRPr lang="en-US" dirty="0"/>
+          </a:p>
+          <a:p>
+            <a:pPr lvl="2"/>
+            <a:r>
+              <a:rPr lang="en-US" dirty="0"/>
+              <a:t>Is there any record in our session store</a:t>
+            </a:r>
+          </a:p>
+          <a:p>
+            <a:pPr lvl="2"/>
+            <a:r>
+              <a:rPr lang="en-US" dirty="0"/>
+              <a:t>If it expired or not</a:t>
+            </a:r>
+          </a:p>
+          <a:p>
+            <a:pPr lvl="2"/>
+            <a:r>
+              <a:rPr lang="en-US" dirty="0"/>
+              <a:t>If everything is ok, then you are welcome to use the route</a:t>
+            </a:r>
+          </a:p>
+          <a:p>
+            <a:r>
+              <a:rPr lang="en-US" dirty="0"/>
+              <a:t>Test our session</a:t>
+            </a:r>
+          </a:p>
+          <a:p>
+            <a:pPr lvl="1"/>
+            <a:r>
+              <a:rPr lang="en-US" dirty="0"/>
+              <a:t>See the cookies</a:t>
+            </a:r>
+          </a:p>
+          <a:p>
+            <a:pPr lvl="1"/>
+            <a:r>
+              <a:rPr lang="en-US" dirty="0"/>
+              <a:t>The cookies are sent after they are saved (browser handle it automatically)</a:t>
+            </a:r>
+          </a:p>
+          <a:p>
+            <a:pPr lvl="1"/>
+            <a:endParaRPr lang="en-US" dirty="0"/>
+          </a:p>
+        </p:txBody>
+      </p:sp>
+      <p:sp>
+        <p:nvSpPr>
+          <p:cNvPr id="4" name="Footer Placeholder 3">
+            <a:extLst>
+              <a:ext uri="{FF2B5EF4-FFF2-40B4-BE49-F238E27FC236}">
+                <a16:creationId xmlns:a16="http://schemas.microsoft.com/office/drawing/2014/main" id="{00440CB2-A9FD-472F-B138-850B4368E065}"/>
+              </a:ext>
+            </a:extLst>
+          </p:cNvPr>
+          <p:cNvSpPr>
+            <a:spLocks noGrp="1"/>
+          </p:cNvSpPr>
+          <p:nvPr>
+            <p:ph type="ftr" sz="quarter" idx="11"/>
+          </p:nvPr>
+        </p:nvSpPr>
+        <p:spPr/>
+        <p:txBody>
+          <a:bodyPr/>
+          <a:lstStyle/>
+          <a:p>
+            <a:r>
+              <a:rPr lang="en-US"/>
+              <a:t>Nodejs Basics</a:t>
+            </a:r>
+            <a:endParaRPr lang="en-US" dirty="0"/>
+          </a:p>
+        </p:txBody>
+      </p:sp>
+      <p:sp>
+        <p:nvSpPr>
+          <p:cNvPr id="5" name="Slide Number Placeholder 4">
+            <a:extLst>
+              <a:ext uri="{FF2B5EF4-FFF2-40B4-BE49-F238E27FC236}">
+                <a16:creationId xmlns:a16="http://schemas.microsoft.com/office/drawing/2014/main" id="{86F6A443-9C74-4C7A-AA53-5957B1E9C989}"/>
+              </a:ext>
+            </a:extLst>
+          </p:cNvPr>
+          <p:cNvSpPr>
+            <a:spLocks noGrp="1"/>
+          </p:cNvSpPr>
+          <p:nvPr>
+            <p:ph type="sldNum" sz="quarter" idx="12"/>
+          </p:nvPr>
+        </p:nvSpPr>
+        <p:spPr/>
+        <p:txBody>
+          <a:bodyPr/>
+          <a:lstStyle/>
+          <a:p>
+            <a:fld id="{3A98EE3D-8CD1-4C3F-BD1C-C98C9596463C}" type="slidenum">
+              <a:rPr lang="en-US" smtClean="0"/>
+              <a:t>19</a:t>
+            </a:fld>
+            <a:endParaRPr lang="en-US" dirty="0"/>
+          </a:p>
+        </p:txBody>
+      </p:sp>
+    </p:spTree>
+    <p:extLst>
+      <p:ext uri="{BB962C8B-B14F-4D97-AF65-F5344CB8AC3E}">
+        <p14:creationId xmlns:p14="http://schemas.microsoft.com/office/powerpoint/2010/main" val="2104888566"/>
+      </p:ext>
+    </p:extLst>
+  </p:cSld>
+  <p:clrMapOvr>
+    <a:masterClrMapping/>
+  </p:clrMapOvr>
+</p:sld>
+</file>
+
 <file path=ppt/slides/slide2.xml><?xml version="1.0" encoding="utf-8"?>
 <p:sld xmlns:a="http://schemas.openxmlformats.org/drawingml/2006/main" xmlns:r="http://schemas.openxmlformats.org/officeDocument/2006/relationships" xmlns:p="http://schemas.openxmlformats.org/presentationml/2006/main">
   <p:cSld>
@@ -7065,6 +9563,702 @@
     <p:extLst>
       <p:ext uri="{BB962C8B-B14F-4D97-AF65-F5344CB8AC3E}">
         <p14:creationId xmlns:p14="http://schemas.microsoft.com/office/powerpoint/2010/main" val="2687854352"/>
+      </p:ext>
+    </p:extLst>
+  </p:cSld>
+  <p:clrMapOvr>
+    <a:masterClrMapping/>
+  </p:clrMapOvr>
+</p:sld>
+</file>
+
+<file path=ppt/slides/slide20.xml><?xml version="1.0" encoding="utf-8"?>
+<p:sld xmlns:a="http://schemas.openxmlformats.org/drawingml/2006/main" xmlns:r="http://schemas.openxmlformats.org/officeDocument/2006/relationships" xmlns:p="http://schemas.openxmlformats.org/presentationml/2006/main">
+  <p:cSld>
+    <p:spTree>
+      <p:nvGrpSpPr>
+        <p:cNvPr id="1" name=""/>
+        <p:cNvGrpSpPr/>
+        <p:nvPr/>
+      </p:nvGrpSpPr>
+      <p:grpSpPr>
+        <a:xfrm>
+          <a:off x="0" y="0"/>
+          <a:ext cx="0" cy="0"/>
+          <a:chOff x="0" y="0"/>
+          <a:chExt cx="0" cy="0"/>
+        </a:xfrm>
+      </p:grpSpPr>
+      <p:sp>
+        <p:nvSpPr>
+          <p:cNvPr id="2" name="Title 1">
+            <a:extLst>
+              <a:ext uri="{FF2B5EF4-FFF2-40B4-BE49-F238E27FC236}">
+                <a16:creationId xmlns:a16="http://schemas.microsoft.com/office/drawing/2014/main" id="{BEE1017D-9834-4BBD-92ED-0B3253B751CF}"/>
+              </a:ext>
+            </a:extLst>
+          </p:cNvPr>
+          <p:cNvSpPr>
+            <a:spLocks noGrp="1"/>
+          </p:cNvSpPr>
+          <p:nvPr>
+            <p:ph type="title"/>
+          </p:nvPr>
+        </p:nvSpPr>
+        <p:spPr/>
+        <p:txBody>
+          <a:bodyPr/>
+          <a:lstStyle/>
+          <a:p>
+            <a:r>
+              <a:rPr lang="en-US" dirty="0"/>
+              <a:t>Demo</a:t>
+            </a:r>
+          </a:p>
+        </p:txBody>
+      </p:sp>
+      <p:sp>
+        <p:nvSpPr>
+          <p:cNvPr id="3" name="Content Placeholder 2">
+            <a:extLst>
+              <a:ext uri="{FF2B5EF4-FFF2-40B4-BE49-F238E27FC236}">
+                <a16:creationId xmlns:a16="http://schemas.microsoft.com/office/drawing/2014/main" id="{9EBECA0F-1755-483B-9774-0270CA892BE1}"/>
+              </a:ext>
+            </a:extLst>
+          </p:cNvPr>
+          <p:cNvSpPr>
+            <a:spLocks noGrp="1"/>
+          </p:cNvSpPr>
+          <p:nvPr>
+            <p:ph idx="1"/>
+          </p:nvPr>
+        </p:nvSpPr>
+        <p:spPr/>
+        <p:txBody>
+          <a:bodyPr/>
+          <a:lstStyle/>
+          <a:p>
+            <a:r>
+              <a:rPr lang="en-US" dirty="0"/>
+              <a:t>Tokens:</a:t>
+            </a:r>
+          </a:p>
+          <a:p>
+            <a:pPr lvl="1"/>
+            <a:r>
+              <a:rPr lang="en-US" dirty="0"/>
+              <a:t>On login route, return the JWT access token</a:t>
+            </a:r>
+          </a:p>
+          <a:p>
+            <a:pPr lvl="1"/>
+            <a:r>
+              <a:rPr lang="en-US" dirty="0"/>
+              <a:t>On protected route, require a Bearer Auth token</a:t>
+            </a:r>
+          </a:p>
+          <a:p>
+            <a:pPr lvl="1"/>
+            <a:r>
+              <a:rPr lang="en-US" dirty="0" err="1"/>
+              <a:t>npm</a:t>
+            </a:r>
+            <a:r>
+              <a:rPr lang="en-US" dirty="0"/>
+              <a:t> install @nestjs/jwt passport-</a:t>
+            </a:r>
+            <a:r>
+              <a:rPr lang="en-US" dirty="0" err="1"/>
+              <a:t>jwt</a:t>
+            </a:r>
+            <a:endParaRPr lang="en-US" dirty="0"/>
+          </a:p>
+          <a:p>
+            <a:pPr lvl="1"/>
+            <a:r>
+              <a:rPr lang="en-US" dirty="0"/>
+              <a:t>In </a:t>
+            </a:r>
+            <a:r>
+              <a:rPr lang="en-US" dirty="0" err="1"/>
+              <a:t>AuthService</a:t>
+            </a:r>
+            <a:r>
+              <a:rPr lang="en-US" dirty="0"/>
+              <a:t>, use </a:t>
+            </a:r>
+            <a:r>
+              <a:rPr lang="en-US" dirty="0" err="1"/>
+              <a:t>JwtService</a:t>
+            </a:r>
+            <a:r>
+              <a:rPr lang="en-US" dirty="0"/>
+              <a:t> to create JWT token (signing)</a:t>
+            </a:r>
+          </a:p>
+          <a:p>
+            <a:pPr lvl="2"/>
+            <a:r>
+              <a:rPr lang="en-US" dirty="0"/>
+              <a:t>Login method for signing JWT token</a:t>
+            </a:r>
+          </a:p>
+          <a:p>
+            <a:pPr lvl="1"/>
+            <a:r>
+              <a:rPr lang="en-US" dirty="0"/>
+              <a:t>Import </a:t>
+            </a:r>
+            <a:r>
+              <a:rPr lang="en-US" dirty="0" err="1"/>
+              <a:t>JwtModule</a:t>
+            </a:r>
+            <a:r>
+              <a:rPr lang="en-US" dirty="0"/>
+              <a:t> (by register function, secret, </a:t>
+            </a:r>
+            <a:r>
+              <a:rPr lang="en-US" dirty="0" err="1"/>
+              <a:t>expiresIn</a:t>
+            </a:r>
+            <a:r>
+              <a:rPr lang="en-US" dirty="0"/>
+              <a:t> ?)</a:t>
+            </a:r>
+          </a:p>
+          <a:p>
+            <a:pPr lvl="2"/>
+            <a:r>
+              <a:rPr lang="en-US" dirty="0"/>
+              <a:t>Secret is so important, don’t expose it to anybody</a:t>
+            </a:r>
+          </a:p>
+          <a:p>
+            <a:pPr lvl="1"/>
+            <a:r>
+              <a:rPr lang="en-US" dirty="0"/>
+              <a:t>Check your JWT token in </a:t>
+            </a:r>
+            <a:r>
+              <a:rPr lang="en-US" dirty="0">
+                <a:hlinkClick r:id="rId2"/>
+              </a:rPr>
+              <a:t>https://jwt.io</a:t>
+            </a:r>
+            <a:endParaRPr lang="fa-IR" dirty="0"/>
+          </a:p>
+          <a:p>
+            <a:pPr lvl="1"/>
+            <a:endParaRPr lang="en-US" dirty="0"/>
+          </a:p>
+          <a:p>
+            <a:pPr lvl="2"/>
+            <a:endParaRPr lang="en-US" dirty="0"/>
+          </a:p>
+        </p:txBody>
+      </p:sp>
+      <p:sp>
+        <p:nvSpPr>
+          <p:cNvPr id="4" name="Footer Placeholder 3">
+            <a:extLst>
+              <a:ext uri="{FF2B5EF4-FFF2-40B4-BE49-F238E27FC236}">
+                <a16:creationId xmlns:a16="http://schemas.microsoft.com/office/drawing/2014/main" id="{FD5970F7-0477-4F5C-B6D2-396794BDF69D}"/>
+              </a:ext>
+            </a:extLst>
+          </p:cNvPr>
+          <p:cNvSpPr>
+            <a:spLocks noGrp="1"/>
+          </p:cNvSpPr>
+          <p:nvPr>
+            <p:ph type="ftr" sz="quarter" idx="11"/>
+          </p:nvPr>
+        </p:nvSpPr>
+        <p:spPr/>
+        <p:txBody>
+          <a:bodyPr/>
+          <a:lstStyle/>
+          <a:p>
+            <a:r>
+              <a:rPr lang="en-US"/>
+              <a:t>Nodejs Basics</a:t>
+            </a:r>
+            <a:endParaRPr lang="en-US" dirty="0"/>
+          </a:p>
+        </p:txBody>
+      </p:sp>
+      <p:sp>
+        <p:nvSpPr>
+          <p:cNvPr id="5" name="Slide Number Placeholder 4">
+            <a:extLst>
+              <a:ext uri="{FF2B5EF4-FFF2-40B4-BE49-F238E27FC236}">
+                <a16:creationId xmlns:a16="http://schemas.microsoft.com/office/drawing/2014/main" id="{760445EB-99E2-44AA-A59D-321B336CEEED}"/>
+              </a:ext>
+            </a:extLst>
+          </p:cNvPr>
+          <p:cNvSpPr>
+            <a:spLocks noGrp="1"/>
+          </p:cNvSpPr>
+          <p:nvPr>
+            <p:ph type="sldNum" sz="quarter" idx="12"/>
+          </p:nvPr>
+        </p:nvSpPr>
+        <p:spPr/>
+        <p:txBody>
+          <a:bodyPr/>
+          <a:lstStyle/>
+          <a:p>
+            <a:fld id="{3A98EE3D-8CD1-4C3F-BD1C-C98C9596463C}" type="slidenum">
+              <a:rPr lang="en-US" smtClean="0"/>
+              <a:t>20</a:t>
+            </a:fld>
+            <a:endParaRPr lang="en-US" dirty="0"/>
+          </a:p>
+        </p:txBody>
+      </p:sp>
+    </p:spTree>
+    <p:extLst>
+      <p:ext uri="{BB962C8B-B14F-4D97-AF65-F5344CB8AC3E}">
+        <p14:creationId xmlns:p14="http://schemas.microsoft.com/office/powerpoint/2010/main" val="880073590"/>
+      </p:ext>
+    </p:extLst>
+  </p:cSld>
+  <p:clrMapOvr>
+    <a:masterClrMapping/>
+  </p:clrMapOvr>
+</p:sld>
+</file>
+
+<file path=ppt/slides/slide21.xml><?xml version="1.0" encoding="utf-8"?>
+<p:sld xmlns:a="http://schemas.openxmlformats.org/drawingml/2006/main" xmlns:r="http://schemas.openxmlformats.org/officeDocument/2006/relationships" xmlns:p="http://schemas.openxmlformats.org/presentationml/2006/main">
+  <p:cSld>
+    <p:spTree>
+      <p:nvGrpSpPr>
+        <p:cNvPr id="1" name=""/>
+        <p:cNvGrpSpPr/>
+        <p:nvPr/>
+      </p:nvGrpSpPr>
+      <p:grpSpPr>
+        <a:xfrm>
+          <a:off x="0" y="0"/>
+          <a:ext cx="0" cy="0"/>
+          <a:chOff x="0" y="0"/>
+          <a:chExt cx="0" cy="0"/>
+        </a:xfrm>
+      </p:grpSpPr>
+      <p:sp>
+        <p:nvSpPr>
+          <p:cNvPr id="2" name="Title 1">
+            <a:extLst>
+              <a:ext uri="{FF2B5EF4-FFF2-40B4-BE49-F238E27FC236}">
+                <a16:creationId xmlns:a16="http://schemas.microsoft.com/office/drawing/2014/main" id="{7098622B-9971-4765-AB05-47BF069018F0}"/>
+              </a:ext>
+            </a:extLst>
+          </p:cNvPr>
+          <p:cNvSpPr>
+            <a:spLocks noGrp="1"/>
+          </p:cNvSpPr>
+          <p:nvPr>
+            <p:ph type="title"/>
+          </p:nvPr>
+        </p:nvSpPr>
+        <p:spPr/>
+        <p:txBody>
+          <a:bodyPr/>
+          <a:lstStyle/>
+          <a:p>
+            <a:r>
+              <a:rPr lang="en-US" dirty="0"/>
+              <a:t>Demo</a:t>
+            </a:r>
+          </a:p>
+        </p:txBody>
+      </p:sp>
+      <p:sp>
+        <p:nvSpPr>
+          <p:cNvPr id="3" name="Content Placeholder 2">
+            <a:extLst>
+              <a:ext uri="{FF2B5EF4-FFF2-40B4-BE49-F238E27FC236}">
+                <a16:creationId xmlns:a16="http://schemas.microsoft.com/office/drawing/2014/main" id="{A2182DCB-2865-4DC8-83D9-5E1726D7892E}"/>
+              </a:ext>
+            </a:extLst>
+          </p:cNvPr>
+          <p:cNvSpPr>
+            <a:spLocks noGrp="1"/>
+          </p:cNvSpPr>
+          <p:nvPr>
+            <p:ph idx="1"/>
+          </p:nvPr>
+        </p:nvSpPr>
+        <p:spPr/>
+        <p:txBody>
+          <a:bodyPr>
+            <a:normAutofit lnSpcReduction="10000"/>
+          </a:bodyPr>
+          <a:lstStyle/>
+          <a:p>
+            <a:r>
+              <a:rPr lang="en-US" dirty="0"/>
+              <a:t>Create your new strategy</a:t>
+            </a:r>
+          </a:p>
+          <a:p>
+            <a:pPr lvl="1"/>
+            <a:r>
+              <a:rPr lang="en-US" dirty="0"/>
+              <a:t>Extends </a:t>
+            </a:r>
+            <a:r>
+              <a:rPr lang="en-US" dirty="0" err="1"/>
+              <a:t>PassportStrategy</a:t>
+            </a:r>
+            <a:r>
+              <a:rPr lang="en-US" dirty="0"/>
+              <a:t>(‘</a:t>
+            </a:r>
+            <a:r>
+              <a:rPr lang="en-US" dirty="0" err="1"/>
+              <a:t>jwt</a:t>
+            </a:r>
+            <a:r>
+              <a:rPr lang="en-US" dirty="0"/>
+              <a:t>’)</a:t>
+            </a:r>
+          </a:p>
+          <a:p>
+            <a:pPr lvl="1"/>
+            <a:r>
+              <a:rPr lang="en-US" dirty="0"/>
+              <a:t>Two step:</a:t>
+            </a:r>
+          </a:p>
+          <a:p>
+            <a:pPr lvl="2"/>
+            <a:r>
+              <a:rPr lang="en-US" dirty="0"/>
+              <a:t>Configuration through constructor (super method)</a:t>
+            </a:r>
+          </a:p>
+          <a:p>
+            <a:pPr lvl="3"/>
+            <a:r>
+              <a:rPr lang="en-US" dirty="0" err="1"/>
+              <a:t>secretOrKey</a:t>
+            </a:r>
+            <a:endParaRPr lang="en-US" dirty="0"/>
+          </a:p>
+          <a:p>
+            <a:pPr lvl="3"/>
+            <a:r>
+              <a:rPr lang="en-US" dirty="0" err="1"/>
+              <a:t>ignoreExpiration</a:t>
+            </a:r>
+            <a:endParaRPr lang="en-US" dirty="0"/>
+          </a:p>
+          <a:p>
+            <a:pPr lvl="3"/>
+            <a:r>
+              <a:rPr lang="en-US" dirty="0"/>
+              <a:t>How to get that access token? </a:t>
+            </a:r>
+            <a:r>
+              <a:rPr lang="en-US" dirty="0" err="1"/>
+              <a:t>jwtFromRequest</a:t>
+            </a:r>
+            <a:r>
+              <a:rPr lang="en-US" dirty="0"/>
+              <a:t>: </a:t>
+            </a:r>
+            <a:r>
+              <a:rPr lang="en-US" dirty="0" err="1"/>
+              <a:t>ExtractJwt.fromAuthHeaderAsBearerToken</a:t>
+            </a:r>
+            <a:r>
+              <a:rPr lang="en-US" dirty="0"/>
+              <a:t>();</a:t>
+            </a:r>
+          </a:p>
+          <a:p>
+            <a:pPr lvl="2"/>
+            <a:r>
+              <a:rPr lang="en-US" dirty="0"/>
+              <a:t>Validation</a:t>
+            </a:r>
+          </a:p>
+          <a:p>
+            <a:pPr lvl="3"/>
+            <a:r>
+              <a:rPr lang="en-US" dirty="0"/>
+              <a:t>We have the payload (decrypted) here</a:t>
+            </a:r>
+          </a:p>
+          <a:p>
+            <a:pPr lvl="3"/>
+            <a:r>
+              <a:rPr lang="en-US" dirty="0"/>
+              <a:t>Return our user object, what you return in this function stored in </a:t>
+            </a:r>
+            <a:r>
+              <a:rPr lang="en-US" dirty="0" err="1"/>
+              <a:t>req.user</a:t>
+            </a:r>
+            <a:endParaRPr lang="en-US" dirty="0"/>
+          </a:p>
+          <a:p>
+            <a:pPr lvl="2"/>
+            <a:r>
+              <a:rPr lang="en-US" dirty="0"/>
+              <a:t>Don’t forget to provide you new </a:t>
+            </a:r>
+            <a:r>
+              <a:rPr lang="en-US" dirty="0" err="1"/>
+              <a:t>JwtStrategy</a:t>
+            </a:r>
+            <a:endParaRPr lang="en-US" dirty="0"/>
+          </a:p>
+        </p:txBody>
+      </p:sp>
+      <p:sp>
+        <p:nvSpPr>
+          <p:cNvPr id="4" name="Footer Placeholder 3">
+            <a:extLst>
+              <a:ext uri="{FF2B5EF4-FFF2-40B4-BE49-F238E27FC236}">
+                <a16:creationId xmlns:a16="http://schemas.microsoft.com/office/drawing/2014/main" id="{FE3C4929-EAED-49AB-BB05-437E2B1FC331}"/>
+              </a:ext>
+            </a:extLst>
+          </p:cNvPr>
+          <p:cNvSpPr>
+            <a:spLocks noGrp="1"/>
+          </p:cNvSpPr>
+          <p:nvPr>
+            <p:ph type="ftr" sz="quarter" idx="11"/>
+          </p:nvPr>
+        </p:nvSpPr>
+        <p:spPr/>
+        <p:txBody>
+          <a:bodyPr/>
+          <a:lstStyle/>
+          <a:p>
+            <a:r>
+              <a:rPr lang="en-US"/>
+              <a:t>Nodejs Basics</a:t>
+            </a:r>
+            <a:endParaRPr lang="en-US" dirty="0"/>
+          </a:p>
+        </p:txBody>
+      </p:sp>
+      <p:sp>
+        <p:nvSpPr>
+          <p:cNvPr id="5" name="Slide Number Placeholder 4">
+            <a:extLst>
+              <a:ext uri="{FF2B5EF4-FFF2-40B4-BE49-F238E27FC236}">
+                <a16:creationId xmlns:a16="http://schemas.microsoft.com/office/drawing/2014/main" id="{6EDB6652-B25D-45BC-B7B0-49D958757C31}"/>
+              </a:ext>
+            </a:extLst>
+          </p:cNvPr>
+          <p:cNvSpPr>
+            <a:spLocks noGrp="1"/>
+          </p:cNvSpPr>
+          <p:nvPr>
+            <p:ph type="sldNum" sz="quarter" idx="12"/>
+          </p:nvPr>
+        </p:nvSpPr>
+        <p:spPr/>
+        <p:txBody>
+          <a:bodyPr/>
+          <a:lstStyle/>
+          <a:p>
+            <a:fld id="{3A98EE3D-8CD1-4C3F-BD1C-C98C9596463C}" type="slidenum">
+              <a:rPr lang="en-US" smtClean="0"/>
+              <a:t>21</a:t>
+            </a:fld>
+            <a:endParaRPr lang="en-US" dirty="0"/>
+          </a:p>
+        </p:txBody>
+      </p:sp>
+    </p:spTree>
+    <p:extLst>
+      <p:ext uri="{BB962C8B-B14F-4D97-AF65-F5344CB8AC3E}">
+        <p14:creationId xmlns:p14="http://schemas.microsoft.com/office/powerpoint/2010/main" val="3161835212"/>
+      </p:ext>
+    </p:extLst>
+  </p:cSld>
+  <p:clrMapOvr>
+    <a:masterClrMapping/>
+  </p:clrMapOvr>
+</p:sld>
+</file>
+
+<file path=ppt/slides/slide22.xml><?xml version="1.0" encoding="utf-8"?>
+<p:sld xmlns:a="http://schemas.openxmlformats.org/drawingml/2006/main" xmlns:r="http://schemas.openxmlformats.org/officeDocument/2006/relationships" xmlns:p="http://schemas.openxmlformats.org/presentationml/2006/main">
+  <p:cSld>
+    <p:spTree>
+      <p:nvGrpSpPr>
+        <p:cNvPr id="1" name=""/>
+        <p:cNvGrpSpPr/>
+        <p:nvPr/>
+      </p:nvGrpSpPr>
+      <p:grpSpPr>
+        <a:xfrm>
+          <a:off x="0" y="0"/>
+          <a:ext cx="0" cy="0"/>
+          <a:chOff x="0" y="0"/>
+          <a:chExt cx="0" cy="0"/>
+        </a:xfrm>
+      </p:grpSpPr>
+      <p:sp>
+        <p:nvSpPr>
+          <p:cNvPr id="2" name="Title 1">
+            <a:extLst>
+              <a:ext uri="{FF2B5EF4-FFF2-40B4-BE49-F238E27FC236}">
+                <a16:creationId xmlns:a16="http://schemas.microsoft.com/office/drawing/2014/main" id="{6B1A0672-14A7-4501-900C-A98EBCCF7AFE}"/>
+              </a:ext>
+            </a:extLst>
+          </p:cNvPr>
+          <p:cNvSpPr>
+            <a:spLocks noGrp="1"/>
+          </p:cNvSpPr>
+          <p:nvPr>
+            <p:ph type="title"/>
+          </p:nvPr>
+        </p:nvSpPr>
+        <p:spPr/>
+        <p:txBody>
+          <a:bodyPr/>
+          <a:lstStyle/>
+          <a:p>
+            <a:r>
+              <a:rPr lang="en-US" dirty="0"/>
+              <a:t>Exercise</a:t>
+            </a:r>
+          </a:p>
+        </p:txBody>
+      </p:sp>
+      <p:sp>
+        <p:nvSpPr>
+          <p:cNvPr id="3" name="Content Placeholder 2">
+            <a:extLst>
+              <a:ext uri="{FF2B5EF4-FFF2-40B4-BE49-F238E27FC236}">
+                <a16:creationId xmlns:a16="http://schemas.microsoft.com/office/drawing/2014/main" id="{2AEB1BE9-8435-42BF-A4F1-2F148FA9187A}"/>
+              </a:ext>
+            </a:extLst>
+          </p:cNvPr>
+          <p:cNvSpPr>
+            <a:spLocks noGrp="1"/>
+          </p:cNvSpPr>
+          <p:nvPr>
+            <p:ph idx="1"/>
+          </p:nvPr>
+        </p:nvSpPr>
+        <p:spPr/>
+        <p:txBody>
+          <a:bodyPr>
+            <a:normAutofit/>
+          </a:bodyPr>
+          <a:lstStyle/>
+          <a:p>
+            <a:r>
+              <a:rPr lang="en-US" dirty="0"/>
+              <a:t>Required:</a:t>
+            </a:r>
+          </a:p>
+          <a:p>
+            <a:pPr lvl="1"/>
+            <a:r>
+              <a:rPr lang="en-US" dirty="0"/>
+              <a:t>Exercise all we speak</a:t>
+            </a:r>
+          </a:p>
+          <a:p>
+            <a:pPr lvl="1"/>
+            <a:r>
+              <a:rPr lang="en-US" dirty="0"/>
+              <a:t>Create your own session and token based authentication</a:t>
+            </a:r>
+          </a:p>
+          <a:p>
+            <a:r>
+              <a:rPr lang="en-US" dirty="0"/>
+              <a:t>Optional:</a:t>
+            </a:r>
+          </a:p>
+          <a:p>
+            <a:pPr lvl="1"/>
+            <a:r>
+              <a:rPr lang="en-US" dirty="0"/>
+              <a:t>We have Refresh token to improve the token based strategies, What are they?</a:t>
+            </a:r>
+          </a:p>
+          <a:p>
+            <a:pPr lvl="1"/>
+            <a:r>
+              <a:rPr lang="en-US" dirty="0"/>
+              <a:t>Implement your own refresh token based authentication with passport in nest.js</a:t>
+            </a:r>
+          </a:p>
+        </p:txBody>
+      </p:sp>
+      <p:sp>
+        <p:nvSpPr>
+          <p:cNvPr id="4" name="Footer Placeholder 3">
+            <a:extLst>
+              <a:ext uri="{FF2B5EF4-FFF2-40B4-BE49-F238E27FC236}">
+                <a16:creationId xmlns:a16="http://schemas.microsoft.com/office/drawing/2014/main" id="{E3C0E9F9-B143-43AD-BD5C-508C3E46FF7B}"/>
+              </a:ext>
+            </a:extLst>
+          </p:cNvPr>
+          <p:cNvSpPr>
+            <a:spLocks noGrp="1"/>
+          </p:cNvSpPr>
+          <p:nvPr>
+            <p:ph type="ftr" sz="quarter" idx="11"/>
+          </p:nvPr>
+        </p:nvSpPr>
+        <p:spPr/>
+        <p:txBody>
+          <a:bodyPr/>
+          <a:lstStyle/>
+          <a:p>
+            <a:r>
+              <a:rPr lang="en-US"/>
+              <a:t>Nodejs Basics</a:t>
+            </a:r>
+            <a:endParaRPr lang="en-US" dirty="0"/>
+          </a:p>
+        </p:txBody>
+      </p:sp>
+      <p:sp>
+        <p:nvSpPr>
+          <p:cNvPr id="5" name="Slide Number Placeholder 4">
+            <a:extLst>
+              <a:ext uri="{FF2B5EF4-FFF2-40B4-BE49-F238E27FC236}">
+                <a16:creationId xmlns:a16="http://schemas.microsoft.com/office/drawing/2014/main" id="{1B95C015-BA9F-40C7-A04C-3B835E7354AB}"/>
+              </a:ext>
+            </a:extLst>
+          </p:cNvPr>
+          <p:cNvSpPr>
+            <a:spLocks noGrp="1"/>
+          </p:cNvSpPr>
+          <p:nvPr>
+            <p:ph type="sldNum" sz="quarter" idx="12"/>
+          </p:nvPr>
+        </p:nvSpPr>
+        <p:spPr/>
+        <p:txBody>
+          <a:bodyPr/>
+          <a:lstStyle/>
+          <a:p>
+            <a:fld id="{3A98EE3D-8CD1-4C3F-BD1C-C98C9596463C}" type="slidenum">
+              <a:rPr lang="en-US" smtClean="0"/>
+              <a:t>22</a:t>
+            </a:fld>
+            <a:endParaRPr lang="en-US" dirty="0"/>
+          </a:p>
+        </p:txBody>
+      </p:sp>
+    </p:spTree>
+    <p:extLst>
+      <p:ext uri="{BB962C8B-B14F-4D97-AF65-F5344CB8AC3E}">
+        <p14:creationId xmlns:p14="http://schemas.microsoft.com/office/powerpoint/2010/main" val="817859998"/>
       </p:ext>
     </p:extLst>
   </p:cSld>
@@ -7287,7 +10481,7 @@
           <p:cNvPr id="2" name="Title 1">
             <a:extLst>
               <a:ext uri="{FF2B5EF4-FFF2-40B4-BE49-F238E27FC236}">
-                <a16:creationId xmlns:a16="http://schemas.microsoft.com/office/drawing/2014/main" id="{8179ED3D-4D51-4E0E-90E6-BB4A2383933C}"/>
+                <a16:creationId xmlns:a16="http://schemas.microsoft.com/office/drawing/2014/main" id="{144F1C4F-77F4-46CD-B10B-F6C9595A293A}"/>
               </a:ext>
             </a:extLst>
           </p:cNvPr>
@@ -7305,18 +10499,17 @@
           <a:p>
             <a:r>
               <a:rPr lang="en-US" dirty="0"/>
-              <a:t>What is passport?</a:t>
-            </a:r>
-            <a:endParaRPr lang="fa-IR" dirty="0"/>
-          </a:p>
-        </p:txBody>
-      </p:sp>
-      <p:sp>
-        <p:nvSpPr>
-          <p:cNvPr id="3" name="Content Placeholder 2">
+              <a:t>What is a hash function?</a:t>
+            </a:r>
+          </a:p>
+        </p:txBody>
+      </p:sp>
+      <p:sp>
+        <p:nvSpPr>
+          <p:cNvPr id="4" name="Footer Placeholder 3">
             <a:extLst>
               <a:ext uri="{FF2B5EF4-FFF2-40B4-BE49-F238E27FC236}">
-                <a16:creationId xmlns:a16="http://schemas.microsoft.com/office/drawing/2014/main" id="{607AFF0B-882F-4950-A4C3-17E2FDF76C34}"/>
+                <a16:creationId xmlns:a16="http://schemas.microsoft.com/office/drawing/2014/main" id="{5875B707-B9C9-49EF-9060-E975733B817C}"/>
               </a:ext>
             </a:extLst>
           </p:cNvPr>
@@ -7324,49 +10517,6 @@
             <a:spLocks noGrp="1"/>
           </p:cNvSpPr>
           <p:nvPr>
-            <p:ph idx="1"/>
-          </p:nvPr>
-        </p:nvSpPr>
-        <p:spPr/>
-        <p:txBody>
-          <a:bodyPr/>
-          <a:lstStyle/>
-          <a:p>
-            <a:r>
-              <a:rPr lang="en-US" dirty="0">
-                <a:hlinkClick r:id="rId2"/>
-              </a:rPr>
-              <a:t>https://Passportjs.org</a:t>
-            </a:r>
-            <a:endParaRPr lang="en-US" dirty="0"/>
-          </a:p>
-          <a:p>
-            <a:r>
-              <a:rPr lang="en-US" dirty="0"/>
-              <a:t>Passport gives you the basic layer, and you can implement your own strategy</a:t>
-            </a:r>
-          </a:p>
-          <a:p>
-            <a:r>
-              <a:rPr lang="en-US" dirty="0"/>
-              <a:t>Nest.js creates its own authentication strategy that wraps this packages</a:t>
-            </a:r>
-          </a:p>
-        </p:txBody>
-      </p:sp>
-      <p:sp>
-        <p:nvSpPr>
-          <p:cNvPr id="4" name="Footer Placeholder 3">
-            <a:extLst>
-              <a:ext uri="{FF2B5EF4-FFF2-40B4-BE49-F238E27FC236}">
-                <a16:creationId xmlns:a16="http://schemas.microsoft.com/office/drawing/2014/main" id="{9AA66BDC-9C5F-4073-87DE-848BDC37E5C6}"/>
-              </a:ext>
-            </a:extLst>
-          </p:cNvPr>
-          <p:cNvSpPr>
-            <a:spLocks noGrp="1"/>
-          </p:cNvSpPr>
-          <p:nvPr>
             <p:ph type="ftr" sz="quarter" idx="11"/>
           </p:nvPr>
         </p:nvSpPr>
@@ -7388,7 +10538,7 @@
           <p:cNvPr id="5" name="Slide Number Placeholder 4">
             <a:extLst>
               <a:ext uri="{FF2B5EF4-FFF2-40B4-BE49-F238E27FC236}">
-                <a16:creationId xmlns:a16="http://schemas.microsoft.com/office/drawing/2014/main" id="{3559B541-F032-434F-9803-88FDF6BD21E7}"/>
+                <a16:creationId xmlns:a16="http://schemas.microsoft.com/office/drawing/2014/main" id="{6F1C0154-BA92-4239-A71D-99B586E6E6F3}"/>
               </a:ext>
             </a:extLst>
           </p:cNvPr>
@@ -7412,10 +10562,59 @@
           </a:p>
         </p:txBody>
       </p:sp>
+      <p:pic>
+        <p:nvPicPr>
+          <p:cNvPr id="1026" name="Picture 2">
+            <a:extLst>
+              <a:ext uri="{FF2B5EF4-FFF2-40B4-BE49-F238E27FC236}">
+                <a16:creationId xmlns:a16="http://schemas.microsoft.com/office/drawing/2014/main" id="{2359A68C-2541-4E63-9D7A-777A1BF72A96}"/>
+              </a:ext>
+            </a:extLst>
+          </p:cNvPr>
+          <p:cNvPicPr>
+            <a:picLocks noGrp="1" noChangeAspect="1" noChangeArrowheads="1"/>
+          </p:cNvPicPr>
+          <p:nvPr>
+            <p:ph idx="1"/>
+          </p:nvPr>
+        </p:nvPicPr>
+        <p:blipFill>
+          <a:blip r:embed="rId2">
+            <a:extLst>
+              <a:ext uri="{28A0092B-C50C-407E-A947-70E740481C1C}">
+                <a14:useLocalDpi xmlns:a14="http://schemas.microsoft.com/office/drawing/2010/main" val="0"/>
+              </a:ext>
+            </a:extLst>
+          </a:blip>
+          <a:srcRect/>
+          <a:stretch>
+            <a:fillRect/>
+          </a:stretch>
+        </p:blipFill>
+        <p:spPr bwMode="auto">
+          <a:xfrm>
+            <a:off x="2281237" y="2000250"/>
+            <a:ext cx="7620000" cy="3838575"/>
+          </a:xfrm>
+          <a:prstGeom prst="rect">
+            <a:avLst/>
+          </a:prstGeom>
+          <a:noFill/>
+          <a:extLst>
+            <a:ext uri="{909E8E84-426E-40DD-AFC4-6F175D3DCCD1}">
+              <a14:hiddenFill xmlns:a14="http://schemas.microsoft.com/office/drawing/2010/main">
+                <a:solidFill>
+                  <a:srgbClr val="FFFFFF"/>
+                </a:solidFill>
+              </a14:hiddenFill>
+            </a:ext>
+          </a:extLst>
+        </p:spPr>
+      </p:pic>
     </p:spTree>
     <p:extLst>
       <p:ext uri="{BB962C8B-B14F-4D97-AF65-F5344CB8AC3E}">
-        <p14:creationId xmlns:p14="http://schemas.microsoft.com/office/powerpoint/2010/main" val="2476310186"/>
+        <p14:creationId xmlns:p14="http://schemas.microsoft.com/office/powerpoint/2010/main" val="2127600029"/>
       </p:ext>
     </p:extLst>
   </p:cSld>
@@ -7447,7 +10646,7 @@
           <p:cNvPr id="2" name="Title 1">
             <a:extLst>
               <a:ext uri="{FF2B5EF4-FFF2-40B4-BE49-F238E27FC236}">
-                <a16:creationId xmlns:a16="http://schemas.microsoft.com/office/drawing/2014/main" id="{6E34F8E2-09B0-4CF4-A858-BCB6A6265846}"/>
+                <a16:creationId xmlns:a16="http://schemas.microsoft.com/office/drawing/2014/main" id="{B631C341-48F4-4E62-A4F4-639584134302}"/>
               </a:ext>
             </a:extLst>
           </p:cNvPr>
@@ -7465,18 +10664,17 @@
           <a:p>
             <a:r>
               <a:rPr lang="en-US" dirty="0"/>
-              <a:t>Demo</a:t>
-            </a:r>
-            <a:endParaRPr lang="fa-IR" dirty="0"/>
-          </a:p>
-        </p:txBody>
-      </p:sp>
-      <p:sp>
-        <p:nvSpPr>
-          <p:cNvPr id="3" name="Content Placeholder 2">
+              <a:t>Algorithms</a:t>
+            </a:r>
+          </a:p>
+        </p:txBody>
+      </p:sp>
+      <p:sp>
+        <p:nvSpPr>
+          <p:cNvPr id="4" name="Footer Placeholder 3">
             <a:extLst>
               <a:ext uri="{FF2B5EF4-FFF2-40B4-BE49-F238E27FC236}">
-                <a16:creationId xmlns:a16="http://schemas.microsoft.com/office/drawing/2014/main" id="{1209029E-C466-42E6-BB03-97E1A9FC7DC4}"/>
+                <a16:creationId xmlns:a16="http://schemas.microsoft.com/office/drawing/2014/main" id="{FEB4B48E-76E6-4C68-8368-ED73F8C5C230}"/>
               </a:ext>
             </a:extLst>
           </p:cNvPr>
@@ -7484,80 +10682,6 @@
             <a:spLocks noGrp="1"/>
           </p:cNvSpPr>
           <p:nvPr>
-            <p:ph idx="1"/>
-          </p:nvPr>
-        </p:nvSpPr>
-        <p:spPr/>
-        <p:txBody>
-          <a:bodyPr/>
-          <a:lstStyle/>
-          <a:p>
-            <a:r>
-              <a:rPr lang="en-US" dirty="0"/>
-              <a:t>Install it:</a:t>
-            </a:r>
-          </a:p>
-          <a:p>
-            <a:pPr lvl="1"/>
-            <a:r>
-              <a:rPr lang="en-US" dirty="0" err="1"/>
-              <a:t>npm</a:t>
-            </a:r>
-            <a:r>
-              <a:rPr lang="en-US" dirty="0"/>
-              <a:t> install @nestjs/passport passport</a:t>
-            </a:r>
-          </a:p>
-          <a:p>
-            <a:r>
-              <a:rPr lang="en-US" dirty="0"/>
-              <a:t>Strategies:</a:t>
-            </a:r>
-          </a:p>
-          <a:p>
-            <a:pPr lvl="1"/>
-            <a:r>
-              <a:rPr lang="en-US" dirty="0"/>
-              <a:t>Very simple strategy</a:t>
-            </a:r>
-          </a:p>
-          <a:p>
-            <a:pPr lvl="2"/>
-            <a:r>
-              <a:rPr lang="en-US" dirty="0" err="1"/>
-              <a:t>npm</a:t>
-            </a:r>
-            <a:r>
-              <a:rPr lang="en-US" dirty="0"/>
-              <a:t> install passport-local</a:t>
-            </a:r>
-          </a:p>
-          <a:p>
-            <a:pPr lvl="2"/>
-            <a:r>
-              <a:rPr lang="en-US" dirty="0" err="1"/>
-              <a:t>npm</a:t>
-            </a:r>
-            <a:r>
-              <a:rPr lang="en-US" dirty="0"/>
-              <a:t> install –save-dev @types/passport-local</a:t>
-            </a:r>
-          </a:p>
-        </p:txBody>
-      </p:sp>
-      <p:sp>
-        <p:nvSpPr>
-          <p:cNvPr id="4" name="Footer Placeholder 3">
-            <a:extLst>
-              <a:ext uri="{FF2B5EF4-FFF2-40B4-BE49-F238E27FC236}">
-                <a16:creationId xmlns:a16="http://schemas.microsoft.com/office/drawing/2014/main" id="{0BCF773E-66E6-4282-8FA0-6E6509B3F735}"/>
-              </a:ext>
-            </a:extLst>
-          </p:cNvPr>
-          <p:cNvSpPr>
-            <a:spLocks noGrp="1"/>
-          </p:cNvSpPr>
-          <p:nvPr>
             <p:ph type="ftr" sz="quarter" idx="11"/>
           </p:nvPr>
         </p:nvSpPr>
@@ -7579,7 +10703,7 @@
           <p:cNvPr id="5" name="Slide Number Placeholder 4">
             <a:extLst>
               <a:ext uri="{FF2B5EF4-FFF2-40B4-BE49-F238E27FC236}">
-                <a16:creationId xmlns:a16="http://schemas.microsoft.com/office/drawing/2014/main" id="{CFB5C8FB-8622-4CB5-A66E-D540D39DA117}"/>
+                <a16:creationId xmlns:a16="http://schemas.microsoft.com/office/drawing/2014/main" id="{4952F5C2-B9DD-4A61-A70C-AA6ED3C91CF8}"/>
               </a:ext>
             </a:extLst>
           </p:cNvPr>
@@ -7603,10 +10727,59 @@
           </a:p>
         </p:txBody>
       </p:sp>
+      <p:pic>
+        <p:nvPicPr>
+          <p:cNvPr id="3074" name="Picture 2">
+            <a:extLst>
+              <a:ext uri="{FF2B5EF4-FFF2-40B4-BE49-F238E27FC236}">
+                <a16:creationId xmlns:a16="http://schemas.microsoft.com/office/drawing/2014/main" id="{F25E157B-DD6A-4F6B-861C-EDDDD157E19E}"/>
+              </a:ext>
+            </a:extLst>
+          </p:cNvPr>
+          <p:cNvPicPr>
+            <a:picLocks noGrp="1" noChangeAspect="1" noChangeArrowheads="1"/>
+          </p:cNvPicPr>
+          <p:nvPr>
+            <p:ph idx="1"/>
+          </p:nvPr>
+        </p:nvPicPr>
+        <p:blipFill>
+          <a:blip r:embed="rId2">
+            <a:extLst>
+              <a:ext uri="{28A0092B-C50C-407E-A947-70E740481C1C}">
+                <a14:useLocalDpi xmlns:a14="http://schemas.microsoft.com/office/drawing/2010/main" val="0"/>
+              </a:ext>
+            </a:extLst>
+          </a:blip>
+          <a:srcRect/>
+          <a:stretch>
+            <a:fillRect/>
+          </a:stretch>
+        </p:blipFill>
+        <p:spPr bwMode="auto">
+          <a:xfrm>
+            <a:off x="1493837" y="1620838"/>
+            <a:ext cx="9194800" cy="4597400"/>
+          </a:xfrm>
+          <a:prstGeom prst="rect">
+            <a:avLst/>
+          </a:prstGeom>
+          <a:noFill/>
+          <a:extLst>
+            <a:ext uri="{909E8E84-426E-40DD-AFC4-6F175D3DCCD1}">
+              <a14:hiddenFill xmlns:a14="http://schemas.microsoft.com/office/drawing/2010/main">
+                <a:solidFill>
+                  <a:srgbClr val="FFFFFF"/>
+                </a:solidFill>
+              </a14:hiddenFill>
+            </a:ext>
+          </a:extLst>
+        </p:spPr>
+      </p:pic>
     </p:spTree>
     <p:extLst>
       <p:ext uri="{BB962C8B-B14F-4D97-AF65-F5344CB8AC3E}">
-        <p14:creationId xmlns:p14="http://schemas.microsoft.com/office/powerpoint/2010/main" val="1038190284"/>
+        <p14:creationId xmlns:p14="http://schemas.microsoft.com/office/powerpoint/2010/main" val="342699528"/>
       </p:ext>
     </p:extLst>
   </p:cSld>
@@ -7638,7 +10811,7 @@
           <p:cNvPr id="2" name="Title 1">
             <a:extLst>
               <a:ext uri="{FF2B5EF4-FFF2-40B4-BE49-F238E27FC236}">
-                <a16:creationId xmlns:a16="http://schemas.microsoft.com/office/drawing/2014/main" id="{C43D1E7E-C96D-4F5E-ADAE-FD37B6D77466}"/>
+                <a16:creationId xmlns:a16="http://schemas.microsoft.com/office/drawing/2014/main" id="{96CD76E6-FD45-4FE1-9923-402D52586464}"/>
               </a:ext>
             </a:extLst>
           </p:cNvPr>
@@ -7655,10 +10828,10 @@
           <a:lstStyle/>
           <a:p>
             <a:r>
-              <a:rPr lang="en-US" dirty="0"/>
-              <a:t>Demo</a:t>
-            </a:r>
-            <a:endParaRPr lang="fa-IR" dirty="0"/>
+              <a:rPr lang="en-US" dirty="0" err="1"/>
+              <a:t>bcrypt</a:t>
+            </a:r>
+            <a:endParaRPr lang="en-US" dirty="0"/>
           </a:p>
         </p:txBody>
       </p:sp>
@@ -7667,7 +10840,7 @@
           <p:cNvPr id="3" name="Content Placeholder 2">
             <a:extLst>
               <a:ext uri="{FF2B5EF4-FFF2-40B4-BE49-F238E27FC236}">
-                <a16:creationId xmlns:a16="http://schemas.microsoft.com/office/drawing/2014/main" id="{BD2CFF4C-1F6F-4D55-B4C1-0E85200EC38F}"/>
+                <a16:creationId xmlns:a16="http://schemas.microsoft.com/office/drawing/2014/main" id="{65703B01-49FB-46FD-A5CF-593706EB190C}"/>
               </a:ext>
             </a:extLst>
           </p:cNvPr>
@@ -7680,95 +10853,214 @@
         </p:nvSpPr>
         <p:spPr/>
         <p:txBody>
-          <a:bodyPr/>
-          <a:lstStyle/>
-          <a:p>
-            <a:r>
-              <a:rPr lang="en-US" dirty="0"/>
-              <a:t>Create an auth module for our authentication purposes</a:t>
-            </a:r>
-          </a:p>
-          <a:p>
-            <a:r>
-              <a:rPr lang="en-US" dirty="0"/>
-              <a:t>Auth service:</a:t>
-            </a:r>
-          </a:p>
-          <a:p>
-            <a:pPr lvl="1"/>
-            <a:r>
-              <a:rPr lang="en-US" dirty="0"/>
-              <a:t>It will inject User Service</a:t>
-            </a:r>
-          </a:p>
-          <a:p>
-            <a:pPr lvl="1"/>
-            <a:r>
-              <a:rPr lang="en-US" dirty="0" err="1"/>
-              <a:t>validateUser</a:t>
-            </a:r>
-            <a:r>
-              <a:rPr lang="en-US" dirty="0"/>
-              <a:t>()</a:t>
-            </a:r>
-          </a:p>
-          <a:p>
-            <a:pPr lvl="2"/>
-            <a:r>
-              <a:rPr lang="en-US" dirty="0"/>
-              <a:t>If user exists and password correct?</a:t>
-            </a:r>
-          </a:p>
-          <a:p>
-            <a:pPr lvl="2"/>
-            <a:r>
-              <a:rPr lang="en-US" dirty="0"/>
-              <a:t>Find use by username</a:t>
-            </a:r>
-          </a:p>
-          <a:p>
-            <a:pPr lvl="2"/>
-            <a:r>
-              <a:rPr lang="en-US" dirty="0"/>
-              <a:t>Check if the given password matches the real one in </a:t>
-            </a:r>
-            <a:r>
-              <a:rPr lang="en-US" dirty="0" err="1"/>
-              <a:t>db</a:t>
-            </a:r>
-            <a:r>
-              <a:rPr lang="en-US" dirty="0"/>
-              <a:t> (don’t forget to hash it)</a:t>
-            </a:r>
-          </a:p>
-          <a:p>
-            <a:pPr lvl="2"/>
-            <a:r>
-              <a:rPr lang="en-US" dirty="0"/>
-              <a:t>If user validated return it</a:t>
-            </a:r>
-          </a:p>
-          <a:p>
-            <a:pPr lvl="3"/>
-            <a:r>
-              <a:rPr lang="en-US" dirty="0"/>
-              <a:t>DON’T FORGET to remove password field!</a:t>
-            </a:r>
-          </a:p>
-          <a:p>
-            <a:pPr lvl="3"/>
-            <a:r>
-              <a:rPr lang="en-US" dirty="0"/>
-              <a:t>@exclude() is your friend in these situations</a:t>
-            </a:r>
-          </a:p>
-          <a:p>
-            <a:pPr lvl="2"/>
-            <a:endParaRPr lang="en-US" dirty="0"/>
-          </a:p>
-          <a:p>
-            <a:pPr lvl="1"/>
-            <a:endParaRPr lang="en-US" dirty="0"/>
+          <a:bodyPr>
+            <a:normAutofit fontScale="77500" lnSpcReduction="20000"/>
+          </a:bodyPr>
+          <a:lstStyle/>
+          <a:p>
+            <a:r>
+              <a:rPr lang="en-US" dirty="0" err="1">
+                <a:latin typeface="Consolas" panose="020B0609020204030204" pitchFamily="49" charset="0"/>
+              </a:rPr>
+              <a:t>npm</a:t>
+            </a:r>
+            <a:r>
+              <a:rPr lang="en-US" dirty="0">
+                <a:latin typeface="Consolas" panose="020B0609020204030204" pitchFamily="49" charset="0"/>
+              </a:rPr>
+              <a:t> install </a:t>
+            </a:r>
+            <a:r>
+              <a:rPr lang="en-US" dirty="0" err="1">
+                <a:latin typeface="Consolas" panose="020B0609020204030204" pitchFamily="49" charset="0"/>
+              </a:rPr>
+              <a:t>bcrypt</a:t>
+            </a:r>
+            <a:endParaRPr lang="en-US" dirty="0">
+              <a:latin typeface="Consolas" panose="020B0609020204030204" pitchFamily="49" charset="0"/>
+            </a:endParaRPr>
+          </a:p>
+          <a:p>
+            <a:r>
+              <a:rPr lang="en-US" dirty="0">
+                <a:latin typeface="Consolas" panose="020B0609020204030204" pitchFamily="49" charset="0"/>
+              </a:rPr>
+              <a:t>import { </a:t>
+            </a:r>
+            <a:r>
+              <a:rPr lang="en-US" dirty="0" err="1">
+                <a:latin typeface="Consolas" panose="020B0609020204030204" pitchFamily="49" charset="0"/>
+              </a:rPr>
+              <a:t>hashSync</a:t>
+            </a:r>
+            <a:r>
+              <a:rPr lang="en-US" dirty="0">
+                <a:latin typeface="Consolas" panose="020B0609020204030204" pitchFamily="49" charset="0"/>
+              </a:rPr>
+              <a:t>, compare } from '</a:t>
+            </a:r>
+            <a:r>
+              <a:rPr lang="en-US" dirty="0" err="1">
+                <a:latin typeface="Consolas" panose="020B0609020204030204" pitchFamily="49" charset="0"/>
+              </a:rPr>
+              <a:t>bcrypt</a:t>
+            </a:r>
+            <a:r>
+              <a:rPr lang="en-US" dirty="0">
+                <a:latin typeface="Consolas" panose="020B0609020204030204" pitchFamily="49" charset="0"/>
+              </a:rPr>
+              <a:t>';</a:t>
+            </a:r>
+          </a:p>
+          <a:p>
+            <a:endParaRPr lang="en-US" dirty="0">
+              <a:latin typeface="Consolas" panose="020B0609020204030204" pitchFamily="49" charset="0"/>
+            </a:endParaRPr>
+          </a:p>
+          <a:p>
+            <a:r>
+              <a:rPr lang="en-US" dirty="0">
+                <a:latin typeface="Consolas" panose="020B0609020204030204" pitchFamily="49" charset="0"/>
+              </a:rPr>
+              <a:t>export function </a:t>
+            </a:r>
+            <a:r>
+              <a:rPr lang="en-US" dirty="0" err="1">
+                <a:latin typeface="Consolas" panose="020B0609020204030204" pitchFamily="49" charset="0"/>
+              </a:rPr>
+              <a:t>hashPassword</a:t>
+            </a:r>
+            <a:r>
+              <a:rPr lang="en-US" dirty="0">
+                <a:latin typeface="Consolas" panose="020B0609020204030204" pitchFamily="49" charset="0"/>
+              </a:rPr>
+              <a:t>(password: string) {</a:t>
+            </a:r>
+          </a:p>
+          <a:p>
+            <a:r>
+              <a:rPr lang="en-US" dirty="0">
+                <a:latin typeface="Consolas" panose="020B0609020204030204" pitchFamily="49" charset="0"/>
+              </a:rPr>
+              <a:t>  const </a:t>
+            </a:r>
+            <a:r>
+              <a:rPr lang="en-US" dirty="0" err="1">
+                <a:latin typeface="Consolas" panose="020B0609020204030204" pitchFamily="49" charset="0"/>
+              </a:rPr>
+              <a:t>hashSaltRounds</a:t>
+            </a:r>
+            <a:r>
+              <a:rPr lang="en-US" dirty="0">
+                <a:latin typeface="Consolas" panose="020B0609020204030204" pitchFamily="49" charset="0"/>
+              </a:rPr>
+              <a:t> = 10;</a:t>
+            </a:r>
+          </a:p>
+          <a:p>
+            <a:r>
+              <a:rPr lang="en-US" dirty="0">
+                <a:latin typeface="Consolas" panose="020B0609020204030204" pitchFamily="49" charset="0"/>
+              </a:rPr>
+              <a:t>  return </a:t>
+            </a:r>
+            <a:r>
+              <a:rPr lang="en-US" dirty="0" err="1">
+                <a:latin typeface="Consolas" panose="020B0609020204030204" pitchFamily="49" charset="0"/>
+              </a:rPr>
+              <a:t>hashSync</a:t>
+            </a:r>
+            <a:r>
+              <a:rPr lang="en-US" dirty="0">
+                <a:latin typeface="Consolas" panose="020B0609020204030204" pitchFamily="49" charset="0"/>
+              </a:rPr>
+              <a:t>(password, </a:t>
+            </a:r>
+            <a:r>
+              <a:rPr lang="en-US" dirty="0" err="1">
+                <a:latin typeface="Consolas" panose="020B0609020204030204" pitchFamily="49" charset="0"/>
+              </a:rPr>
+              <a:t>hashSaltRounds</a:t>
+            </a:r>
+            <a:r>
+              <a:rPr lang="en-US" dirty="0">
+                <a:latin typeface="Consolas" panose="020B0609020204030204" pitchFamily="49" charset="0"/>
+              </a:rPr>
+              <a:t>);</a:t>
+            </a:r>
+          </a:p>
+          <a:p>
+            <a:r>
+              <a:rPr lang="en-US" dirty="0">
+                <a:latin typeface="Consolas" panose="020B0609020204030204" pitchFamily="49" charset="0"/>
+              </a:rPr>
+              <a:t>}</a:t>
+            </a:r>
+          </a:p>
+          <a:p>
+            <a:endParaRPr lang="en-US" dirty="0">
+              <a:latin typeface="Consolas" panose="020B0609020204030204" pitchFamily="49" charset="0"/>
+            </a:endParaRPr>
+          </a:p>
+          <a:p>
+            <a:r>
+              <a:rPr lang="en-US" dirty="0">
+                <a:latin typeface="Consolas" panose="020B0609020204030204" pitchFamily="49" charset="0"/>
+              </a:rPr>
+              <a:t>export function </a:t>
+            </a:r>
+            <a:r>
+              <a:rPr lang="en-US" dirty="0" err="1">
+                <a:latin typeface="Consolas" panose="020B0609020204030204" pitchFamily="49" charset="0"/>
+              </a:rPr>
+              <a:t>comparePassword</a:t>
+            </a:r>
+            <a:r>
+              <a:rPr lang="en-US" dirty="0">
+                <a:latin typeface="Consolas" panose="020B0609020204030204" pitchFamily="49" charset="0"/>
+              </a:rPr>
+              <a:t>(password: string, </a:t>
+            </a:r>
+            <a:r>
+              <a:rPr lang="en-US" dirty="0" err="1">
+                <a:latin typeface="Consolas" panose="020B0609020204030204" pitchFamily="49" charset="0"/>
+              </a:rPr>
+              <a:t>hashPassword</a:t>
+            </a:r>
+            <a:r>
+              <a:rPr lang="en-US" dirty="0">
+                <a:latin typeface="Consolas" panose="020B0609020204030204" pitchFamily="49" charset="0"/>
+              </a:rPr>
+              <a:t>: string) {</a:t>
+            </a:r>
+          </a:p>
+          <a:p>
+            <a:r>
+              <a:rPr lang="en-US" dirty="0">
+                <a:latin typeface="Consolas" panose="020B0609020204030204" pitchFamily="49" charset="0"/>
+              </a:rPr>
+              <a:t>  return compare(password, </a:t>
+            </a:r>
+            <a:r>
+              <a:rPr lang="en-US" dirty="0" err="1">
+                <a:latin typeface="Consolas" panose="020B0609020204030204" pitchFamily="49" charset="0"/>
+              </a:rPr>
+              <a:t>hashPassword</a:t>
+            </a:r>
+            <a:r>
+              <a:rPr lang="en-US" dirty="0">
+                <a:latin typeface="Consolas" panose="020B0609020204030204" pitchFamily="49" charset="0"/>
+              </a:rPr>
+              <a:t>)</a:t>
+            </a:r>
+          </a:p>
+          <a:p>
+            <a:r>
+              <a:rPr lang="en-US" dirty="0">
+                <a:latin typeface="Consolas" panose="020B0609020204030204" pitchFamily="49" charset="0"/>
+              </a:rPr>
+              <a:t>}</a:t>
+            </a:r>
           </a:p>
         </p:txBody>
       </p:sp>
@@ -7777,7 +11069,7 @@
           <p:cNvPr id="4" name="Footer Placeholder 3">
             <a:extLst>
               <a:ext uri="{FF2B5EF4-FFF2-40B4-BE49-F238E27FC236}">
-                <a16:creationId xmlns:a16="http://schemas.microsoft.com/office/drawing/2014/main" id="{314AE733-17FC-4978-8946-25E688CAA525}"/>
+                <a16:creationId xmlns:a16="http://schemas.microsoft.com/office/drawing/2014/main" id="{505FFA72-C2ED-47AC-A035-2ED4D91ADF14}"/>
               </a:ext>
             </a:extLst>
           </p:cNvPr>
@@ -7806,7 +11098,7 @@
           <p:cNvPr id="5" name="Slide Number Placeholder 4">
             <a:extLst>
               <a:ext uri="{FF2B5EF4-FFF2-40B4-BE49-F238E27FC236}">
-                <a16:creationId xmlns:a16="http://schemas.microsoft.com/office/drawing/2014/main" id="{A9C1E0AE-5C8B-4B64-9B72-9F410FF006A6}"/>
+                <a16:creationId xmlns:a16="http://schemas.microsoft.com/office/drawing/2014/main" id="{319E131F-F2DA-4F6F-BA07-82B93C00CB91}"/>
               </a:ext>
             </a:extLst>
           </p:cNvPr>
@@ -7833,7 +11125,7 @@
     </p:spTree>
     <p:extLst>
       <p:ext uri="{BB962C8B-B14F-4D97-AF65-F5344CB8AC3E}">
-        <p14:creationId xmlns:p14="http://schemas.microsoft.com/office/powerpoint/2010/main" val="399422306"/>
+        <p14:creationId xmlns:p14="http://schemas.microsoft.com/office/powerpoint/2010/main" val="1144819980"/>
       </p:ext>
     </p:extLst>
   </p:cSld>
@@ -7865,7 +11157,7 @@
           <p:cNvPr id="2" name="Title 1">
             <a:extLst>
               <a:ext uri="{FF2B5EF4-FFF2-40B4-BE49-F238E27FC236}">
-                <a16:creationId xmlns:a16="http://schemas.microsoft.com/office/drawing/2014/main" id="{89BA0F43-79AE-49ED-814B-D3934273FFD8}"/>
+                <a16:creationId xmlns:a16="http://schemas.microsoft.com/office/drawing/2014/main" id="{19715DBC-941C-4206-8CB4-798AF62177AC}"/>
               </a:ext>
             </a:extLst>
           </p:cNvPr>
@@ -7882,19 +11174,19 @@
           <a:lstStyle/>
           <a:p>
             <a:r>
-              <a:rPr lang="en-US" dirty="0"/>
-              <a:t>Demo</a:t>
-            </a:r>
-            <a:endParaRPr lang="fa-IR" dirty="0"/>
-          </a:p>
-        </p:txBody>
-      </p:sp>
-      <p:sp>
-        <p:nvSpPr>
-          <p:cNvPr id="3" name="Content Placeholder 2">
+              <a:rPr lang="en-US" dirty="0" err="1"/>
+              <a:t>bcrypt</a:t>
+            </a:r>
+            <a:endParaRPr lang="en-US" dirty="0"/>
+          </a:p>
+        </p:txBody>
+      </p:sp>
+      <p:sp>
+        <p:nvSpPr>
+          <p:cNvPr id="4" name="Footer Placeholder 3">
             <a:extLst>
               <a:ext uri="{FF2B5EF4-FFF2-40B4-BE49-F238E27FC236}">
-                <a16:creationId xmlns:a16="http://schemas.microsoft.com/office/drawing/2014/main" id="{87656D3F-3293-4178-8192-ACE63DCBF579}"/>
+                <a16:creationId xmlns:a16="http://schemas.microsoft.com/office/drawing/2014/main" id="{0FDE4FCD-7774-41E9-BFA2-340BA53EA352}"/>
               </a:ext>
             </a:extLst>
           </p:cNvPr>
@@ -7902,118 +11194,6 @@
             <a:spLocks noGrp="1"/>
           </p:cNvSpPr>
           <p:nvPr>
-            <p:ph idx="1"/>
-          </p:nvPr>
-        </p:nvSpPr>
-        <p:spPr/>
-        <p:txBody>
-          <a:bodyPr/>
-          <a:lstStyle/>
-          <a:p>
-            <a:r>
-              <a:rPr lang="en-US" dirty="0"/>
-              <a:t>Next step, create our first strategy, local strategy</a:t>
-            </a:r>
-          </a:p>
-          <a:p>
-            <a:pPr lvl="1"/>
-            <a:r>
-              <a:rPr lang="en-US" dirty="0"/>
-              <a:t>Extends Passport(Strategy)</a:t>
-            </a:r>
-          </a:p>
-          <a:p>
-            <a:pPr lvl="2"/>
-            <a:r>
-              <a:rPr lang="en-US" dirty="0"/>
-              <a:t>The one that exists in passport-local package (you installed it before)</a:t>
-            </a:r>
-          </a:p>
-          <a:p>
-            <a:pPr lvl="1"/>
-            <a:r>
-              <a:rPr lang="en-US" dirty="0"/>
-              <a:t>Each strategy has two main thing:</a:t>
-            </a:r>
-          </a:p>
-          <a:p>
-            <a:pPr lvl="2"/>
-            <a:r>
-              <a:rPr lang="en-US" dirty="0"/>
-              <a:t>Configuration (through super method in constructor)</a:t>
-            </a:r>
-          </a:p>
-          <a:p>
-            <a:pPr lvl="2"/>
-            <a:r>
-              <a:rPr lang="en-US" dirty="0"/>
-              <a:t>Validate (if user validated or not, using our </a:t>
-            </a:r>
-            <a:r>
-              <a:rPr lang="en-US" dirty="0" err="1"/>
-              <a:t>authService</a:t>
-            </a:r>
-            <a:r>
-              <a:rPr lang="en-US" dirty="0"/>
-              <a:t> which has been injected)</a:t>
-            </a:r>
-          </a:p>
-          <a:p>
-            <a:pPr lvl="3"/>
-            <a:r>
-              <a:rPr lang="en-US" dirty="0"/>
-              <a:t>This method should return user</a:t>
-            </a:r>
-          </a:p>
-          <a:p>
-            <a:pPr lvl="3"/>
-            <a:r>
-              <a:rPr lang="en-US" dirty="0"/>
-              <a:t>Remember to throw </a:t>
-            </a:r>
-            <a:r>
-              <a:rPr lang="en-US" dirty="0" err="1"/>
-              <a:t>UnauthorizedException</a:t>
-            </a:r>
-            <a:r>
-              <a:rPr lang="en-US" dirty="0"/>
-              <a:t> if user does not exist</a:t>
-            </a:r>
-          </a:p>
-          <a:p>
-            <a:pPr lvl="3"/>
-            <a:r>
-              <a:rPr lang="en-US" dirty="0"/>
-              <a:t>This validate method will map to the Verify callback in passport</a:t>
-            </a:r>
-          </a:p>
-          <a:p>
-            <a:pPr lvl="3"/>
-            <a:r>
-              <a:rPr lang="en-US" dirty="0"/>
-              <a:t>Remember: this function input data may vary from strategy to another strategy, for local strategy, inputs are: username </a:t>
-            </a:r>
-            <a:r>
-              <a:rPr lang="en-US"/>
-              <a:t>and password</a:t>
-            </a:r>
-            <a:endParaRPr lang="fa-IR"/>
-          </a:p>
-        </p:txBody>
-      </p:sp>
-      <p:sp>
-        <p:nvSpPr>
-          <p:cNvPr id="4" name="Footer Placeholder 3">
-            <a:extLst>
-              <a:ext uri="{FF2B5EF4-FFF2-40B4-BE49-F238E27FC236}">
-                <a16:creationId xmlns:a16="http://schemas.microsoft.com/office/drawing/2014/main" id="{9466BED1-545F-422F-9DCE-D7BAC7239B43}"/>
-              </a:ext>
-            </a:extLst>
-          </p:cNvPr>
-          <p:cNvSpPr>
-            <a:spLocks noGrp="1"/>
-          </p:cNvSpPr>
-          <p:nvPr>
             <p:ph type="ftr" sz="quarter" idx="11"/>
           </p:nvPr>
         </p:nvSpPr>
@@ -8035,7 +11215,7 @@
           <p:cNvPr id="5" name="Slide Number Placeholder 4">
             <a:extLst>
               <a:ext uri="{FF2B5EF4-FFF2-40B4-BE49-F238E27FC236}">
-                <a16:creationId xmlns:a16="http://schemas.microsoft.com/office/drawing/2014/main" id="{C11601FE-0069-4395-B6AD-980CB7921848}"/>
+                <a16:creationId xmlns:a16="http://schemas.microsoft.com/office/drawing/2014/main" id="{7F9D5C86-9555-4E5C-B79D-F8D6C4E5A0D7}"/>
               </a:ext>
             </a:extLst>
           </p:cNvPr>
@@ -8059,10 +11239,59 @@
           </a:p>
         </p:txBody>
       </p:sp>
+      <p:pic>
+        <p:nvPicPr>
+          <p:cNvPr id="4098" name="Picture 2">
+            <a:extLst>
+              <a:ext uri="{FF2B5EF4-FFF2-40B4-BE49-F238E27FC236}">
+                <a16:creationId xmlns:a16="http://schemas.microsoft.com/office/drawing/2014/main" id="{047D01AF-59B1-4298-82CA-42F1BAC4B496}"/>
+              </a:ext>
+            </a:extLst>
+          </p:cNvPr>
+          <p:cNvPicPr>
+            <a:picLocks noGrp="1" noChangeAspect="1" noChangeArrowheads="1"/>
+          </p:cNvPicPr>
+          <p:nvPr>
+            <p:ph idx="1"/>
+          </p:nvPr>
+        </p:nvPicPr>
+        <p:blipFill>
+          <a:blip r:embed="rId3">
+            <a:extLst>
+              <a:ext uri="{28A0092B-C50C-407E-A947-70E740481C1C}">
+                <a14:useLocalDpi xmlns:a14="http://schemas.microsoft.com/office/drawing/2010/main" val="0"/>
+              </a:ext>
+            </a:extLst>
+          </a:blip>
+          <a:srcRect/>
+          <a:stretch>
+            <a:fillRect/>
+          </a:stretch>
+        </p:blipFill>
+        <p:spPr bwMode="auto">
+          <a:xfrm>
+            <a:off x="382598" y="2142469"/>
+            <a:ext cx="11417278" cy="3554138"/>
+          </a:xfrm>
+          <a:prstGeom prst="rect">
+            <a:avLst/>
+          </a:prstGeom>
+          <a:noFill/>
+          <a:extLst>
+            <a:ext uri="{909E8E84-426E-40DD-AFC4-6F175D3DCCD1}">
+              <a14:hiddenFill xmlns:a14="http://schemas.microsoft.com/office/drawing/2010/main">
+                <a:solidFill>
+                  <a:srgbClr val="FFFFFF"/>
+                </a:solidFill>
+              </a14:hiddenFill>
+            </a:ext>
+          </a:extLst>
+        </p:spPr>
+      </p:pic>
     </p:spTree>
     <p:extLst>
       <p:ext uri="{BB962C8B-B14F-4D97-AF65-F5344CB8AC3E}">
-        <p14:creationId xmlns:p14="http://schemas.microsoft.com/office/powerpoint/2010/main" val="1380841284"/>
+        <p14:creationId xmlns:p14="http://schemas.microsoft.com/office/powerpoint/2010/main" val="1347963362"/>
       </p:ext>
     </p:extLst>
   </p:cSld>
@@ -8094,7 +11323,7 @@
           <p:cNvPr id="2" name="Title 1">
             <a:extLst>
               <a:ext uri="{FF2B5EF4-FFF2-40B4-BE49-F238E27FC236}">
-                <a16:creationId xmlns:a16="http://schemas.microsoft.com/office/drawing/2014/main" id="{6B1A0672-14A7-4501-900C-A98EBCCF7AFE}"/>
+                <a16:creationId xmlns:a16="http://schemas.microsoft.com/office/drawing/2014/main" id="{8179ED3D-4D51-4E0E-90E6-BB4A2383933C}"/>
               </a:ext>
             </a:extLst>
           </p:cNvPr>
@@ -8112,8 +11341,9 @@
           <a:p>
             <a:r>
               <a:rPr lang="en-US" dirty="0"/>
-              <a:t>Exercise</a:t>
-            </a:r>
+              <a:t>What is passport?</a:t>
+            </a:r>
+            <a:endParaRPr lang="fa-IR" dirty="0"/>
           </a:p>
         </p:txBody>
       </p:sp>
@@ -8122,7 +11352,7 @@
           <p:cNvPr id="3" name="Content Placeholder 2">
             <a:extLst>
               <a:ext uri="{FF2B5EF4-FFF2-40B4-BE49-F238E27FC236}">
-                <a16:creationId xmlns:a16="http://schemas.microsoft.com/office/drawing/2014/main" id="{2AEB1BE9-8435-42BF-A4F1-2F148FA9187A}"/>
+                <a16:creationId xmlns:a16="http://schemas.microsoft.com/office/drawing/2014/main" id="{607AFF0B-882F-4950-A4C3-17E2FDF76C34}"/>
               </a:ext>
             </a:extLst>
           </p:cNvPr>
@@ -8135,34 +11365,28 @@
         </p:nvSpPr>
         <p:spPr/>
         <p:txBody>
-          <a:bodyPr>
-            <a:normAutofit/>
-          </a:bodyPr>
-          <a:lstStyle/>
-          <a:p>
-            <a:r>
-              <a:rPr lang="en-US" dirty="0"/>
-              <a:t>Required:</a:t>
-            </a:r>
-          </a:p>
-          <a:p>
-            <a:pPr lvl="1"/>
-            <a:r>
-              <a:rPr lang="en-US" dirty="0"/>
-              <a:t>Exercise all we speak</a:t>
-            </a:r>
-          </a:p>
-          <a:p>
-            <a:pPr lvl="1"/>
-            <a:r>
-              <a:rPr lang="en-US" dirty="0"/>
-              <a:t>Create your swagger </a:t>
-            </a:r>
-            <a:r>
-              <a:rPr lang="en-US" dirty="0" err="1"/>
-              <a:t>ui</a:t>
-            </a:r>
-            <a:endParaRPr lang="fa-IR" dirty="0"/>
+          <a:bodyPr/>
+          <a:lstStyle/>
+          <a:p>
+            <a:r>
+              <a:rPr lang="en-US" dirty="0">
+                <a:hlinkClick r:id="rId2"/>
+              </a:rPr>
+              <a:t>https://Passportjs.org</a:t>
+            </a:r>
+            <a:endParaRPr lang="en-US" dirty="0"/>
+          </a:p>
+          <a:p>
+            <a:r>
+              <a:rPr lang="en-US" dirty="0"/>
+              <a:t>Passport gives you the basic layer, and you can implement your own strategy</a:t>
+            </a:r>
+          </a:p>
+          <a:p>
+            <a:r>
+              <a:rPr lang="en-US" dirty="0"/>
+              <a:t>Nest.js creates its own authentication strategy that wraps this packages</a:t>
+            </a:r>
           </a:p>
         </p:txBody>
       </p:sp>
@@ -8171,7 +11395,7 @@
           <p:cNvPr id="4" name="Footer Placeholder 3">
             <a:extLst>
               <a:ext uri="{FF2B5EF4-FFF2-40B4-BE49-F238E27FC236}">
-                <a16:creationId xmlns:a16="http://schemas.microsoft.com/office/drawing/2014/main" id="{E3C0E9F9-B143-43AD-BD5C-508C3E46FF7B}"/>
+                <a16:creationId xmlns:a16="http://schemas.microsoft.com/office/drawing/2014/main" id="{9AA66BDC-9C5F-4073-87DE-848BDC37E5C6}"/>
               </a:ext>
             </a:extLst>
           </p:cNvPr>
@@ -8200,7 +11424,7 @@
           <p:cNvPr id="5" name="Slide Number Placeholder 4">
             <a:extLst>
               <a:ext uri="{FF2B5EF4-FFF2-40B4-BE49-F238E27FC236}">
-                <a16:creationId xmlns:a16="http://schemas.microsoft.com/office/drawing/2014/main" id="{1B95C015-BA9F-40C7-A04C-3B835E7354AB}"/>
+                <a16:creationId xmlns:a16="http://schemas.microsoft.com/office/drawing/2014/main" id="{3559B541-F032-434F-9803-88FDF6BD21E7}"/>
               </a:ext>
             </a:extLst>
           </p:cNvPr>
@@ -8227,7 +11451,210 @@
     </p:spTree>
     <p:extLst>
       <p:ext uri="{BB962C8B-B14F-4D97-AF65-F5344CB8AC3E}">
-        <p14:creationId xmlns:p14="http://schemas.microsoft.com/office/powerpoint/2010/main" val="817859998"/>
+        <p14:creationId xmlns:p14="http://schemas.microsoft.com/office/powerpoint/2010/main" val="2476310186"/>
+      </p:ext>
+    </p:extLst>
+  </p:cSld>
+  <p:clrMapOvr>
+    <a:masterClrMapping/>
+  </p:clrMapOvr>
+</p:sld>
+</file>
+
+<file path=ppt/slides/slide9.xml><?xml version="1.0" encoding="utf-8"?>
+<p:sld xmlns:a="http://schemas.openxmlformats.org/drawingml/2006/main" xmlns:r="http://schemas.openxmlformats.org/officeDocument/2006/relationships" xmlns:p="http://schemas.openxmlformats.org/presentationml/2006/main">
+  <p:cSld>
+    <p:spTree>
+      <p:nvGrpSpPr>
+        <p:cNvPr id="1" name=""/>
+        <p:cNvGrpSpPr/>
+        <p:nvPr/>
+      </p:nvGrpSpPr>
+      <p:grpSpPr>
+        <a:xfrm>
+          <a:off x="0" y="0"/>
+          <a:ext cx="0" cy="0"/>
+          <a:chOff x="0" y="0"/>
+          <a:chExt cx="0" cy="0"/>
+        </a:xfrm>
+      </p:grpSpPr>
+      <p:sp>
+        <p:nvSpPr>
+          <p:cNvPr id="2" name="Title 1">
+            <a:extLst>
+              <a:ext uri="{FF2B5EF4-FFF2-40B4-BE49-F238E27FC236}">
+                <a16:creationId xmlns:a16="http://schemas.microsoft.com/office/drawing/2014/main" id="{6E34F8E2-09B0-4CF4-A858-BCB6A6265846}"/>
+              </a:ext>
+            </a:extLst>
+          </p:cNvPr>
+          <p:cNvSpPr>
+            <a:spLocks noGrp="1"/>
+          </p:cNvSpPr>
+          <p:nvPr>
+            <p:ph type="title"/>
+          </p:nvPr>
+        </p:nvSpPr>
+        <p:spPr/>
+        <p:txBody>
+          <a:bodyPr/>
+          <a:lstStyle/>
+          <a:p>
+            <a:r>
+              <a:rPr lang="en-US" dirty="0"/>
+              <a:t>Demo</a:t>
+            </a:r>
+            <a:endParaRPr lang="fa-IR" dirty="0"/>
+          </a:p>
+        </p:txBody>
+      </p:sp>
+      <p:sp>
+        <p:nvSpPr>
+          <p:cNvPr id="3" name="Content Placeholder 2">
+            <a:extLst>
+              <a:ext uri="{FF2B5EF4-FFF2-40B4-BE49-F238E27FC236}">
+                <a16:creationId xmlns:a16="http://schemas.microsoft.com/office/drawing/2014/main" id="{1209029E-C466-42E6-BB03-97E1A9FC7DC4}"/>
+              </a:ext>
+            </a:extLst>
+          </p:cNvPr>
+          <p:cNvSpPr>
+            <a:spLocks noGrp="1"/>
+          </p:cNvSpPr>
+          <p:nvPr>
+            <p:ph idx="1"/>
+          </p:nvPr>
+        </p:nvSpPr>
+        <p:spPr/>
+        <p:txBody>
+          <a:bodyPr/>
+          <a:lstStyle/>
+          <a:p>
+            <a:r>
+              <a:rPr lang="en-US" dirty="0"/>
+              <a:t>Install it:</a:t>
+            </a:r>
+          </a:p>
+          <a:p>
+            <a:pPr lvl="1"/>
+            <a:r>
+              <a:rPr lang="en-US" dirty="0" err="1">
+                <a:latin typeface="Consolas" panose="020B0609020204030204" pitchFamily="49" charset="0"/>
+              </a:rPr>
+              <a:t>npm</a:t>
+            </a:r>
+            <a:r>
+              <a:rPr lang="en-US" dirty="0">
+                <a:latin typeface="Consolas" panose="020B0609020204030204" pitchFamily="49" charset="0"/>
+              </a:rPr>
+              <a:t> install @nestjs/passport passport</a:t>
+            </a:r>
+          </a:p>
+          <a:p>
+            <a:r>
+              <a:rPr lang="en-US" dirty="0"/>
+              <a:t>Strategies:</a:t>
+            </a:r>
+          </a:p>
+          <a:p>
+            <a:pPr lvl="1"/>
+            <a:r>
+              <a:rPr lang="en-US" dirty="0"/>
+              <a:t>Very simple strategy</a:t>
+            </a:r>
+          </a:p>
+          <a:p>
+            <a:pPr lvl="2"/>
+            <a:r>
+              <a:rPr lang="en-US" dirty="0" err="1">
+                <a:latin typeface="Consolas" panose="020B0609020204030204" pitchFamily="49" charset="0"/>
+              </a:rPr>
+              <a:t>npm</a:t>
+            </a:r>
+            <a:r>
+              <a:rPr lang="en-US" dirty="0">
+                <a:latin typeface="Consolas" panose="020B0609020204030204" pitchFamily="49" charset="0"/>
+              </a:rPr>
+              <a:t> install passport-local</a:t>
+            </a:r>
+          </a:p>
+          <a:p>
+            <a:pPr lvl="2"/>
+            <a:r>
+              <a:rPr lang="en-US" dirty="0" err="1">
+                <a:latin typeface="Consolas" panose="020B0609020204030204" pitchFamily="49" charset="0"/>
+              </a:rPr>
+              <a:t>npm</a:t>
+            </a:r>
+            <a:r>
+              <a:rPr lang="en-US" dirty="0">
+                <a:latin typeface="Consolas" panose="020B0609020204030204" pitchFamily="49" charset="0"/>
+              </a:rPr>
+              <a:t> install --save-dev @types/passport-local</a:t>
+            </a:r>
+          </a:p>
+        </p:txBody>
+      </p:sp>
+      <p:sp>
+        <p:nvSpPr>
+          <p:cNvPr id="4" name="Footer Placeholder 3">
+            <a:extLst>
+              <a:ext uri="{FF2B5EF4-FFF2-40B4-BE49-F238E27FC236}">
+                <a16:creationId xmlns:a16="http://schemas.microsoft.com/office/drawing/2014/main" id="{0BCF773E-66E6-4282-8FA0-6E6509B3F735}"/>
+              </a:ext>
+            </a:extLst>
+          </p:cNvPr>
+          <p:cNvSpPr>
+            <a:spLocks noGrp="1"/>
+          </p:cNvSpPr>
+          <p:nvPr>
+            <p:ph type="ftr" sz="quarter" idx="11"/>
+          </p:nvPr>
+        </p:nvSpPr>
+        <p:spPr/>
+        <p:txBody>
+          <a:bodyPr/>
+          <a:lstStyle/>
+          <a:p>
+            <a:r>
+              <a:rPr lang="en-US"/>
+              <a:t>Nodejs Basics</a:t>
+            </a:r>
+            <a:endParaRPr lang="en-US" dirty="0"/>
+          </a:p>
+        </p:txBody>
+      </p:sp>
+      <p:sp>
+        <p:nvSpPr>
+          <p:cNvPr id="5" name="Slide Number Placeholder 4">
+            <a:extLst>
+              <a:ext uri="{FF2B5EF4-FFF2-40B4-BE49-F238E27FC236}">
+                <a16:creationId xmlns:a16="http://schemas.microsoft.com/office/drawing/2014/main" id="{CFB5C8FB-8622-4CB5-A66E-D540D39DA117}"/>
+              </a:ext>
+            </a:extLst>
+          </p:cNvPr>
+          <p:cNvSpPr>
+            <a:spLocks noGrp="1"/>
+          </p:cNvSpPr>
+          <p:nvPr>
+            <p:ph type="sldNum" sz="quarter" idx="12"/>
+          </p:nvPr>
+        </p:nvSpPr>
+        <p:spPr/>
+        <p:txBody>
+          <a:bodyPr/>
+          <a:lstStyle/>
+          <a:p>
+            <a:fld id="{3A98EE3D-8CD1-4C3F-BD1C-C98C9596463C}" type="slidenum">
+              <a:rPr lang="en-US" smtClean="0"/>
+              <a:t>9</a:t>
+            </a:fld>
+            <a:endParaRPr lang="en-US" dirty="0"/>
+          </a:p>
+        </p:txBody>
+      </p:sp>
+    </p:spTree>
+    <p:extLst>
+      <p:ext uri="{BB962C8B-B14F-4D97-AF65-F5344CB8AC3E}">
+        <p14:creationId xmlns:p14="http://schemas.microsoft.com/office/powerpoint/2010/main" val="1038190284"/>
       </p:ext>
     </p:extLst>
   </p:cSld>

</xml_diff>

<commit_message>
fix: 🐛 session09 nest.js scripts added
</commit_message>
<xml_diff>
--- a/nestjs/nestjs-09.pptx
+++ b/nestjs/nestjs-09.pptx
@@ -5,7 +5,7 @@
     <p:sldMasterId id="2147483705" r:id="rId1"/>
   </p:sldMasterIdLst>
   <p:notesMasterIdLst>
-    <p:notesMasterId r:id="rId24"/>
+    <p:notesMasterId r:id="rId15"/>
   </p:notesMasterIdLst>
   <p:sldIdLst>
     <p:sldId id="259" r:id="rId2"/>
@@ -20,16 +20,7 @@
     <p:sldId id="324" r:id="rId11"/>
     <p:sldId id="325" r:id="rId12"/>
     <p:sldId id="330" r:id="rId13"/>
-    <p:sldId id="331" r:id="rId14"/>
-    <p:sldId id="332" r:id="rId15"/>
-    <p:sldId id="333" r:id="rId16"/>
-    <p:sldId id="337" r:id="rId17"/>
-    <p:sldId id="338" r:id="rId18"/>
-    <p:sldId id="339" r:id="rId19"/>
-    <p:sldId id="334" r:id="rId20"/>
-    <p:sldId id="335" r:id="rId21"/>
-    <p:sldId id="336" r:id="rId22"/>
-    <p:sldId id="320" r:id="rId23"/>
+    <p:sldId id="320" r:id="rId14"/>
   </p:sldIdLst>
   <p:sldSz cx="12192000" cy="6858000"/>
   <p:notesSz cx="6858000" cy="9144000"/>
@@ -218,7 +209,7 @@
           <a:p>
             <a:fld id="{9B9ECB28-6A22-4037-9487-F3F739F744D6}" type="datetimeFigureOut">
               <a:rPr lang="en-US" smtClean="0"/>
-              <a:t>2/2/2022</a:t>
+              <a:t>2/4/2022</a:t>
             </a:fld>
             <a:endParaRPr lang="en-US"/>
           </a:p>
@@ -703,174 +694,6 @@
           <a:bodyPr/>
           <a:lstStyle/>
           <a:p>
-            <a:endParaRPr lang="en-US" dirty="0"/>
-          </a:p>
-        </p:txBody>
-      </p:sp>
-      <p:sp>
-        <p:nvSpPr>
-          <p:cNvPr id="4" name="Slide Number Placeholder 3"/>
-          <p:cNvSpPr>
-            <a:spLocks noGrp="1"/>
-          </p:cNvSpPr>
-          <p:nvPr>
-            <p:ph type="sldNum" sz="quarter" idx="5"/>
-          </p:nvPr>
-        </p:nvSpPr>
-        <p:spPr/>
-        <p:txBody>
-          <a:bodyPr/>
-          <a:lstStyle/>
-          <a:p>
-            <a:fld id="{0FE84E6F-3671-472C-BE6F-A37BC298F4AB}" type="slidenum">
-              <a:rPr lang="en-US" smtClean="0"/>
-              <a:t>14</a:t>
-            </a:fld>
-            <a:endParaRPr lang="en-US"/>
-          </a:p>
-        </p:txBody>
-      </p:sp>
-    </p:spTree>
-    <p:extLst>
-      <p:ext uri="{BB962C8B-B14F-4D97-AF65-F5344CB8AC3E}">
-        <p14:creationId xmlns:p14="http://schemas.microsoft.com/office/powerpoint/2010/main" val="4043579101"/>
-      </p:ext>
-    </p:extLst>
-  </p:cSld>
-  <p:clrMapOvr>
-    <a:masterClrMapping/>
-  </p:clrMapOvr>
-</p:notes>
-</file>
-
-<file path=ppt/notesSlides/notesSlide4.xml><?xml version="1.0" encoding="utf-8"?>
-<p:notes xmlns:a="http://schemas.openxmlformats.org/drawingml/2006/main" xmlns:r="http://schemas.openxmlformats.org/officeDocument/2006/relationships" xmlns:p="http://schemas.openxmlformats.org/presentationml/2006/main">
-  <p:cSld>
-    <p:spTree>
-      <p:nvGrpSpPr>
-        <p:cNvPr id="1" name=""/>
-        <p:cNvGrpSpPr/>
-        <p:nvPr/>
-      </p:nvGrpSpPr>
-      <p:grpSpPr>
-        <a:xfrm>
-          <a:off x="0" y="0"/>
-          <a:ext cx="0" cy="0"/>
-          <a:chOff x="0" y="0"/>
-          <a:chExt cx="0" cy="0"/>
-        </a:xfrm>
-      </p:grpSpPr>
-      <p:sp>
-        <p:nvSpPr>
-          <p:cNvPr id="2" name="Slide Image Placeholder 1"/>
-          <p:cNvSpPr>
-            <a:spLocks noGrp="1" noRot="1" noChangeAspect="1"/>
-          </p:cNvSpPr>
-          <p:nvPr>
-            <p:ph type="sldImg"/>
-          </p:nvPr>
-        </p:nvSpPr>
-        <p:spPr/>
-      </p:sp>
-      <p:sp>
-        <p:nvSpPr>
-          <p:cNvPr id="3" name="Notes Placeholder 2"/>
-          <p:cNvSpPr>
-            <a:spLocks noGrp="1"/>
-          </p:cNvSpPr>
-          <p:nvPr>
-            <p:ph type="body" idx="1"/>
-          </p:nvPr>
-        </p:nvSpPr>
-        <p:spPr/>
-        <p:txBody>
-          <a:bodyPr/>
-          <a:lstStyle/>
-          <a:p>
-            <a:endParaRPr lang="en-US" dirty="0"/>
-          </a:p>
-        </p:txBody>
-      </p:sp>
-      <p:sp>
-        <p:nvSpPr>
-          <p:cNvPr id="4" name="Slide Number Placeholder 3"/>
-          <p:cNvSpPr>
-            <a:spLocks noGrp="1"/>
-          </p:cNvSpPr>
-          <p:nvPr>
-            <p:ph type="sldNum" sz="quarter" idx="5"/>
-          </p:nvPr>
-        </p:nvSpPr>
-        <p:spPr/>
-        <p:txBody>
-          <a:bodyPr/>
-          <a:lstStyle/>
-          <a:p>
-            <a:fld id="{0FE84E6F-3671-472C-BE6F-A37BC298F4AB}" type="slidenum">
-              <a:rPr lang="en-US" smtClean="0"/>
-              <a:t>15</a:t>
-            </a:fld>
-            <a:endParaRPr lang="en-US"/>
-          </a:p>
-        </p:txBody>
-      </p:sp>
-    </p:spTree>
-    <p:extLst>
-      <p:ext uri="{BB962C8B-B14F-4D97-AF65-F5344CB8AC3E}">
-        <p14:creationId xmlns:p14="http://schemas.microsoft.com/office/powerpoint/2010/main" val="1538203455"/>
-      </p:ext>
-    </p:extLst>
-  </p:cSld>
-  <p:clrMapOvr>
-    <a:masterClrMapping/>
-  </p:clrMapOvr>
-</p:notes>
-</file>
-
-<file path=ppt/notesSlides/notesSlide5.xml><?xml version="1.0" encoding="utf-8"?>
-<p:notes xmlns:a="http://schemas.openxmlformats.org/drawingml/2006/main" xmlns:r="http://schemas.openxmlformats.org/officeDocument/2006/relationships" xmlns:p="http://schemas.openxmlformats.org/presentationml/2006/main">
-  <p:cSld>
-    <p:spTree>
-      <p:nvGrpSpPr>
-        <p:cNvPr id="1" name=""/>
-        <p:cNvGrpSpPr/>
-        <p:nvPr/>
-      </p:nvGrpSpPr>
-      <p:grpSpPr>
-        <a:xfrm>
-          <a:off x="0" y="0"/>
-          <a:ext cx="0" cy="0"/>
-          <a:chOff x="0" y="0"/>
-          <a:chExt cx="0" cy="0"/>
-        </a:xfrm>
-      </p:grpSpPr>
-      <p:sp>
-        <p:nvSpPr>
-          <p:cNvPr id="2" name="Slide Image Placeholder 1"/>
-          <p:cNvSpPr>
-            <a:spLocks noGrp="1" noRot="1" noChangeAspect="1"/>
-          </p:cNvSpPr>
-          <p:nvPr>
-            <p:ph type="sldImg"/>
-          </p:nvPr>
-        </p:nvSpPr>
-        <p:spPr/>
-      </p:sp>
-      <p:sp>
-        <p:nvSpPr>
-          <p:cNvPr id="3" name="Notes Placeholder 2"/>
-          <p:cNvSpPr>
-            <a:spLocks noGrp="1"/>
-          </p:cNvSpPr>
-          <p:nvPr>
-            <p:ph type="body" idx="1"/>
-          </p:nvPr>
-        </p:nvSpPr>
-        <p:spPr/>
-        <p:txBody>
-          <a:bodyPr/>
-          <a:lstStyle/>
-          <a:p>
             <a:r>
               <a:rPr lang="en-US" dirty="0"/>
               <a:t>Hint: </a:t>
@@ -951,7 +774,7 @@
           <a:p>
             <a:fld id="{0FE84E6F-3671-472C-BE6F-A37BC298F4AB}" type="slidenum">
               <a:rPr lang="en-US" smtClean="0"/>
-              <a:t>22</a:t>
+              <a:t>13</a:t>
             </a:fld>
             <a:endParaRPr lang="en-US"/>
           </a:p>
@@ -1154,7 +977,7 @@
           <a:p>
             <a:fld id="{19B6F524-99F3-4BEA-ACD7-976EF4D36657}" type="datetime1">
               <a:rPr lang="en-US" smtClean="0"/>
-              <a:t>2/2/2022</a:t>
+              <a:t>2/4/2022</a:t>
             </a:fld>
             <a:endParaRPr lang="en-US" dirty="0"/>
           </a:p>
@@ -1463,7 +1286,7 @@
           <a:p>
             <a:fld id="{2145C3A9-05D9-428D-9788-A7F14838F6F9}" type="datetime1">
               <a:rPr lang="en-US" smtClean="0"/>
-              <a:t>2/2/2022</a:t>
+              <a:t>2/4/2022</a:t>
             </a:fld>
             <a:endParaRPr lang="en-US" dirty="0"/>
           </a:p>
@@ -1661,7 +1484,7 @@
           <a:p>
             <a:fld id="{82C701FB-B03E-4981-A9F8-99B474DD173A}" type="datetime1">
               <a:rPr lang="en-US" smtClean="0"/>
-              <a:t>2/2/2022</a:t>
+              <a:t>2/4/2022</a:t>
             </a:fld>
             <a:endParaRPr lang="en-US" dirty="0"/>
           </a:p>
@@ -1928,7 +1751,7 @@
           <a:p>
             <a:fld id="{7A7E8EF3-CBF7-4EB9-B6E5-3754574E3433}" type="datetime1">
               <a:rPr lang="en-US" smtClean="0"/>
-              <a:t>2/2/2022</a:t>
+              <a:t>2/4/2022</a:t>
             </a:fld>
             <a:endParaRPr lang="en-US" dirty="0"/>
           </a:p>
@@ -2368,7 +2191,7 @@
           <a:p>
             <a:fld id="{DA8A4A96-31AC-487C-9F15-1822D58542B7}" type="datetime1">
               <a:rPr lang="en-US" smtClean="0"/>
-              <a:t>2/2/2022</a:t>
+              <a:t>2/4/2022</a:t>
             </a:fld>
             <a:endParaRPr lang="en-US" dirty="0"/>
           </a:p>
@@ -2909,7 +2732,7 @@
           <a:p>
             <a:fld id="{FBBF9546-09C4-4F24-A284-5B81FF8659B4}" type="datetime1">
               <a:rPr lang="en-US" smtClean="0"/>
-              <a:t>2/2/2022</a:t>
+              <a:t>2/4/2022</a:t>
             </a:fld>
             <a:endParaRPr lang="en-US" dirty="0"/>
           </a:p>
@@ -3795,7 +3618,7 @@
           <a:p>
             <a:fld id="{5BF4405D-15A5-450B-B053-484859B9C8F7}" type="datetime1">
               <a:rPr lang="en-US" smtClean="0"/>
-              <a:t>2/2/2022</a:t>
+              <a:t>2/4/2022</a:t>
             </a:fld>
             <a:endParaRPr lang="en-US" dirty="0"/>
           </a:p>
@@ -3969,7 +3792,7 @@
           <a:p>
             <a:fld id="{E0366559-EC21-40C1-8A65-9A3B4EA78391}" type="datetime1">
               <a:rPr lang="en-US" smtClean="0"/>
-              <a:t>2/2/2022</a:t>
+              <a:t>2/4/2022</a:t>
             </a:fld>
             <a:endParaRPr lang="en-US" dirty="0"/>
           </a:p>
@@ -4157,7 +3980,7 @@
           <a:p>
             <a:fld id="{4F09CA92-695C-4FFA-8E37-4D2C288BCC04}" type="datetime1">
               <a:rPr lang="en-US" smtClean="0"/>
-              <a:t>2/2/2022</a:t>
+              <a:t>2/4/2022</a:t>
             </a:fld>
             <a:endParaRPr lang="en-US" dirty="0"/>
           </a:p>
@@ -4331,7 +4154,7 @@
           <a:p>
             <a:fld id="{CA551262-FC07-4FE4-9221-F72F7D4F209A}" type="datetime1">
               <a:rPr lang="en-US" smtClean="0"/>
-              <a:t>2/2/2022</a:t>
+              <a:t>2/4/2022</a:t>
             </a:fld>
             <a:endParaRPr lang="en-US" dirty="0"/>
           </a:p>
@@ -4579,7 +4402,7 @@
           <a:p>
             <a:fld id="{46A321E4-8899-4F7D-BEB1-BD52626ABD8D}" type="datetime1">
               <a:rPr lang="en-US" smtClean="0"/>
-              <a:t>2/2/2022</a:t>
+              <a:t>2/4/2022</a:t>
             </a:fld>
             <a:endParaRPr lang="en-US" dirty="0"/>
           </a:p>
@@ -4825,7 +4648,7 @@
           <a:p>
             <a:fld id="{B53F6DFA-8A0E-4513-867D-18B9AA66B23C}" type="datetime1">
               <a:rPr lang="en-US" smtClean="0"/>
-              <a:t>2/2/2022</a:t>
+              <a:t>2/4/2022</a:t>
             </a:fld>
             <a:endParaRPr lang="en-US" dirty="0"/>
           </a:p>
@@ -5312,7 +5135,7 @@
           <a:p>
             <a:fld id="{154283A7-B9AC-454B-A468-44B75A398B49}" type="datetime1">
               <a:rPr lang="en-US" smtClean="0"/>
-              <a:t>2/2/2022</a:t>
+              <a:t>2/4/2022</a:t>
             </a:fld>
             <a:endParaRPr lang="en-US" dirty="0"/>
           </a:p>
@@ -5434,7 +5257,7 @@
           <a:p>
             <a:fld id="{A3F8184D-DEDD-48A0-9ACA-5F6ED9EFE5B8}" type="datetime1">
               <a:rPr lang="en-US" smtClean="0"/>
-              <a:t>2/2/2022</a:t>
+              <a:t>2/4/2022</a:t>
             </a:fld>
             <a:endParaRPr lang="en-US" dirty="0"/>
           </a:p>
@@ -5533,7 +5356,7 @@
           <a:p>
             <a:fld id="{BF38AC0E-F520-48F3-BA14-8BAB82D735FB}" type="datetime1">
               <a:rPr lang="en-US" smtClean="0"/>
-              <a:t>2/2/2022</a:t>
+              <a:t>2/4/2022</a:t>
             </a:fld>
             <a:endParaRPr lang="en-US" dirty="0"/>
           </a:p>
@@ -5792,7 +5615,7 @@
           <a:p>
             <a:fld id="{317D0F2A-2724-4AD4-BF4C-A7B1910D9412}" type="datetime1">
               <a:rPr lang="en-US" smtClean="0"/>
-              <a:t>2/2/2022</a:t>
+              <a:t>2/4/2022</a:t>
             </a:fld>
             <a:endParaRPr lang="en-US" dirty="0"/>
           </a:p>
@@ -6103,7 +5926,7 @@
           <a:p>
             <a:fld id="{9A0B82A5-4A21-4F82-91DB-989CE997E82E}" type="datetime1">
               <a:rPr lang="en-US" smtClean="0"/>
-              <a:t>2/2/2022</a:t>
+              <a:t>2/4/2022</a:t>
             </a:fld>
             <a:endParaRPr lang="en-US" dirty="0"/>
           </a:p>
@@ -6340,7 +6163,7 @@
           <a:p>
             <a:fld id="{01BFEF8A-AE08-4951-B923-589F814B0C31}" type="datetime1">
               <a:rPr lang="en-US" smtClean="0"/>
-              <a:t>2/2/2022</a:t>
+              <a:t>2/4/2022</a:t>
             </a:fld>
             <a:endParaRPr lang="en-US" dirty="0"/>
           </a:p>
@@ -7908,7 +7731,7 @@
           <p:cNvPr id="2" name="Title 1">
             <a:extLst>
               <a:ext uri="{FF2B5EF4-FFF2-40B4-BE49-F238E27FC236}">
-                <a16:creationId xmlns:a16="http://schemas.microsoft.com/office/drawing/2014/main" id="{AC385EE2-B82F-4F5C-9FA7-D7FCDB8D560D}"/>
+                <a16:creationId xmlns:a16="http://schemas.microsoft.com/office/drawing/2014/main" id="{6B1A0672-14A7-4501-900C-A98EBCCF7AFE}"/>
               </a:ext>
             </a:extLst>
           </p:cNvPr>
@@ -7926,7 +7749,7 @@
           <a:p>
             <a:r>
               <a:rPr lang="en-US" dirty="0"/>
-              <a:t>Demo</a:t>
+              <a:t>Exercise</a:t>
             </a:r>
           </a:p>
         </p:txBody>
@@ -7936,7 +7759,7 @@
           <p:cNvPr id="3" name="Content Placeholder 2">
             <a:extLst>
               <a:ext uri="{FF2B5EF4-FFF2-40B4-BE49-F238E27FC236}">
-                <a16:creationId xmlns:a16="http://schemas.microsoft.com/office/drawing/2014/main" id="{731FCB6C-5080-49E2-81E8-E7B4AFACF6AC}"/>
+                <a16:creationId xmlns:a16="http://schemas.microsoft.com/office/drawing/2014/main" id="{2AEB1BE9-8435-42BF-A4F1-2F148FA9187A}"/>
               </a:ext>
             </a:extLst>
           </p:cNvPr>
@@ -7949,100 +7772,26 @@
         </p:nvSpPr>
         <p:spPr/>
         <p:txBody>
-          <a:bodyPr/>
+          <a:bodyPr>
+            <a:normAutofit/>
+          </a:bodyPr>
           <a:lstStyle/>
           <a:p>
             <a:r>
               <a:rPr lang="en-US" dirty="0"/>
-              <a:t>How about other protected route?</a:t>
+              <a:t>Required:</a:t>
             </a:r>
           </a:p>
           <a:p>
             <a:pPr lvl="1"/>
             <a:r>
               <a:rPr lang="en-US" dirty="0"/>
-              <a:t>We can’t pass the username, password of the user in each request, IT ISN’T SECURE!!!!!!!!</a:t>
-            </a:r>
-          </a:p>
-          <a:p>
-            <a:pPr lvl="1"/>
-            <a:r>
-              <a:rPr lang="en-US" dirty="0"/>
-              <a:t>There it comes some ways to store user logins</a:t>
-            </a:r>
-          </a:p>
-          <a:p>
-            <a:pPr lvl="2"/>
-            <a:r>
-              <a:rPr lang="en-US" dirty="0"/>
-              <a:t>Session, stores user session inside server</a:t>
-            </a:r>
-          </a:p>
-          <a:p>
-            <a:pPr lvl="3"/>
-            <a:r>
-              <a:rPr lang="en-US" dirty="0"/>
-              <a:t>Introduce states, we have to store that in server side (</a:t>
-            </a:r>
-            <a:r>
-              <a:rPr lang="en-US" dirty="0" err="1"/>
-              <a:t>db</a:t>
-            </a:r>
-            <a:r>
-              <a:rPr lang="en-US" dirty="0"/>
-              <a:t>, </a:t>
-            </a:r>
-            <a:r>
-              <a:rPr lang="en-US" dirty="0" err="1"/>
-              <a:t>redis</a:t>
-            </a:r>
-            <a:r>
-              <a:rPr lang="en-US" dirty="0"/>
-              <a:t>, …)</a:t>
-            </a:r>
-          </a:p>
-          <a:p>
-            <a:pPr lvl="3"/>
-            <a:r>
-              <a:rPr lang="en-US" dirty="0"/>
-              <a:t>Cloud services don’t have any states </a:t>
-            </a:r>
-            <a:r>
-              <a:rPr lang="en-US" dirty="0">
-                <a:sym typeface="Wingdings" panose="05000000000000000000" pitchFamily="2" charset="2"/>
-              </a:rPr>
-              <a:t></a:t>
-            </a:r>
-          </a:p>
-          <a:p>
-            <a:pPr lvl="2"/>
-            <a:r>
-              <a:rPr lang="en-US" dirty="0">
-                <a:sym typeface="Wingdings" panose="05000000000000000000" pitchFamily="2" charset="2"/>
-              </a:rPr>
-              <a:t>Tokens, JWT tokens are stored in client side</a:t>
-            </a:r>
-          </a:p>
-          <a:p>
-            <a:pPr lvl="3"/>
-            <a:r>
-              <a:rPr lang="en-US" dirty="0">
-                <a:sym typeface="Wingdings" panose="05000000000000000000" pitchFamily="2" charset="2"/>
-              </a:rPr>
-              <a:t>They are validating server side</a:t>
-            </a:r>
-          </a:p>
-          <a:p>
-            <a:pPr lvl="3"/>
-            <a:r>
-              <a:rPr lang="en-US" dirty="0">
-                <a:sym typeface="Wingdings" panose="05000000000000000000" pitchFamily="2" charset="2"/>
-              </a:rPr>
-              <a:t>There isn’t any state, and cloud are welcome us </a:t>
-            </a:r>
-          </a:p>
-          <a:p>
-            <a:pPr lvl="2"/>
+              <a:t>Exercise all </a:t>
+            </a:r>
+            <a:r>
+              <a:rPr lang="en-US"/>
+              <a:t>we speak</a:t>
+            </a:r>
             <a:endParaRPr lang="en-US" dirty="0"/>
           </a:p>
         </p:txBody>
@@ -8052,7 +7801,7 @@
           <p:cNvPr id="4" name="Footer Placeholder 3">
             <a:extLst>
               <a:ext uri="{FF2B5EF4-FFF2-40B4-BE49-F238E27FC236}">
-                <a16:creationId xmlns:a16="http://schemas.microsoft.com/office/drawing/2014/main" id="{EA05D638-DDFA-4F94-97B7-9241B4BF2B42}"/>
+                <a16:creationId xmlns:a16="http://schemas.microsoft.com/office/drawing/2014/main" id="{E3C0E9F9-B143-43AD-BD5C-508C3E46FF7B}"/>
               </a:ext>
             </a:extLst>
           </p:cNvPr>
@@ -8081,7 +7830,7 @@
           <p:cNvPr id="5" name="Slide Number Placeholder 4">
             <a:extLst>
               <a:ext uri="{FF2B5EF4-FFF2-40B4-BE49-F238E27FC236}">
-                <a16:creationId xmlns:a16="http://schemas.microsoft.com/office/drawing/2014/main" id="{73168644-470F-4B44-88FD-5A7440E0CBF6}"/>
+                <a16:creationId xmlns:a16="http://schemas.microsoft.com/office/drawing/2014/main" id="{1B95C015-BA9F-40C7-A04C-3B835E7354AB}"/>
               </a:ext>
             </a:extLst>
           </p:cNvPr>
@@ -8108,1207 +7857,7 @@
     </p:spTree>
     <p:extLst>
       <p:ext uri="{BB962C8B-B14F-4D97-AF65-F5344CB8AC3E}">
-        <p14:creationId xmlns:p14="http://schemas.microsoft.com/office/powerpoint/2010/main" val="514267776"/>
-      </p:ext>
-    </p:extLst>
-  </p:cSld>
-  <p:clrMapOvr>
-    <a:masterClrMapping/>
-  </p:clrMapOvr>
-</p:sld>
-</file>
-
-<file path=ppt/slides/slide14.xml><?xml version="1.0" encoding="utf-8"?>
-<p:sld xmlns:a="http://schemas.openxmlformats.org/drawingml/2006/main" xmlns:r="http://schemas.openxmlformats.org/officeDocument/2006/relationships" xmlns:p="http://schemas.openxmlformats.org/presentationml/2006/main">
-  <p:cSld>
-    <p:spTree>
-      <p:nvGrpSpPr>
-        <p:cNvPr id="1" name=""/>
-        <p:cNvGrpSpPr/>
-        <p:nvPr/>
-      </p:nvGrpSpPr>
-      <p:grpSpPr>
-        <a:xfrm>
-          <a:off x="0" y="0"/>
-          <a:ext cx="0" cy="0"/>
-          <a:chOff x="0" y="0"/>
-          <a:chExt cx="0" cy="0"/>
-        </a:xfrm>
-      </p:grpSpPr>
-      <p:sp>
-        <p:nvSpPr>
-          <p:cNvPr id="2" name="Title 1">
-            <a:extLst>
-              <a:ext uri="{FF2B5EF4-FFF2-40B4-BE49-F238E27FC236}">
-                <a16:creationId xmlns:a16="http://schemas.microsoft.com/office/drawing/2014/main" id="{A984C9FB-F5BB-41C3-895D-22D9C195CDFC}"/>
-              </a:ext>
-            </a:extLst>
-          </p:cNvPr>
-          <p:cNvSpPr>
-            <a:spLocks noGrp="1"/>
-          </p:cNvSpPr>
-          <p:nvPr>
-            <p:ph type="title"/>
-          </p:nvPr>
-        </p:nvSpPr>
-        <p:spPr/>
-        <p:txBody>
-          <a:bodyPr/>
-          <a:lstStyle/>
-          <a:p>
-            <a:r>
-              <a:rPr lang="en-US" dirty="0"/>
-              <a:t>Demo</a:t>
-            </a:r>
-          </a:p>
-        </p:txBody>
-      </p:sp>
-      <p:sp>
-        <p:nvSpPr>
-          <p:cNvPr id="3" name="Content Placeholder 2">
-            <a:extLst>
-              <a:ext uri="{FF2B5EF4-FFF2-40B4-BE49-F238E27FC236}">
-                <a16:creationId xmlns:a16="http://schemas.microsoft.com/office/drawing/2014/main" id="{C9980433-F1BF-4EA6-8D2F-14E0A72FC3A8}"/>
-              </a:ext>
-            </a:extLst>
-          </p:cNvPr>
-          <p:cNvSpPr>
-            <a:spLocks noGrp="1"/>
-          </p:cNvSpPr>
-          <p:nvPr>
-            <p:ph idx="1"/>
-          </p:nvPr>
-        </p:nvSpPr>
-        <p:spPr>
-          <a:xfrm>
-            <a:off x="913795" y="1620982"/>
-            <a:ext cx="10353762" cy="4596938"/>
-          </a:xfrm>
-        </p:spPr>
-        <p:txBody>
-          <a:bodyPr>
-            <a:normAutofit fontScale="92500"/>
-          </a:bodyPr>
-          <a:lstStyle/>
-          <a:p>
-            <a:r>
-              <a:rPr lang="en-US" dirty="0"/>
-              <a:t>Sessions</a:t>
-            </a:r>
-          </a:p>
-          <a:p>
-            <a:pPr lvl="1"/>
-            <a:r>
-              <a:rPr lang="en-US" dirty="0"/>
-              <a:t>With session, we just store the key of storage client side (in cookies), but the real user information are stored back server side (</a:t>
-            </a:r>
-            <a:r>
-              <a:rPr lang="en-US" dirty="0" err="1"/>
-              <a:t>redis</a:t>
-            </a:r>
-            <a:r>
-              <a:rPr lang="en-US" dirty="0"/>
-              <a:t>, </a:t>
-            </a:r>
-            <a:r>
-              <a:rPr lang="en-US" dirty="0" err="1"/>
-              <a:t>db</a:t>
-            </a:r>
-            <a:r>
-              <a:rPr lang="en-US" dirty="0"/>
-              <a:t>, in-memory, …)</a:t>
-            </a:r>
-            <a:endParaRPr lang="fa-IR" dirty="0"/>
-          </a:p>
-          <a:p>
-            <a:pPr lvl="1"/>
-            <a:r>
-              <a:rPr lang="en-US" dirty="0" err="1"/>
-              <a:t>npm</a:t>
-            </a:r>
-            <a:r>
-              <a:rPr lang="en-US" dirty="0"/>
-              <a:t> install express-session</a:t>
-            </a:r>
-          </a:p>
-          <a:p>
-            <a:pPr lvl="1"/>
-            <a:r>
-              <a:rPr lang="en-US" dirty="0"/>
-              <a:t>Create a simple guard for our purpose, return </a:t>
-            </a:r>
-            <a:r>
-              <a:rPr lang="en-US" dirty="0" err="1"/>
-              <a:t>request.isAuthenticated</a:t>
-            </a:r>
-            <a:r>
-              <a:rPr lang="en-US" dirty="0"/>
-              <a:t>()</a:t>
-            </a:r>
-          </a:p>
-          <a:p>
-            <a:pPr lvl="1"/>
-            <a:r>
-              <a:rPr lang="en-US" dirty="0"/>
-              <a:t>main.ts</a:t>
-            </a:r>
-          </a:p>
-          <a:p>
-            <a:pPr lvl="2"/>
-            <a:r>
-              <a:rPr lang="en-US" dirty="0" err="1"/>
-              <a:t>app.use</a:t>
-            </a:r>
-            <a:r>
-              <a:rPr lang="en-US" dirty="0"/>
-              <a:t>(session({</a:t>
-            </a:r>
-            <a:endParaRPr lang="fa-IR" dirty="0"/>
-          </a:p>
-          <a:p>
-            <a:pPr lvl="3"/>
-            <a:r>
-              <a:rPr lang="en-US" dirty="0"/>
-              <a:t>secret, resave, </a:t>
-            </a:r>
-            <a:r>
-              <a:rPr lang="en-US" dirty="0" err="1"/>
-              <a:t>saveUninitialized</a:t>
-            </a:r>
-            <a:r>
-              <a:rPr lang="en-US" dirty="0"/>
-              <a:t>, cookie :{}</a:t>
-            </a:r>
-            <a:endParaRPr lang="fa-IR" dirty="0"/>
-          </a:p>
-          <a:p>
-            <a:pPr lvl="2"/>
-            <a:r>
-              <a:rPr lang="en-US" dirty="0"/>
-              <a:t>}));</a:t>
-            </a:r>
-          </a:p>
-          <a:p>
-            <a:pPr lvl="2"/>
-            <a:r>
-              <a:rPr lang="en-US" dirty="0" err="1"/>
-              <a:t>app.use</a:t>
-            </a:r>
-            <a:r>
-              <a:rPr lang="en-US" dirty="0"/>
-              <a:t>(</a:t>
-            </a:r>
-            <a:r>
-              <a:rPr lang="en-US" dirty="0" err="1"/>
-              <a:t>passport.initialize</a:t>
-            </a:r>
-            <a:r>
-              <a:rPr lang="en-US" dirty="0"/>
-              <a:t>());</a:t>
-            </a:r>
-          </a:p>
-          <a:p>
-            <a:pPr lvl="2"/>
-            <a:r>
-              <a:rPr lang="en-US" dirty="0" err="1"/>
-              <a:t>app.use</a:t>
-            </a:r>
-            <a:r>
-              <a:rPr lang="en-US" dirty="0"/>
-              <a:t>(</a:t>
-            </a:r>
-            <a:r>
-              <a:rPr lang="en-US" dirty="0" err="1"/>
-              <a:t>passport.session</a:t>
-            </a:r>
-            <a:r>
-              <a:rPr lang="en-US" dirty="0"/>
-              <a:t>());</a:t>
-            </a:r>
-            <a:endParaRPr lang="fa-IR" dirty="0"/>
-          </a:p>
-          <a:p>
-            <a:pPr lvl="1"/>
-            <a:endParaRPr lang="en-US" dirty="0"/>
-          </a:p>
-        </p:txBody>
-      </p:sp>
-      <p:sp>
-        <p:nvSpPr>
-          <p:cNvPr id="4" name="Footer Placeholder 3">
-            <a:extLst>
-              <a:ext uri="{FF2B5EF4-FFF2-40B4-BE49-F238E27FC236}">
-                <a16:creationId xmlns:a16="http://schemas.microsoft.com/office/drawing/2014/main" id="{D1432776-DCB9-4528-BF27-D4A37FFDBDC6}"/>
-              </a:ext>
-            </a:extLst>
-          </p:cNvPr>
-          <p:cNvSpPr>
-            <a:spLocks noGrp="1"/>
-          </p:cNvSpPr>
-          <p:nvPr>
-            <p:ph type="ftr" sz="quarter" idx="11"/>
-          </p:nvPr>
-        </p:nvSpPr>
-        <p:spPr/>
-        <p:txBody>
-          <a:bodyPr/>
-          <a:lstStyle/>
-          <a:p>
-            <a:r>
-              <a:rPr lang="en-US"/>
-              <a:t>Nodejs Basics</a:t>
-            </a:r>
-            <a:endParaRPr lang="en-US" dirty="0"/>
-          </a:p>
-        </p:txBody>
-      </p:sp>
-      <p:sp>
-        <p:nvSpPr>
-          <p:cNvPr id="5" name="Slide Number Placeholder 4">
-            <a:extLst>
-              <a:ext uri="{FF2B5EF4-FFF2-40B4-BE49-F238E27FC236}">
-                <a16:creationId xmlns:a16="http://schemas.microsoft.com/office/drawing/2014/main" id="{C2030382-B752-489C-816F-5A73F387B4F8}"/>
-              </a:ext>
-            </a:extLst>
-          </p:cNvPr>
-          <p:cNvSpPr>
-            <a:spLocks noGrp="1"/>
-          </p:cNvSpPr>
-          <p:nvPr>
-            <p:ph type="sldNum" sz="quarter" idx="12"/>
-          </p:nvPr>
-        </p:nvSpPr>
-        <p:spPr/>
-        <p:txBody>
-          <a:bodyPr/>
-          <a:lstStyle/>
-          <a:p>
-            <a:fld id="{3A98EE3D-8CD1-4C3F-BD1C-C98C9596463C}" type="slidenum">
-              <a:rPr lang="en-US" smtClean="0"/>
-              <a:t>14</a:t>
-            </a:fld>
-            <a:endParaRPr lang="en-US" dirty="0"/>
-          </a:p>
-        </p:txBody>
-      </p:sp>
-    </p:spTree>
-    <p:extLst>
-      <p:ext uri="{BB962C8B-B14F-4D97-AF65-F5344CB8AC3E}">
-        <p14:creationId xmlns:p14="http://schemas.microsoft.com/office/powerpoint/2010/main" val="4254438249"/>
-      </p:ext>
-    </p:extLst>
-  </p:cSld>
-  <p:clrMapOvr>
-    <a:masterClrMapping/>
-  </p:clrMapOvr>
-</p:sld>
-</file>
-
-<file path=ppt/slides/slide15.xml><?xml version="1.0" encoding="utf-8"?>
-<p:sld xmlns:a="http://schemas.openxmlformats.org/drawingml/2006/main" xmlns:r="http://schemas.openxmlformats.org/officeDocument/2006/relationships" xmlns:p="http://schemas.openxmlformats.org/presentationml/2006/main">
-  <p:cSld>
-    <p:spTree>
-      <p:nvGrpSpPr>
-        <p:cNvPr id="1" name=""/>
-        <p:cNvGrpSpPr/>
-        <p:nvPr/>
-      </p:nvGrpSpPr>
-      <p:grpSpPr>
-        <a:xfrm>
-          <a:off x="0" y="0"/>
-          <a:ext cx="0" cy="0"/>
-          <a:chOff x="0" y="0"/>
-          <a:chExt cx="0" cy="0"/>
-        </a:xfrm>
-      </p:grpSpPr>
-      <p:sp>
-        <p:nvSpPr>
-          <p:cNvPr id="2" name="Title 1">
-            <a:extLst>
-              <a:ext uri="{FF2B5EF4-FFF2-40B4-BE49-F238E27FC236}">
-                <a16:creationId xmlns:a16="http://schemas.microsoft.com/office/drawing/2014/main" id="{E38EAF18-1F68-488C-B7FB-3A29FE8EB282}"/>
-              </a:ext>
-            </a:extLst>
-          </p:cNvPr>
-          <p:cNvSpPr>
-            <a:spLocks noGrp="1"/>
-          </p:cNvSpPr>
-          <p:nvPr>
-            <p:ph type="title"/>
-          </p:nvPr>
-        </p:nvSpPr>
-        <p:spPr/>
-        <p:txBody>
-          <a:bodyPr/>
-          <a:lstStyle/>
-          <a:p>
-            <a:r>
-              <a:rPr lang="en-US" dirty="0"/>
-              <a:t>Demo</a:t>
-            </a:r>
-          </a:p>
-        </p:txBody>
-      </p:sp>
-      <p:sp>
-        <p:nvSpPr>
-          <p:cNvPr id="3" name="Content Placeholder 2">
-            <a:extLst>
-              <a:ext uri="{FF2B5EF4-FFF2-40B4-BE49-F238E27FC236}">
-                <a16:creationId xmlns:a16="http://schemas.microsoft.com/office/drawing/2014/main" id="{DE51941B-6543-40E4-8DAE-8AF22DDFE054}"/>
-              </a:ext>
-            </a:extLst>
-          </p:cNvPr>
-          <p:cNvSpPr>
-            <a:spLocks noGrp="1"/>
-          </p:cNvSpPr>
-          <p:nvPr>
-            <p:ph idx="1"/>
-          </p:nvPr>
-        </p:nvSpPr>
-        <p:spPr/>
-        <p:txBody>
-          <a:bodyPr/>
-          <a:lstStyle/>
-          <a:p>
-            <a:r>
-              <a:rPr lang="en-US" dirty="0"/>
-              <a:t>Sessions</a:t>
-            </a:r>
-          </a:p>
-          <a:p>
-            <a:pPr lvl="1"/>
-            <a:r>
-              <a:rPr lang="en-US" dirty="0"/>
-              <a:t>Create a session serializer</a:t>
-            </a:r>
-          </a:p>
-          <a:p>
-            <a:pPr lvl="1"/>
-            <a:r>
-              <a:rPr lang="en-US" dirty="0"/>
-              <a:t>Extends </a:t>
-            </a:r>
-            <a:r>
-              <a:rPr lang="en-US" dirty="0" err="1"/>
-              <a:t>PassportSerializer</a:t>
-            </a:r>
-            <a:endParaRPr lang="en-US" dirty="0"/>
-          </a:p>
-          <a:p>
-            <a:pPr lvl="2"/>
-            <a:r>
-              <a:rPr lang="en-US" dirty="0" err="1"/>
-              <a:t>serializeUser</a:t>
-            </a:r>
-            <a:r>
-              <a:rPr lang="en-US" dirty="0"/>
-              <a:t>()</a:t>
-            </a:r>
-          </a:p>
-          <a:p>
-            <a:pPr lvl="2"/>
-            <a:r>
-              <a:rPr lang="en-US" dirty="0" err="1"/>
-              <a:t>deserializeUser</a:t>
-            </a:r>
-            <a:r>
-              <a:rPr lang="en-US" dirty="0"/>
-              <a:t>()</a:t>
-            </a:r>
-          </a:p>
-          <a:p>
-            <a:pPr lvl="2"/>
-            <a:r>
-              <a:rPr lang="en-US" dirty="0"/>
-              <a:t>Implementation of this two method is up to you</a:t>
-            </a:r>
-          </a:p>
-          <a:p>
-            <a:pPr lvl="1"/>
-            <a:r>
-              <a:rPr lang="en-US" dirty="0"/>
-              <a:t>Provide the serializer</a:t>
-            </a:r>
-          </a:p>
-          <a:p>
-            <a:pPr lvl="1"/>
-            <a:r>
-              <a:rPr lang="en-US" dirty="0" err="1"/>
-              <a:t>PassportModule.register</a:t>
-            </a:r>
-            <a:r>
-              <a:rPr lang="en-US" dirty="0"/>
-              <a:t>({ session: true })</a:t>
-            </a:r>
-          </a:p>
-          <a:p>
-            <a:pPr lvl="1"/>
-            <a:r>
-              <a:rPr lang="en-US" dirty="0"/>
-              <a:t>In </a:t>
-            </a:r>
-            <a:r>
-              <a:rPr lang="en-US" dirty="0" err="1"/>
-              <a:t>LocalAuthGuard</a:t>
-            </a:r>
-            <a:r>
-              <a:rPr lang="en-US" dirty="0"/>
-              <a:t> add some custom </a:t>
-            </a:r>
-            <a:r>
-              <a:rPr lang="en-US" dirty="0" err="1"/>
-              <a:t>canActivate</a:t>
-            </a:r>
-            <a:r>
-              <a:rPr lang="en-US" dirty="0"/>
-              <a:t> function that </a:t>
-            </a:r>
-          </a:p>
-          <a:p>
-            <a:pPr lvl="1"/>
-            <a:r>
-              <a:rPr lang="en-US" dirty="0" err="1"/>
-              <a:t>Super.canActivate</a:t>
-            </a:r>
-            <a:r>
-              <a:rPr lang="en-US" dirty="0"/>
-              <a:t>, </a:t>
-            </a:r>
-            <a:r>
-              <a:rPr lang="en-US" dirty="0" err="1"/>
-              <a:t>super.login</a:t>
-            </a:r>
-            <a:r>
-              <a:rPr lang="en-US" dirty="0"/>
-              <a:t>()</a:t>
-            </a:r>
-          </a:p>
-        </p:txBody>
-      </p:sp>
-      <p:sp>
-        <p:nvSpPr>
-          <p:cNvPr id="4" name="Footer Placeholder 3">
-            <a:extLst>
-              <a:ext uri="{FF2B5EF4-FFF2-40B4-BE49-F238E27FC236}">
-                <a16:creationId xmlns:a16="http://schemas.microsoft.com/office/drawing/2014/main" id="{4417B8A5-F655-44C4-A83A-7A45E14569C0}"/>
-              </a:ext>
-            </a:extLst>
-          </p:cNvPr>
-          <p:cNvSpPr>
-            <a:spLocks noGrp="1"/>
-          </p:cNvSpPr>
-          <p:nvPr>
-            <p:ph type="ftr" sz="quarter" idx="11"/>
-          </p:nvPr>
-        </p:nvSpPr>
-        <p:spPr/>
-        <p:txBody>
-          <a:bodyPr/>
-          <a:lstStyle/>
-          <a:p>
-            <a:r>
-              <a:rPr lang="en-US"/>
-              <a:t>Nodejs Basics</a:t>
-            </a:r>
-            <a:endParaRPr lang="en-US" dirty="0"/>
-          </a:p>
-        </p:txBody>
-      </p:sp>
-      <p:sp>
-        <p:nvSpPr>
-          <p:cNvPr id="5" name="Slide Number Placeholder 4">
-            <a:extLst>
-              <a:ext uri="{FF2B5EF4-FFF2-40B4-BE49-F238E27FC236}">
-                <a16:creationId xmlns:a16="http://schemas.microsoft.com/office/drawing/2014/main" id="{C91512F3-C3B7-4FC9-8C3D-0A87E9F3556C}"/>
-              </a:ext>
-            </a:extLst>
-          </p:cNvPr>
-          <p:cNvSpPr>
-            <a:spLocks noGrp="1"/>
-          </p:cNvSpPr>
-          <p:nvPr>
-            <p:ph type="sldNum" sz="quarter" idx="12"/>
-          </p:nvPr>
-        </p:nvSpPr>
-        <p:spPr/>
-        <p:txBody>
-          <a:bodyPr/>
-          <a:lstStyle/>
-          <a:p>
-            <a:fld id="{3A98EE3D-8CD1-4C3F-BD1C-C98C9596463C}" type="slidenum">
-              <a:rPr lang="en-US" smtClean="0"/>
-              <a:t>15</a:t>
-            </a:fld>
-            <a:endParaRPr lang="en-US" dirty="0"/>
-          </a:p>
-        </p:txBody>
-      </p:sp>
-    </p:spTree>
-    <p:extLst>
-      <p:ext uri="{BB962C8B-B14F-4D97-AF65-F5344CB8AC3E}">
-        <p14:creationId xmlns:p14="http://schemas.microsoft.com/office/powerpoint/2010/main" val="1344406732"/>
-      </p:ext>
-    </p:extLst>
-  </p:cSld>
-  <p:clrMapOvr>
-    <a:masterClrMapping/>
-  </p:clrMapOvr>
-</p:sld>
-</file>
-
-<file path=ppt/slides/slide16.xml><?xml version="1.0" encoding="utf-8"?>
-<p:sld xmlns:a="http://schemas.openxmlformats.org/drawingml/2006/main" xmlns:r="http://schemas.openxmlformats.org/officeDocument/2006/relationships" xmlns:p="http://schemas.openxmlformats.org/presentationml/2006/main">
-  <p:cSld>
-    <p:spTree>
-      <p:nvGrpSpPr>
-        <p:cNvPr id="1" name=""/>
-        <p:cNvGrpSpPr/>
-        <p:nvPr/>
-      </p:nvGrpSpPr>
-      <p:grpSpPr>
-        <a:xfrm>
-          <a:off x="0" y="0"/>
-          <a:ext cx="0" cy="0"/>
-          <a:chOff x="0" y="0"/>
-          <a:chExt cx="0" cy="0"/>
-        </a:xfrm>
-      </p:grpSpPr>
-      <p:sp>
-        <p:nvSpPr>
-          <p:cNvPr id="2" name="Title 1">
-            <a:extLst>
-              <a:ext uri="{FF2B5EF4-FFF2-40B4-BE49-F238E27FC236}">
-                <a16:creationId xmlns:a16="http://schemas.microsoft.com/office/drawing/2014/main" id="{72147EBF-7BF7-4D92-ADCD-F23AD2EDC977}"/>
-              </a:ext>
-            </a:extLst>
-          </p:cNvPr>
-          <p:cNvSpPr>
-            <a:spLocks noGrp="1"/>
-          </p:cNvSpPr>
-          <p:nvPr>
-            <p:ph type="title"/>
-          </p:nvPr>
-        </p:nvSpPr>
-        <p:spPr/>
-        <p:txBody>
-          <a:bodyPr/>
-          <a:lstStyle/>
-          <a:p>
-            <a:r>
-              <a:rPr lang="en-US" dirty="0"/>
-              <a:t>serializer</a:t>
-            </a:r>
-          </a:p>
-        </p:txBody>
-      </p:sp>
-      <p:sp>
-        <p:nvSpPr>
-          <p:cNvPr id="4" name="Footer Placeholder 3">
-            <a:extLst>
-              <a:ext uri="{FF2B5EF4-FFF2-40B4-BE49-F238E27FC236}">
-                <a16:creationId xmlns:a16="http://schemas.microsoft.com/office/drawing/2014/main" id="{47B350E6-DB24-48B1-AC10-2582BFCB81DF}"/>
-              </a:ext>
-            </a:extLst>
-          </p:cNvPr>
-          <p:cNvSpPr>
-            <a:spLocks noGrp="1"/>
-          </p:cNvSpPr>
-          <p:nvPr>
-            <p:ph type="ftr" sz="quarter" idx="11"/>
-          </p:nvPr>
-        </p:nvSpPr>
-        <p:spPr/>
-        <p:txBody>
-          <a:bodyPr/>
-          <a:lstStyle/>
-          <a:p>
-            <a:r>
-              <a:rPr lang="en-US"/>
-              <a:t>Nodejs Basics</a:t>
-            </a:r>
-            <a:endParaRPr lang="en-US" dirty="0"/>
-          </a:p>
-        </p:txBody>
-      </p:sp>
-      <p:sp>
-        <p:nvSpPr>
-          <p:cNvPr id="5" name="Slide Number Placeholder 4">
-            <a:extLst>
-              <a:ext uri="{FF2B5EF4-FFF2-40B4-BE49-F238E27FC236}">
-                <a16:creationId xmlns:a16="http://schemas.microsoft.com/office/drawing/2014/main" id="{5478CB29-6F02-45FD-A001-E3763BA64874}"/>
-              </a:ext>
-            </a:extLst>
-          </p:cNvPr>
-          <p:cNvSpPr>
-            <a:spLocks noGrp="1"/>
-          </p:cNvSpPr>
-          <p:nvPr>
-            <p:ph type="sldNum" sz="quarter" idx="12"/>
-          </p:nvPr>
-        </p:nvSpPr>
-        <p:spPr/>
-        <p:txBody>
-          <a:bodyPr/>
-          <a:lstStyle/>
-          <a:p>
-            <a:fld id="{3A98EE3D-8CD1-4C3F-BD1C-C98C9596463C}" type="slidenum">
-              <a:rPr lang="en-US" smtClean="0"/>
-              <a:t>16</a:t>
-            </a:fld>
-            <a:endParaRPr lang="en-US" dirty="0"/>
-          </a:p>
-        </p:txBody>
-      </p:sp>
-      <p:pic>
-        <p:nvPicPr>
-          <p:cNvPr id="6" name="Content Placeholder 5">
-            <a:extLst>
-              <a:ext uri="{FF2B5EF4-FFF2-40B4-BE49-F238E27FC236}">
-                <a16:creationId xmlns:a16="http://schemas.microsoft.com/office/drawing/2014/main" id="{21E545B4-A94A-4514-8790-1784CD2C1DE4}"/>
-              </a:ext>
-            </a:extLst>
-          </p:cNvPr>
-          <p:cNvPicPr>
-            <a:picLocks noGrp="1" noChangeAspect="1"/>
-          </p:cNvPicPr>
-          <p:nvPr>
-            <p:ph idx="1"/>
-          </p:nvPr>
-        </p:nvPicPr>
-        <p:blipFill>
-          <a:blip r:embed="rId2"/>
-          <a:stretch>
-            <a:fillRect/>
-          </a:stretch>
-        </p:blipFill>
-        <p:spPr>
-          <a:xfrm>
-            <a:off x="735725" y="1763821"/>
-            <a:ext cx="10711026" cy="4311434"/>
-          </a:xfrm>
-          <a:prstGeom prst="rect">
-            <a:avLst/>
-          </a:prstGeom>
-        </p:spPr>
-      </p:pic>
-    </p:spTree>
-    <p:extLst>
-      <p:ext uri="{BB962C8B-B14F-4D97-AF65-F5344CB8AC3E}">
-        <p14:creationId xmlns:p14="http://schemas.microsoft.com/office/powerpoint/2010/main" val="2325859491"/>
-      </p:ext>
-    </p:extLst>
-  </p:cSld>
-  <p:clrMapOvr>
-    <a:masterClrMapping/>
-  </p:clrMapOvr>
-</p:sld>
-</file>
-
-<file path=ppt/slides/slide17.xml><?xml version="1.0" encoding="utf-8"?>
-<p:sld xmlns:a="http://schemas.openxmlformats.org/drawingml/2006/main" xmlns:r="http://schemas.openxmlformats.org/officeDocument/2006/relationships" xmlns:p="http://schemas.openxmlformats.org/presentationml/2006/main">
-  <p:cSld>
-    <p:spTree>
-      <p:nvGrpSpPr>
-        <p:cNvPr id="1" name=""/>
-        <p:cNvGrpSpPr/>
-        <p:nvPr/>
-      </p:nvGrpSpPr>
-      <p:grpSpPr>
-        <a:xfrm>
-          <a:off x="0" y="0"/>
-          <a:ext cx="0" cy="0"/>
-          <a:chOff x="0" y="0"/>
-          <a:chExt cx="0" cy="0"/>
-        </a:xfrm>
-      </p:grpSpPr>
-      <p:sp>
-        <p:nvSpPr>
-          <p:cNvPr id="2" name="Title 1">
-            <a:extLst>
-              <a:ext uri="{FF2B5EF4-FFF2-40B4-BE49-F238E27FC236}">
-                <a16:creationId xmlns:a16="http://schemas.microsoft.com/office/drawing/2014/main" id="{59B50895-3E15-4A00-A86B-6581FA5F1239}"/>
-              </a:ext>
-            </a:extLst>
-          </p:cNvPr>
-          <p:cNvSpPr>
-            <a:spLocks noGrp="1"/>
-          </p:cNvSpPr>
-          <p:nvPr>
-            <p:ph type="title"/>
-          </p:nvPr>
-        </p:nvSpPr>
-        <p:spPr/>
-        <p:txBody>
-          <a:bodyPr/>
-          <a:lstStyle/>
-          <a:p>
-            <a:r>
-              <a:rPr lang="en-US" dirty="0"/>
-              <a:t>Change in </a:t>
-            </a:r>
-            <a:r>
-              <a:rPr lang="en-US" dirty="0" err="1"/>
-              <a:t>LocalAuthGuard</a:t>
-            </a:r>
-            <a:endParaRPr lang="en-US" dirty="0"/>
-          </a:p>
-        </p:txBody>
-      </p:sp>
-      <p:pic>
-        <p:nvPicPr>
-          <p:cNvPr id="7" name="Content Placeholder 6">
-            <a:extLst>
-              <a:ext uri="{FF2B5EF4-FFF2-40B4-BE49-F238E27FC236}">
-                <a16:creationId xmlns:a16="http://schemas.microsoft.com/office/drawing/2014/main" id="{868173FC-D5D3-4082-8C92-F7CB4F9B2AD0}"/>
-              </a:ext>
-            </a:extLst>
-          </p:cNvPr>
-          <p:cNvPicPr>
-            <a:picLocks noGrp="1" noChangeAspect="1"/>
-          </p:cNvPicPr>
-          <p:nvPr>
-            <p:ph idx="1"/>
-          </p:nvPr>
-        </p:nvPicPr>
-        <p:blipFill>
-          <a:blip r:embed="rId2"/>
-          <a:stretch>
-            <a:fillRect/>
-          </a:stretch>
-        </p:blipFill>
-        <p:spPr>
-          <a:xfrm>
-            <a:off x="1439918" y="1659982"/>
-            <a:ext cx="9302640" cy="4519112"/>
-          </a:xfrm>
-        </p:spPr>
-      </p:pic>
-      <p:sp>
-        <p:nvSpPr>
-          <p:cNvPr id="4" name="Footer Placeholder 3">
-            <a:extLst>
-              <a:ext uri="{FF2B5EF4-FFF2-40B4-BE49-F238E27FC236}">
-                <a16:creationId xmlns:a16="http://schemas.microsoft.com/office/drawing/2014/main" id="{58849F05-C43C-4463-A9B1-5999C9969C96}"/>
-              </a:ext>
-            </a:extLst>
-          </p:cNvPr>
-          <p:cNvSpPr>
-            <a:spLocks noGrp="1"/>
-          </p:cNvSpPr>
-          <p:nvPr>
-            <p:ph type="ftr" sz="quarter" idx="11"/>
-          </p:nvPr>
-        </p:nvSpPr>
-        <p:spPr/>
-        <p:txBody>
-          <a:bodyPr/>
-          <a:lstStyle/>
-          <a:p>
-            <a:r>
-              <a:rPr lang="en-US"/>
-              <a:t>Nodejs Basics</a:t>
-            </a:r>
-            <a:endParaRPr lang="en-US" dirty="0"/>
-          </a:p>
-        </p:txBody>
-      </p:sp>
-      <p:sp>
-        <p:nvSpPr>
-          <p:cNvPr id="5" name="Slide Number Placeholder 4">
-            <a:extLst>
-              <a:ext uri="{FF2B5EF4-FFF2-40B4-BE49-F238E27FC236}">
-                <a16:creationId xmlns:a16="http://schemas.microsoft.com/office/drawing/2014/main" id="{4027AB59-B512-4C65-8B22-81A0B7163B98}"/>
-              </a:ext>
-            </a:extLst>
-          </p:cNvPr>
-          <p:cNvSpPr>
-            <a:spLocks noGrp="1"/>
-          </p:cNvSpPr>
-          <p:nvPr>
-            <p:ph type="sldNum" sz="quarter" idx="12"/>
-          </p:nvPr>
-        </p:nvSpPr>
-        <p:spPr/>
-        <p:txBody>
-          <a:bodyPr/>
-          <a:lstStyle/>
-          <a:p>
-            <a:fld id="{3A98EE3D-8CD1-4C3F-BD1C-C98C9596463C}" type="slidenum">
-              <a:rPr lang="en-US" smtClean="0"/>
-              <a:t>17</a:t>
-            </a:fld>
-            <a:endParaRPr lang="en-US" dirty="0"/>
-          </a:p>
-        </p:txBody>
-      </p:sp>
-    </p:spTree>
-    <p:extLst>
-      <p:ext uri="{BB962C8B-B14F-4D97-AF65-F5344CB8AC3E}">
-        <p14:creationId xmlns:p14="http://schemas.microsoft.com/office/powerpoint/2010/main" val="1098065566"/>
-      </p:ext>
-    </p:extLst>
-  </p:cSld>
-  <p:clrMapOvr>
-    <a:masterClrMapping/>
-  </p:clrMapOvr>
-</p:sld>
-</file>
-
-<file path=ppt/slides/slide18.xml><?xml version="1.0" encoding="utf-8"?>
-<p:sld xmlns:a="http://schemas.openxmlformats.org/drawingml/2006/main" xmlns:r="http://schemas.openxmlformats.org/officeDocument/2006/relationships" xmlns:p="http://schemas.openxmlformats.org/presentationml/2006/main">
-  <p:cSld>
-    <p:spTree>
-      <p:nvGrpSpPr>
-        <p:cNvPr id="1" name=""/>
-        <p:cNvGrpSpPr/>
-        <p:nvPr/>
-      </p:nvGrpSpPr>
-      <p:grpSpPr>
-        <a:xfrm>
-          <a:off x="0" y="0"/>
-          <a:ext cx="0" cy="0"/>
-          <a:chOff x="0" y="0"/>
-          <a:chExt cx="0" cy="0"/>
-        </a:xfrm>
-      </p:grpSpPr>
-      <p:sp>
-        <p:nvSpPr>
-          <p:cNvPr id="2" name="Title 1">
-            <a:extLst>
-              <a:ext uri="{FF2B5EF4-FFF2-40B4-BE49-F238E27FC236}">
-                <a16:creationId xmlns:a16="http://schemas.microsoft.com/office/drawing/2014/main" id="{C6FD76E2-F920-4ABB-90AA-4064377CB672}"/>
-              </a:ext>
-            </a:extLst>
-          </p:cNvPr>
-          <p:cNvSpPr>
-            <a:spLocks noGrp="1"/>
-          </p:cNvSpPr>
-          <p:nvPr>
-            <p:ph type="title"/>
-          </p:nvPr>
-        </p:nvSpPr>
-        <p:spPr/>
-        <p:txBody>
-          <a:bodyPr/>
-          <a:lstStyle/>
-          <a:p>
-            <a:r>
-              <a:rPr lang="en-US" dirty="0" err="1"/>
-              <a:t>SessionAuthenticatedGuard</a:t>
-            </a:r>
-            <a:endParaRPr lang="en-US" dirty="0"/>
-          </a:p>
-        </p:txBody>
-      </p:sp>
-      <p:pic>
-        <p:nvPicPr>
-          <p:cNvPr id="7" name="Content Placeholder 6">
-            <a:extLst>
-              <a:ext uri="{FF2B5EF4-FFF2-40B4-BE49-F238E27FC236}">
-                <a16:creationId xmlns:a16="http://schemas.microsoft.com/office/drawing/2014/main" id="{4F804EDA-7DCB-4A70-82A6-5D51733C23F2}"/>
-              </a:ext>
-            </a:extLst>
-          </p:cNvPr>
-          <p:cNvPicPr>
-            <a:picLocks noGrp="1" noChangeAspect="1"/>
-          </p:cNvPicPr>
-          <p:nvPr>
-            <p:ph idx="1"/>
-          </p:nvPr>
-        </p:nvPicPr>
-        <p:blipFill>
-          <a:blip r:embed="rId2"/>
-          <a:stretch>
-            <a:fillRect/>
-          </a:stretch>
-        </p:blipFill>
-        <p:spPr>
-          <a:xfrm>
-            <a:off x="295415" y="1942772"/>
-            <a:ext cx="11591644" cy="3953532"/>
-          </a:xfrm>
-        </p:spPr>
-      </p:pic>
-      <p:sp>
-        <p:nvSpPr>
-          <p:cNvPr id="4" name="Footer Placeholder 3">
-            <a:extLst>
-              <a:ext uri="{FF2B5EF4-FFF2-40B4-BE49-F238E27FC236}">
-                <a16:creationId xmlns:a16="http://schemas.microsoft.com/office/drawing/2014/main" id="{A749C94A-6387-4D87-8CDD-7756044D1DFD}"/>
-              </a:ext>
-            </a:extLst>
-          </p:cNvPr>
-          <p:cNvSpPr>
-            <a:spLocks noGrp="1"/>
-          </p:cNvSpPr>
-          <p:nvPr>
-            <p:ph type="ftr" sz="quarter" idx="11"/>
-          </p:nvPr>
-        </p:nvSpPr>
-        <p:spPr/>
-        <p:txBody>
-          <a:bodyPr/>
-          <a:lstStyle/>
-          <a:p>
-            <a:r>
-              <a:rPr lang="en-US"/>
-              <a:t>Nodejs Basics</a:t>
-            </a:r>
-            <a:endParaRPr lang="en-US" dirty="0"/>
-          </a:p>
-        </p:txBody>
-      </p:sp>
-      <p:sp>
-        <p:nvSpPr>
-          <p:cNvPr id="5" name="Slide Number Placeholder 4">
-            <a:extLst>
-              <a:ext uri="{FF2B5EF4-FFF2-40B4-BE49-F238E27FC236}">
-                <a16:creationId xmlns:a16="http://schemas.microsoft.com/office/drawing/2014/main" id="{6D143B41-02D4-4B2A-8D1C-DE27CA1C800A}"/>
-              </a:ext>
-            </a:extLst>
-          </p:cNvPr>
-          <p:cNvSpPr>
-            <a:spLocks noGrp="1"/>
-          </p:cNvSpPr>
-          <p:nvPr>
-            <p:ph type="sldNum" sz="quarter" idx="12"/>
-          </p:nvPr>
-        </p:nvSpPr>
-        <p:spPr/>
-        <p:txBody>
-          <a:bodyPr/>
-          <a:lstStyle/>
-          <a:p>
-            <a:fld id="{3A98EE3D-8CD1-4C3F-BD1C-C98C9596463C}" type="slidenum">
-              <a:rPr lang="en-US" smtClean="0"/>
-              <a:t>18</a:t>
-            </a:fld>
-            <a:endParaRPr lang="en-US" dirty="0"/>
-          </a:p>
-        </p:txBody>
-      </p:sp>
-    </p:spTree>
-    <p:extLst>
-      <p:ext uri="{BB962C8B-B14F-4D97-AF65-F5344CB8AC3E}">
-        <p14:creationId xmlns:p14="http://schemas.microsoft.com/office/powerpoint/2010/main" val="3609177395"/>
-      </p:ext>
-    </p:extLst>
-  </p:cSld>
-  <p:clrMapOvr>
-    <a:masterClrMapping/>
-  </p:clrMapOvr>
-</p:sld>
-</file>
-
-<file path=ppt/slides/slide19.xml><?xml version="1.0" encoding="utf-8"?>
-<p:sld xmlns:a="http://schemas.openxmlformats.org/drawingml/2006/main" xmlns:r="http://schemas.openxmlformats.org/officeDocument/2006/relationships" xmlns:p="http://schemas.openxmlformats.org/presentationml/2006/main">
-  <p:cSld>
-    <p:spTree>
-      <p:nvGrpSpPr>
-        <p:cNvPr id="1" name=""/>
-        <p:cNvGrpSpPr/>
-        <p:nvPr/>
-      </p:nvGrpSpPr>
-      <p:grpSpPr>
-        <a:xfrm>
-          <a:off x="0" y="0"/>
-          <a:ext cx="0" cy="0"/>
-          <a:chOff x="0" y="0"/>
-          <a:chExt cx="0" cy="0"/>
-        </a:xfrm>
-      </p:grpSpPr>
-      <p:sp>
-        <p:nvSpPr>
-          <p:cNvPr id="2" name="Title 1">
-            <a:extLst>
-              <a:ext uri="{FF2B5EF4-FFF2-40B4-BE49-F238E27FC236}">
-                <a16:creationId xmlns:a16="http://schemas.microsoft.com/office/drawing/2014/main" id="{A1F22EEF-11EF-4AB9-B4B3-D4063CFADBF0}"/>
-              </a:ext>
-            </a:extLst>
-          </p:cNvPr>
-          <p:cNvSpPr>
-            <a:spLocks noGrp="1"/>
-          </p:cNvSpPr>
-          <p:nvPr>
-            <p:ph type="title"/>
-          </p:nvPr>
-        </p:nvSpPr>
-        <p:spPr/>
-        <p:txBody>
-          <a:bodyPr/>
-          <a:lstStyle/>
-          <a:p>
-            <a:r>
-              <a:rPr lang="en-US" dirty="0"/>
-              <a:t>Demo</a:t>
-            </a:r>
-          </a:p>
-        </p:txBody>
-      </p:sp>
-      <p:sp>
-        <p:nvSpPr>
-          <p:cNvPr id="3" name="Content Placeholder 2">
-            <a:extLst>
-              <a:ext uri="{FF2B5EF4-FFF2-40B4-BE49-F238E27FC236}">
-                <a16:creationId xmlns:a16="http://schemas.microsoft.com/office/drawing/2014/main" id="{2EBE3083-1E1D-4FBE-8E8A-1B032CAD20B3}"/>
-              </a:ext>
-            </a:extLst>
-          </p:cNvPr>
-          <p:cNvSpPr>
-            <a:spLocks noGrp="1"/>
-          </p:cNvSpPr>
-          <p:nvPr>
-            <p:ph idx="1"/>
-          </p:nvPr>
-        </p:nvSpPr>
-        <p:spPr/>
-        <p:txBody>
-          <a:bodyPr>
-            <a:normAutofit lnSpcReduction="10000"/>
-          </a:bodyPr>
-          <a:lstStyle/>
-          <a:p>
-            <a:r>
-              <a:rPr lang="en-US" dirty="0"/>
-              <a:t>Create a simple guard for our purpose, return </a:t>
-            </a:r>
-            <a:r>
-              <a:rPr lang="en-US" dirty="0" err="1"/>
-              <a:t>request.isAuthenticated</a:t>
-            </a:r>
-            <a:r>
-              <a:rPr lang="en-US" dirty="0"/>
-              <a:t>()</a:t>
-            </a:r>
-          </a:p>
-          <a:p>
-            <a:pPr lvl="1"/>
-            <a:r>
-              <a:rPr lang="en-US" dirty="0"/>
-              <a:t>It will check if user authenticated.</a:t>
-            </a:r>
-          </a:p>
-          <a:p>
-            <a:pPr lvl="2"/>
-            <a:r>
-              <a:rPr lang="en-US" dirty="0"/>
-              <a:t>Has cookie with </a:t>
-            </a:r>
-            <a:r>
-              <a:rPr lang="en-US" dirty="0" err="1"/>
-              <a:t>sessionId</a:t>
-            </a:r>
-            <a:endParaRPr lang="en-US" dirty="0"/>
-          </a:p>
-          <a:p>
-            <a:pPr lvl="2"/>
-            <a:r>
-              <a:rPr lang="en-US" dirty="0"/>
-              <a:t>Is there any record in our session store</a:t>
-            </a:r>
-          </a:p>
-          <a:p>
-            <a:pPr lvl="2"/>
-            <a:r>
-              <a:rPr lang="en-US" dirty="0"/>
-              <a:t>If it expired or not</a:t>
-            </a:r>
-          </a:p>
-          <a:p>
-            <a:pPr lvl="2"/>
-            <a:r>
-              <a:rPr lang="en-US" dirty="0"/>
-              <a:t>If everything is ok, then you are welcome to use the route</a:t>
-            </a:r>
-          </a:p>
-          <a:p>
-            <a:r>
-              <a:rPr lang="en-US" dirty="0"/>
-              <a:t>Test our session</a:t>
-            </a:r>
-          </a:p>
-          <a:p>
-            <a:pPr lvl="1"/>
-            <a:r>
-              <a:rPr lang="en-US" dirty="0"/>
-              <a:t>See the cookies</a:t>
-            </a:r>
-          </a:p>
-          <a:p>
-            <a:pPr lvl="1"/>
-            <a:r>
-              <a:rPr lang="en-US" dirty="0"/>
-              <a:t>The cookies are sent after they are saved (browser handle it automatically)</a:t>
-            </a:r>
-          </a:p>
-          <a:p>
-            <a:pPr lvl="1"/>
-            <a:endParaRPr lang="en-US" dirty="0"/>
-          </a:p>
-        </p:txBody>
-      </p:sp>
-      <p:sp>
-        <p:nvSpPr>
-          <p:cNvPr id="4" name="Footer Placeholder 3">
-            <a:extLst>
-              <a:ext uri="{FF2B5EF4-FFF2-40B4-BE49-F238E27FC236}">
-                <a16:creationId xmlns:a16="http://schemas.microsoft.com/office/drawing/2014/main" id="{00440CB2-A9FD-472F-B138-850B4368E065}"/>
-              </a:ext>
-            </a:extLst>
-          </p:cNvPr>
-          <p:cNvSpPr>
-            <a:spLocks noGrp="1"/>
-          </p:cNvSpPr>
-          <p:nvPr>
-            <p:ph type="ftr" sz="quarter" idx="11"/>
-          </p:nvPr>
-        </p:nvSpPr>
-        <p:spPr/>
-        <p:txBody>
-          <a:bodyPr/>
-          <a:lstStyle/>
-          <a:p>
-            <a:r>
-              <a:rPr lang="en-US"/>
-              <a:t>Nodejs Basics</a:t>
-            </a:r>
-            <a:endParaRPr lang="en-US" dirty="0"/>
-          </a:p>
-        </p:txBody>
-      </p:sp>
-      <p:sp>
-        <p:nvSpPr>
-          <p:cNvPr id="5" name="Slide Number Placeholder 4">
-            <a:extLst>
-              <a:ext uri="{FF2B5EF4-FFF2-40B4-BE49-F238E27FC236}">
-                <a16:creationId xmlns:a16="http://schemas.microsoft.com/office/drawing/2014/main" id="{86F6A443-9C74-4C7A-AA53-5957B1E9C989}"/>
-              </a:ext>
-            </a:extLst>
-          </p:cNvPr>
-          <p:cNvSpPr>
-            <a:spLocks noGrp="1"/>
-          </p:cNvSpPr>
-          <p:nvPr>
-            <p:ph type="sldNum" sz="quarter" idx="12"/>
-          </p:nvPr>
-        </p:nvSpPr>
-        <p:spPr/>
-        <p:txBody>
-          <a:bodyPr/>
-          <a:lstStyle/>
-          <a:p>
-            <a:fld id="{3A98EE3D-8CD1-4C3F-BD1C-C98C9596463C}" type="slidenum">
-              <a:rPr lang="en-US" smtClean="0"/>
-              <a:t>19</a:t>
-            </a:fld>
-            <a:endParaRPr lang="en-US" dirty="0"/>
-          </a:p>
-        </p:txBody>
-      </p:sp>
-    </p:spTree>
-    <p:extLst>
-      <p:ext uri="{BB962C8B-B14F-4D97-AF65-F5344CB8AC3E}">
-        <p14:creationId xmlns:p14="http://schemas.microsoft.com/office/powerpoint/2010/main" val="2104888566"/>
+        <p14:creationId xmlns:p14="http://schemas.microsoft.com/office/powerpoint/2010/main" val="817859998"/>
       </p:ext>
     </p:extLst>
   </p:cSld>
@@ -9466,39 +8015,6 @@
               <a:t>Auth Guard</a:t>
             </a:r>
           </a:p>
-          <a:p>
-            <a:pPr lvl="1"/>
-            <a:r>
-              <a:rPr lang="en-US" dirty="0">
-                <a:solidFill>
-                  <a:schemeClr val="tx1"/>
-                </a:solidFill>
-              </a:rPr>
-              <a:t>Sessions</a:t>
-            </a:r>
-          </a:p>
-          <a:p>
-            <a:pPr lvl="1"/>
-            <a:r>
-              <a:rPr lang="en-US" dirty="0">
-                <a:solidFill>
-                  <a:schemeClr val="tx1"/>
-                </a:solidFill>
-              </a:rPr>
-              <a:t>JWT Token</a:t>
-            </a:r>
-          </a:p>
-          <a:p>
-            <a:pPr lvl="1"/>
-            <a:r>
-              <a:rPr lang="en-US" dirty="0">
-                <a:solidFill>
-                  <a:schemeClr val="tx1"/>
-                </a:solidFill>
-              </a:rPr>
-              <a:t>JWT Strategy</a:t>
-            </a:r>
-          </a:p>
         </p:txBody>
       </p:sp>
       <p:sp>
@@ -9563,702 +8079,6 @@
     <p:extLst>
       <p:ext uri="{BB962C8B-B14F-4D97-AF65-F5344CB8AC3E}">
         <p14:creationId xmlns:p14="http://schemas.microsoft.com/office/powerpoint/2010/main" val="2687854352"/>
-      </p:ext>
-    </p:extLst>
-  </p:cSld>
-  <p:clrMapOvr>
-    <a:masterClrMapping/>
-  </p:clrMapOvr>
-</p:sld>
-</file>
-
-<file path=ppt/slides/slide20.xml><?xml version="1.0" encoding="utf-8"?>
-<p:sld xmlns:a="http://schemas.openxmlformats.org/drawingml/2006/main" xmlns:r="http://schemas.openxmlformats.org/officeDocument/2006/relationships" xmlns:p="http://schemas.openxmlformats.org/presentationml/2006/main">
-  <p:cSld>
-    <p:spTree>
-      <p:nvGrpSpPr>
-        <p:cNvPr id="1" name=""/>
-        <p:cNvGrpSpPr/>
-        <p:nvPr/>
-      </p:nvGrpSpPr>
-      <p:grpSpPr>
-        <a:xfrm>
-          <a:off x="0" y="0"/>
-          <a:ext cx="0" cy="0"/>
-          <a:chOff x="0" y="0"/>
-          <a:chExt cx="0" cy="0"/>
-        </a:xfrm>
-      </p:grpSpPr>
-      <p:sp>
-        <p:nvSpPr>
-          <p:cNvPr id="2" name="Title 1">
-            <a:extLst>
-              <a:ext uri="{FF2B5EF4-FFF2-40B4-BE49-F238E27FC236}">
-                <a16:creationId xmlns:a16="http://schemas.microsoft.com/office/drawing/2014/main" id="{BEE1017D-9834-4BBD-92ED-0B3253B751CF}"/>
-              </a:ext>
-            </a:extLst>
-          </p:cNvPr>
-          <p:cNvSpPr>
-            <a:spLocks noGrp="1"/>
-          </p:cNvSpPr>
-          <p:nvPr>
-            <p:ph type="title"/>
-          </p:nvPr>
-        </p:nvSpPr>
-        <p:spPr/>
-        <p:txBody>
-          <a:bodyPr/>
-          <a:lstStyle/>
-          <a:p>
-            <a:r>
-              <a:rPr lang="en-US" dirty="0"/>
-              <a:t>Demo</a:t>
-            </a:r>
-          </a:p>
-        </p:txBody>
-      </p:sp>
-      <p:sp>
-        <p:nvSpPr>
-          <p:cNvPr id="3" name="Content Placeholder 2">
-            <a:extLst>
-              <a:ext uri="{FF2B5EF4-FFF2-40B4-BE49-F238E27FC236}">
-                <a16:creationId xmlns:a16="http://schemas.microsoft.com/office/drawing/2014/main" id="{9EBECA0F-1755-483B-9774-0270CA892BE1}"/>
-              </a:ext>
-            </a:extLst>
-          </p:cNvPr>
-          <p:cNvSpPr>
-            <a:spLocks noGrp="1"/>
-          </p:cNvSpPr>
-          <p:nvPr>
-            <p:ph idx="1"/>
-          </p:nvPr>
-        </p:nvSpPr>
-        <p:spPr/>
-        <p:txBody>
-          <a:bodyPr/>
-          <a:lstStyle/>
-          <a:p>
-            <a:r>
-              <a:rPr lang="en-US" dirty="0"/>
-              <a:t>Tokens:</a:t>
-            </a:r>
-          </a:p>
-          <a:p>
-            <a:pPr lvl="1"/>
-            <a:r>
-              <a:rPr lang="en-US" dirty="0"/>
-              <a:t>On login route, return the JWT access token</a:t>
-            </a:r>
-          </a:p>
-          <a:p>
-            <a:pPr lvl="1"/>
-            <a:r>
-              <a:rPr lang="en-US" dirty="0"/>
-              <a:t>On protected route, require a Bearer Auth token</a:t>
-            </a:r>
-          </a:p>
-          <a:p>
-            <a:pPr lvl="1"/>
-            <a:r>
-              <a:rPr lang="en-US" dirty="0" err="1"/>
-              <a:t>npm</a:t>
-            </a:r>
-            <a:r>
-              <a:rPr lang="en-US" dirty="0"/>
-              <a:t> install @nestjs/jwt passport-</a:t>
-            </a:r>
-            <a:r>
-              <a:rPr lang="en-US" dirty="0" err="1"/>
-              <a:t>jwt</a:t>
-            </a:r>
-            <a:endParaRPr lang="en-US" dirty="0"/>
-          </a:p>
-          <a:p>
-            <a:pPr lvl="1"/>
-            <a:r>
-              <a:rPr lang="en-US" dirty="0"/>
-              <a:t>In </a:t>
-            </a:r>
-            <a:r>
-              <a:rPr lang="en-US" dirty="0" err="1"/>
-              <a:t>AuthService</a:t>
-            </a:r>
-            <a:r>
-              <a:rPr lang="en-US" dirty="0"/>
-              <a:t>, use </a:t>
-            </a:r>
-            <a:r>
-              <a:rPr lang="en-US" dirty="0" err="1"/>
-              <a:t>JwtService</a:t>
-            </a:r>
-            <a:r>
-              <a:rPr lang="en-US" dirty="0"/>
-              <a:t> to create JWT token (signing)</a:t>
-            </a:r>
-          </a:p>
-          <a:p>
-            <a:pPr lvl="2"/>
-            <a:r>
-              <a:rPr lang="en-US" dirty="0"/>
-              <a:t>Login method for signing JWT token</a:t>
-            </a:r>
-          </a:p>
-          <a:p>
-            <a:pPr lvl="1"/>
-            <a:r>
-              <a:rPr lang="en-US" dirty="0"/>
-              <a:t>Import </a:t>
-            </a:r>
-            <a:r>
-              <a:rPr lang="en-US" dirty="0" err="1"/>
-              <a:t>JwtModule</a:t>
-            </a:r>
-            <a:r>
-              <a:rPr lang="en-US" dirty="0"/>
-              <a:t> (by register function, secret, </a:t>
-            </a:r>
-            <a:r>
-              <a:rPr lang="en-US" dirty="0" err="1"/>
-              <a:t>expiresIn</a:t>
-            </a:r>
-            <a:r>
-              <a:rPr lang="en-US" dirty="0"/>
-              <a:t> ?)</a:t>
-            </a:r>
-          </a:p>
-          <a:p>
-            <a:pPr lvl="2"/>
-            <a:r>
-              <a:rPr lang="en-US" dirty="0"/>
-              <a:t>Secret is so important, don’t expose it to anybody</a:t>
-            </a:r>
-          </a:p>
-          <a:p>
-            <a:pPr lvl="1"/>
-            <a:r>
-              <a:rPr lang="en-US" dirty="0"/>
-              <a:t>Check your JWT token in </a:t>
-            </a:r>
-            <a:r>
-              <a:rPr lang="en-US" dirty="0">
-                <a:hlinkClick r:id="rId2"/>
-              </a:rPr>
-              <a:t>https://jwt.io</a:t>
-            </a:r>
-            <a:endParaRPr lang="fa-IR" dirty="0"/>
-          </a:p>
-          <a:p>
-            <a:pPr lvl="1"/>
-            <a:endParaRPr lang="en-US" dirty="0"/>
-          </a:p>
-          <a:p>
-            <a:pPr lvl="2"/>
-            <a:endParaRPr lang="en-US" dirty="0"/>
-          </a:p>
-        </p:txBody>
-      </p:sp>
-      <p:sp>
-        <p:nvSpPr>
-          <p:cNvPr id="4" name="Footer Placeholder 3">
-            <a:extLst>
-              <a:ext uri="{FF2B5EF4-FFF2-40B4-BE49-F238E27FC236}">
-                <a16:creationId xmlns:a16="http://schemas.microsoft.com/office/drawing/2014/main" id="{FD5970F7-0477-4F5C-B6D2-396794BDF69D}"/>
-              </a:ext>
-            </a:extLst>
-          </p:cNvPr>
-          <p:cNvSpPr>
-            <a:spLocks noGrp="1"/>
-          </p:cNvSpPr>
-          <p:nvPr>
-            <p:ph type="ftr" sz="quarter" idx="11"/>
-          </p:nvPr>
-        </p:nvSpPr>
-        <p:spPr/>
-        <p:txBody>
-          <a:bodyPr/>
-          <a:lstStyle/>
-          <a:p>
-            <a:r>
-              <a:rPr lang="en-US"/>
-              <a:t>Nodejs Basics</a:t>
-            </a:r>
-            <a:endParaRPr lang="en-US" dirty="0"/>
-          </a:p>
-        </p:txBody>
-      </p:sp>
-      <p:sp>
-        <p:nvSpPr>
-          <p:cNvPr id="5" name="Slide Number Placeholder 4">
-            <a:extLst>
-              <a:ext uri="{FF2B5EF4-FFF2-40B4-BE49-F238E27FC236}">
-                <a16:creationId xmlns:a16="http://schemas.microsoft.com/office/drawing/2014/main" id="{760445EB-99E2-44AA-A59D-321B336CEEED}"/>
-              </a:ext>
-            </a:extLst>
-          </p:cNvPr>
-          <p:cNvSpPr>
-            <a:spLocks noGrp="1"/>
-          </p:cNvSpPr>
-          <p:nvPr>
-            <p:ph type="sldNum" sz="quarter" idx="12"/>
-          </p:nvPr>
-        </p:nvSpPr>
-        <p:spPr/>
-        <p:txBody>
-          <a:bodyPr/>
-          <a:lstStyle/>
-          <a:p>
-            <a:fld id="{3A98EE3D-8CD1-4C3F-BD1C-C98C9596463C}" type="slidenum">
-              <a:rPr lang="en-US" smtClean="0"/>
-              <a:t>20</a:t>
-            </a:fld>
-            <a:endParaRPr lang="en-US" dirty="0"/>
-          </a:p>
-        </p:txBody>
-      </p:sp>
-    </p:spTree>
-    <p:extLst>
-      <p:ext uri="{BB962C8B-B14F-4D97-AF65-F5344CB8AC3E}">
-        <p14:creationId xmlns:p14="http://schemas.microsoft.com/office/powerpoint/2010/main" val="880073590"/>
-      </p:ext>
-    </p:extLst>
-  </p:cSld>
-  <p:clrMapOvr>
-    <a:masterClrMapping/>
-  </p:clrMapOvr>
-</p:sld>
-</file>
-
-<file path=ppt/slides/slide21.xml><?xml version="1.0" encoding="utf-8"?>
-<p:sld xmlns:a="http://schemas.openxmlformats.org/drawingml/2006/main" xmlns:r="http://schemas.openxmlformats.org/officeDocument/2006/relationships" xmlns:p="http://schemas.openxmlformats.org/presentationml/2006/main">
-  <p:cSld>
-    <p:spTree>
-      <p:nvGrpSpPr>
-        <p:cNvPr id="1" name=""/>
-        <p:cNvGrpSpPr/>
-        <p:nvPr/>
-      </p:nvGrpSpPr>
-      <p:grpSpPr>
-        <a:xfrm>
-          <a:off x="0" y="0"/>
-          <a:ext cx="0" cy="0"/>
-          <a:chOff x="0" y="0"/>
-          <a:chExt cx="0" cy="0"/>
-        </a:xfrm>
-      </p:grpSpPr>
-      <p:sp>
-        <p:nvSpPr>
-          <p:cNvPr id="2" name="Title 1">
-            <a:extLst>
-              <a:ext uri="{FF2B5EF4-FFF2-40B4-BE49-F238E27FC236}">
-                <a16:creationId xmlns:a16="http://schemas.microsoft.com/office/drawing/2014/main" id="{7098622B-9971-4765-AB05-47BF069018F0}"/>
-              </a:ext>
-            </a:extLst>
-          </p:cNvPr>
-          <p:cNvSpPr>
-            <a:spLocks noGrp="1"/>
-          </p:cNvSpPr>
-          <p:nvPr>
-            <p:ph type="title"/>
-          </p:nvPr>
-        </p:nvSpPr>
-        <p:spPr/>
-        <p:txBody>
-          <a:bodyPr/>
-          <a:lstStyle/>
-          <a:p>
-            <a:r>
-              <a:rPr lang="en-US" dirty="0"/>
-              <a:t>Demo</a:t>
-            </a:r>
-          </a:p>
-        </p:txBody>
-      </p:sp>
-      <p:sp>
-        <p:nvSpPr>
-          <p:cNvPr id="3" name="Content Placeholder 2">
-            <a:extLst>
-              <a:ext uri="{FF2B5EF4-FFF2-40B4-BE49-F238E27FC236}">
-                <a16:creationId xmlns:a16="http://schemas.microsoft.com/office/drawing/2014/main" id="{A2182DCB-2865-4DC8-83D9-5E1726D7892E}"/>
-              </a:ext>
-            </a:extLst>
-          </p:cNvPr>
-          <p:cNvSpPr>
-            <a:spLocks noGrp="1"/>
-          </p:cNvSpPr>
-          <p:nvPr>
-            <p:ph idx="1"/>
-          </p:nvPr>
-        </p:nvSpPr>
-        <p:spPr/>
-        <p:txBody>
-          <a:bodyPr>
-            <a:normAutofit lnSpcReduction="10000"/>
-          </a:bodyPr>
-          <a:lstStyle/>
-          <a:p>
-            <a:r>
-              <a:rPr lang="en-US" dirty="0"/>
-              <a:t>Create your new strategy</a:t>
-            </a:r>
-          </a:p>
-          <a:p>
-            <a:pPr lvl="1"/>
-            <a:r>
-              <a:rPr lang="en-US" dirty="0"/>
-              <a:t>Extends </a:t>
-            </a:r>
-            <a:r>
-              <a:rPr lang="en-US" dirty="0" err="1"/>
-              <a:t>PassportStrategy</a:t>
-            </a:r>
-            <a:r>
-              <a:rPr lang="en-US" dirty="0"/>
-              <a:t>(‘</a:t>
-            </a:r>
-            <a:r>
-              <a:rPr lang="en-US" dirty="0" err="1"/>
-              <a:t>jwt</a:t>
-            </a:r>
-            <a:r>
-              <a:rPr lang="en-US" dirty="0"/>
-              <a:t>’)</a:t>
-            </a:r>
-          </a:p>
-          <a:p>
-            <a:pPr lvl="1"/>
-            <a:r>
-              <a:rPr lang="en-US" dirty="0"/>
-              <a:t>Two step:</a:t>
-            </a:r>
-          </a:p>
-          <a:p>
-            <a:pPr lvl="2"/>
-            <a:r>
-              <a:rPr lang="en-US" dirty="0"/>
-              <a:t>Configuration through constructor (super method)</a:t>
-            </a:r>
-          </a:p>
-          <a:p>
-            <a:pPr lvl="3"/>
-            <a:r>
-              <a:rPr lang="en-US" dirty="0" err="1"/>
-              <a:t>secretOrKey</a:t>
-            </a:r>
-            <a:endParaRPr lang="en-US" dirty="0"/>
-          </a:p>
-          <a:p>
-            <a:pPr lvl="3"/>
-            <a:r>
-              <a:rPr lang="en-US" dirty="0" err="1"/>
-              <a:t>ignoreExpiration</a:t>
-            </a:r>
-            <a:endParaRPr lang="en-US" dirty="0"/>
-          </a:p>
-          <a:p>
-            <a:pPr lvl="3"/>
-            <a:r>
-              <a:rPr lang="en-US" dirty="0"/>
-              <a:t>How to get that access token? </a:t>
-            </a:r>
-            <a:r>
-              <a:rPr lang="en-US" dirty="0" err="1"/>
-              <a:t>jwtFromRequest</a:t>
-            </a:r>
-            <a:r>
-              <a:rPr lang="en-US" dirty="0"/>
-              <a:t>: </a:t>
-            </a:r>
-            <a:r>
-              <a:rPr lang="en-US" dirty="0" err="1"/>
-              <a:t>ExtractJwt.fromAuthHeaderAsBearerToken</a:t>
-            </a:r>
-            <a:r>
-              <a:rPr lang="en-US" dirty="0"/>
-              <a:t>();</a:t>
-            </a:r>
-          </a:p>
-          <a:p>
-            <a:pPr lvl="2"/>
-            <a:r>
-              <a:rPr lang="en-US" dirty="0"/>
-              <a:t>Validation</a:t>
-            </a:r>
-          </a:p>
-          <a:p>
-            <a:pPr lvl="3"/>
-            <a:r>
-              <a:rPr lang="en-US" dirty="0"/>
-              <a:t>We have the payload (decrypted) here</a:t>
-            </a:r>
-          </a:p>
-          <a:p>
-            <a:pPr lvl="3"/>
-            <a:r>
-              <a:rPr lang="en-US" dirty="0"/>
-              <a:t>Return our user object, what you return in this function stored in </a:t>
-            </a:r>
-            <a:r>
-              <a:rPr lang="en-US" dirty="0" err="1"/>
-              <a:t>req.user</a:t>
-            </a:r>
-            <a:endParaRPr lang="en-US" dirty="0"/>
-          </a:p>
-          <a:p>
-            <a:pPr lvl="2"/>
-            <a:r>
-              <a:rPr lang="en-US" dirty="0"/>
-              <a:t>Don’t forget to provide you new </a:t>
-            </a:r>
-            <a:r>
-              <a:rPr lang="en-US" dirty="0" err="1"/>
-              <a:t>JwtStrategy</a:t>
-            </a:r>
-            <a:endParaRPr lang="en-US" dirty="0"/>
-          </a:p>
-        </p:txBody>
-      </p:sp>
-      <p:sp>
-        <p:nvSpPr>
-          <p:cNvPr id="4" name="Footer Placeholder 3">
-            <a:extLst>
-              <a:ext uri="{FF2B5EF4-FFF2-40B4-BE49-F238E27FC236}">
-                <a16:creationId xmlns:a16="http://schemas.microsoft.com/office/drawing/2014/main" id="{FE3C4929-EAED-49AB-BB05-437E2B1FC331}"/>
-              </a:ext>
-            </a:extLst>
-          </p:cNvPr>
-          <p:cNvSpPr>
-            <a:spLocks noGrp="1"/>
-          </p:cNvSpPr>
-          <p:nvPr>
-            <p:ph type="ftr" sz="quarter" idx="11"/>
-          </p:nvPr>
-        </p:nvSpPr>
-        <p:spPr/>
-        <p:txBody>
-          <a:bodyPr/>
-          <a:lstStyle/>
-          <a:p>
-            <a:r>
-              <a:rPr lang="en-US"/>
-              <a:t>Nodejs Basics</a:t>
-            </a:r>
-            <a:endParaRPr lang="en-US" dirty="0"/>
-          </a:p>
-        </p:txBody>
-      </p:sp>
-      <p:sp>
-        <p:nvSpPr>
-          <p:cNvPr id="5" name="Slide Number Placeholder 4">
-            <a:extLst>
-              <a:ext uri="{FF2B5EF4-FFF2-40B4-BE49-F238E27FC236}">
-                <a16:creationId xmlns:a16="http://schemas.microsoft.com/office/drawing/2014/main" id="{6EDB6652-B25D-45BC-B7B0-49D958757C31}"/>
-              </a:ext>
-            </a:extLst>
-          </p:cNvPr>
-          <p:cNvSpPr>
-            <a:spLocks noGrp="1"/>
-          </p:cNvSpPr>
-          <p:nvPr>
-            <p:ph type="sldNum" sz="quarter" idx="12"/>
-          </p:nvPr>
-        </p:nvSpPr>
-        <p:spPr/>
-        <p:txBody>
-          <a:bodyPr/>
-          <a:lstStyle/>
-          <a:p>
-            <a:fld id="{3A98EE3D-8CD1-4C3F-BD1C-C98C9596463C}" type="slidenum">
-              <a:rPr lang="en-US" smtClean="0"/>
-              <a:t>21</a:t>
-            </a:fld>
-            <a:endParaRPr lang="en-US" dirty="0"/>
-          </a:p>
-        </p:txBody>
-      </p:sp>
-    </p:spTree>
-    <p:extLst>
-      <p:ext uri="{BB962C8B-B14F-4D97-AF65-F5344CB8AC3E}">
-        <p14:creationId xmlns:p14="http://schemas.microsoft.com/office/powerpoint/2010/main" val="3161835212"/>
-      </p:ext>
-    </p:extLst>
-  </p:cSld>
-  <p:clrMapOvr>
-    <a:masterClrMapping/>
-  </p:clrMapOvr>
-</p:sld>
-</file>
-
-<file path=ppt/slides/slide22.xml><?xml version="1.0" encoding="utf-8"?>
-<p:sld xmlns:a="http://schemas.openxmlformats.org/drawingml/2006/main" xmlns:r="http://schemas.openxmlformats.org/officeDocument/2006/relationships" xmlns:p="http://schemas.openxmlformats.org/presentationml/2006/main">
-  <p:cSld>
-    <p:spTree>
-      <p:nvGrpSpPr>
-        <p:cNvPr id="1" name=""/>
-        <p:cNvGrpSpPr/>
-        <p:nvPr/>
-      </p:nvGrpSpPr>
-      <p:grpSpPr>
-        <a:xfrm>
-          <a:off x="0" y="0"/>
-          <a:ext cx="0" cy="0"/>
-          <a:chOff x="0" y="0"/>
-          <a:chExt cx="0" cy="0"/>
-        </a:xfrm>
-      </p:grpSpPr>
-      <p:sp>
-        <p:nvSpPr>
-          <p:cNvPr id="2" name="Title 1">
-            <a:extLst>
-              <a:ext uri="{FF2B5EF4-FFF2-40B4-BE49-F238E27FC236}">
-                <a16:creationId xmlns:a16="http://schemas.microsoft.com/office/drawing/2014/main" id="{6B1A0672-14A7-4501-900C-A98EBCCF7AFE}"/>
-              </a:ext>
-            </a:extLst>
-          </p:cNvPr>
-          <p:cNvSpPr>
-            <a:spLocks noGrp="1"/>
-          </p:cNvSpPr>
-          <p:nvPr>
-            <p:ph type="title"/>
-          </p:nvPr>
-        </p:nvSpPr>
-        <p:spPr/>
-        <p:txBody>
-          <a:bodyPr/>
-          <a:lstStyle/>
-          <a:p>
-            <a:r>
-              <a:rPr lang="en-US" dirty="0"/>
-              <a:t>Exercise</a:t>
-            </a:r>
-          </a:p>
-        </p:txBody>
-      </p:sp>
-      <p:sp>
-        <p:nvSpPr>
-          <p:cNvPr id="3" name="Content Placeholder 2">
-            <a:extLst>
-              <a:ext uri="{FF2B5EF4-FFF2-40B4-BE49-F238E27FC236}">
-                <a16:creationId xmlns:a16="http://schemas.microsoft.com/office/drawing/2014/main" id="{2AEB1BE9-8435-42BF-A4F1-2F148FA9187A}"/>
-              </a:ext>
-            </a:extLst>
-          </p:cNvPr>
-          <p:cNvSpPr>
-            <a:spLocks noGrp="1"/>
-          </p:cNvSpPr>
-          <p:nvPr>
-            <p:ph idx="1"/>
-          </p:nvPr>
-        </p:nvSpPr>
-        <p:spPr/>
-        <p:txBody>
-          <a:bodyPr>
-            <a:normAutofit/>
-          </a:bodyPr>
-          <a:lstStyle/>
-          <a:p>
-            <a:r>
-              <a:rPr lang="en-US" dirty="0"/>
-              <a:t>Required:</a:t>
-            </a:r>
-          </a:p>
-          <a:p>
-            <a:pPr lvl="1"/>
-            <a:r>
-              <a:rPr lang="en-US" dirty="0"/>
-              <a:t>Exercise all we speak</a:t>
-            </a:r>
-          </a:p>
-          <a:p>
-            <a:pPr lvl="1"/>
-            <a:r>
-              <a:rPr lang="en-US" dirty="0"/>
-              <a:t>Create your own session and token based authentication</a:t>
-            </a:r>
-          </a:p>
-          <a:p>
-            <a:r>
-              <a:rPr lang="en-US" dirty="0"/>
-              <a:t>Optional:</a:t>
-            </a:r>
-          </a:p>
-          <a:p>
-            <a:pPr lvl="1"/>
-            <a:r>
-              <a:rPr lang="en-US" dirty="0"/>
-              <a:t>We have Refresh token to improve the token based strategies, What are they?</a:t>
-            </a:r>
-          </a:p>
-          <a:p>
-            <a:pPr lvl="1"/>
-            <a:r>
-              <a:rPr lang="en-US" dirty="0"/>
-              <a:t>Implement your own refresh token based authentication with passport in nest.js</a:t>
-            </a:r>
-          </a:p>
-        </p:txBody>
-      </p:sp>
-      <p:sp>
-        <p:nvSpPr>
-          <p:cNvPr id="4" name="Footer Placeholder 3">
-            <a:extLst>
-              <a:ext uri="{FF2B5EF4-FFF2-40B4-BE49-F238E27FC236}">
-                <a16:creationId xmlns:a16="http://schemas.microsoft.com/office/drawing/2014/main" id="{E3C0E9F9-B143-43AD-BD5C-508C3E46FF7B}"/>
-              </a:ext>
-            </a:extLst>
-          </p:cNvPr>
-          <p:cNvSpPr>
-            <a:spLocks noGrp="1"/>
-          </p:cNvSpPr>
-          <p:nvPr>
-            <p:ph type="ftr" sz="quarter" idx="11"/>
-          </p:nvPr>
-        </p:nvSpPr>
-        <p:spPr/>
-        <p:txBody>
-          <a:bodyPr/>
-          <a:lstStyle/>
-          <a:p>
-            <a:r>
-              <a:rPr lang="en-US"/>
-              <a:t>Nodejs Basics</a:t>
-            </a:r>
-            <a:endParaRPr lang="en-US" dirty="0"/>
-          </a:p>
-        </p:txBody>
-      </p:sp>
-      <p:sp>
-        <p:nvSpPr>
-          <p:cNvPr id="5" name="Slide Number Placeholder 4">
-            <a:extLst>
-              <a:ext uri="{FF2B5EF4-FFF2-40B4-BE49-F238E27FC236}">
-                <a16:creationId xmlns:a16="http://schemas.microsoft.com/office/drawing/2014/main" id="{1B95C015-BA9F-40C7-A04C-3B835E7354AB}"/>
-              </a:ext>
-            </a:extLst>
-          </p:cNvPr>
-          <p:cNvSpPr>
-            <a:spLocks noGrp="1"/>
-          </p:cNvSpPr>
-          <p:nvPr>
-            <p:ph type="sldNum" sz="quarter" idx="12"/>
-          </p:nvPr>
-        </p:nvSpPr>
-        <p:spPr/>
-        <p:txBody>
-          <a:bodyPr/>
-          <a:lstStyle/>
-          <a:p>
-            <a:fld id="{3A98EE3D-8CD1-4C3F-BD1C-C98C9596463C}" type="slidenum">
-              <a:rPr lang="en-US" smtClean="0"/>
-              <a:t>22</a:t>
-            </a:fld>
-            <a:endParaRPr lang="en-US" dirty="0"/>
-          </a:p>
-        </p:txBody>
-      </p:sp>
-    </p:spTree>
-    <p:extLst>
-      <p:ext uri="{BB962C8B-B14F-4D97-AF65-F5344CB8AC3E}">
-        <p14:creationId xmlns:p14="http://schemas.microsoft.com/office/powerpoint/2010/main" val="817859998"/>
       </p:ext>
     </p:extLst>
   </p:cSld>

</xml_diff>